<commit_message>
Slide about KEDA is done
</commit_message>
<xml_diff>
--- a/preso.pptx
+++ b/preso.pptx
@@ -3707,7 +3707,7 @@
       </p:grpSpPr>
       <p:sp>
         <p:nvSpPr>
-          <p:cNvPr id="4" name="Rectangle 3">
+          <p:cNvPr id="4" name="K8s cluster">
             <a:extLst>
               <a:ext uri="{FF2B5EF4-FFF2-40B4-BE49-F238E27FC236}">
                 <a16:creationId xmlns:a16="http://schemas.microsoft.com/office/drawing/2014/main" id="{831A18A1-1E23-7A4C-B645-2373E8D3BFE7}"/>
@@ -3719,8 +3719,8 @@
         </p:nvSpPr>
         <p:spPr>
           <a:xfrm>
-            <a:off x="331695" y="313765"/>
-            <a:ext cx="5556358" cy="6194611"/>
+            <a:off x="331694" y="313765"/>
+            <a:ext cx="7257825" cy="6194611"/>
           </a:xfrm>
           <a:prstGeom prst="rect">
             <a:avLst/>
@@ -3755,7 +3755,7 @@
       </p:sp>
       <p:sp>
         <p:nvSpPr>
-          <p:cNvPr id="9" name="Rectangle 8">
+          <p:cNvPr id="9" name="Target">
             <a:extLst>
               <a:ext uri="{FF2B5EF4-FFF2-40B4-BE49-F238E27FC236}">
                 <a16:creationId xmlns:a16="http://schemas.microsoft.com/office/drawing/2014/main" id="{F3274F57-36FD-354F-8767-4F02319800B1}"/>
@@ -3767,7 +3767,7 @@
         </p:nvSpPr>
         <p:spPr>
           <a:xfrm>
-            <a:off x="953717" y="2884289"/>
+            <a:off x="3146722" y="2540660"/>
             <a:ext cx="880217" cy="666571"/>
           </a:xfrm>
           <a:prstGeom prst="rect">
@@ -3804,7 +3804,7 @@
       </p:sp>
       <p:sp>
         <p:nvSpPr>
-          <p:cNvPr id="10" name="Oval 9">
+          <p:cNvPr id="10" name="ScaledObject">
             <a:extLst>
               <a:ext uri="{FF2B5EF4-FFF2-40B4-BE49-F238E27FC236}">
                 <a16:creationId xmlns:a16="http://schemas.microsoft.com/office/drawing/2014/main" id="{2A7FA6F1-4E2E-7E43-92D1-7F65E9E18730}"/>
@@ -3816,7 +3816,7 @@
         </p:nvSpPr>
         <p:spPr>
           <a:xfrm>
-            <a:off x="2478235" y="4559148"/>
+            <a:off x="2917147" y="4559148"/>
             <a:ext cx="1196411" cy="1158626"/>
           </a:xfrm>
           <a:prstGeom prst="ellipse">
@@ -3854,7 +3854,7 @@
       </p:sp>
       <p:pic>
         <p:nvPicPr>
-          <p:cNvPr id="11" name="Picture 10" descr="A picture containing drawing&#10;&#10;Description automatically generated">
+          <p:cNvPr id="11" name="queue" descr="A picture containing drawing&#10;&#10;Description automatically generated">
             <a:extLst>
               <a:ext uri="{FF2B5EF4-FFF2-40B4-BE49-F238E27FC236}">
                 <a16:creationId xmlns:a16="http://schemas.microsoft.com/office/drawing/2014/main" id="{BB6860C5-A612-C44B-8217-8121FFE2A390}"/>
@@ -3874,7 +3874,7 @@
         </p:blipFill>
         <p:spPr>
           <a:xfrm>
-            <a:off x="7129746" y="592213"/>
+            <a:off x="8601930" y="607411"/>
             <a:ext cx="1191305" cy="1191305"/>
           </a:xfrm>
           <a:prstGeom prst="rect">
@@ -3884,7 +3884,7 @@
       </p:pic>
       <p:pic>
         <p:nvPicPr>
-          <p:cNvPr id="12" name="Picture 8" descr="Kubernetes - Wikipedia">
+          <p:cNvPr id="12" name="K8s logo" descr="Kubernetes - Wikipedia">
             <a:extLst>
               <a:ext uri="{FF2B5EF4-FFF2-40B4-BE49-F238E27FC236}">
                 <a16:creationId xmlns:a16="http://schemas.microsoft.com/office/drawing/2014/main" id="{3887F463-ACD4-1346-B765-EFF06E10AFE3}"/>
@@ -3911,7 +3911,7 @@
         </p:blipFill>
         <p:spPr bwMode="auto">
           <a:xfrm>
-            <a:off x="5281300" y="349624"/>
+            <a:off x="6923947" y="349624"/>
             <a:ext cx="535159" cy="519525"/>
           </a:xfrm>
           <a:prstGeom prst="rect">
@@ -3929,165 +3929,12 @@
           </a:extLst>
         </p:spPr>
       </p:pic>
-      <p:grpSp>
-        <p:nvGrpSpPr>
-          <p:cNvPr id="15" name="Group 14">
-            <a:extLst>
-              <a:ext uri="{FF2B5EF4-FFF2-40B4-BE49-F238E27FC236}">
-                <a16:creationId xmlns:a16="http://schemas.microsoft.com/office/drawing/2014/main" id="{DC082FEB-84C5-AB46-B065-11A9514D3B81}"/>
-              </a:ext>
-            </a:extLst>
-          </p:cNvPr>
-          <p:cNvGrpSpPr/>
-          <p:nvPr/>
-        </p:nvGrpSpPr>
-        <p:grpSpPr>
-          <a:xfrm>
-            <a:off x="4244283" y="2792380"/>
-            <a:ext cx="1196411" cy="850391"/>
-            <a:chOff x="3495228" y="2260362"/>
-            <a:chExt cx="1196411" cy="850391"/>
-          </a:xfrm>
-        </p:grpSpPr>
-        <p:sp>
-          <p:nvSpPr>
-            <p:cNvPr id="7" name="Rectangle 6">
-              <a:extLst>
-                <a:ext uri="{FF2B5EF4-FFF2-40B4-BE49-F238E27FC236}">
-                  <a16:creationId xmlns:a16="http://schemas.microsoft.com/office/drawing/2014/main" id="{3011F17D-3568-A14B-AEF5-7FC060455641}"/>
-                </a:ext>
-              </a:extLst>
-            </p:cNvPr>
-            <p:cNvSpPr/>
-            <p:nvPr/>
-          </p:nvSpPr>
-          <p:spPr>
-            <a:xfrm>
-              <a:off x="3495228" y="2260362"/>
-              <a:ext cx="1196411" cy="850391"/>
-            </a:xfrm>
-            <a:prstGeom prst="rect">
-              <a:avLst/>
-            </a:prstGeom>
-          </p:spPr>
-          <p:style>
-            <a:lnRef idx="2">
-              <a:schemeClr val="accent2">
-                <a:shade val="50000"/>
-              </a:schemeClr>
-            </a:lnRef>
-            <a:fillRef idx="1">
-              <a:schemeClr val="accent2"/>
-            </a:fillRef>
-            <a:effectRef idx="0">
-              <a:schemeClr val="accent2"/>
-            </a:effectRef>
-            <a:fontRef idx="minor">
-              <a:schemeClr val="lt1"/>
-            </a:fontRef>
-          </p:style>
-          <p:txBody>
-            <a:bodyPr rtlCol="0" anchor="ctr" anchorCtr="1"/>
-            <a:lstStyle/>
-            <a:p>
-              <a:pPr algn="ctr"/>
-              <a:endParaRPr lang="en-US" dirty="0"/>
-            </a:p>
-          </p:txBody>
-        </p:sp>
-        <p:pic>
-          <p:nvPicPr>
-            <p:cNvPr id="13" name="Picture 2">
-              <a:extLst>
-                <a:ext uri="{FF2B5EF4-FFF2-40B4-BE49-F238E27FC236}">
-                  <a16:creationId xmlns:a16="http://schemas.microsoft.com/office/drawing/2014/main" id="{F26A7939-E93E-BA49-9C24-1A261D50F337}"/>
-                </a:ext>
-              </a:extLst>
-            </p:cNvPr>
-            <p:cNvPicPr>
-              <a:picLocks noChangeAspect="1" noChangeArrowheads="1"/>
-            </p:cNvPicPr>
-            <p:nvPr/>
-          </p:nvPicPr>
-          <p:blipFill>
-            <a:blip r:embed="rId4">
-              <a:extLst>
-                <a:ext uri="{28A0092B-C50C-407E-A947-70E740481C1C}">
-                  <a14:useLocalDpi xmlns:a14="http://schemas.microsoft.com/office/drawing/2010/main" val="0"/>
-                </a:ext>
-              </a:extLst>
-            </a:blip>
-            <a:srcRect/>
-            <a:stretch>
-              <a:fillRect/>
-            </a:stretch>
-          </p:blipFill>
-          <p:spPr bwMode="auto">
-            <a:xfrm>
-              <a:off x="3714869" y="2367185"/>
-              <a:ext cx="757131" cy="295017"/>
-            </a:xfrm>
-            <a:prstGeom prst="rect">
-              <a:avLst/>
-            </a:prstGeom>
-            <a:noFill/>
-            <a:extLst>
-              <a:ext uri="{909E8E84-426E-40DD-AFC4-6F175D3DCCD1}">
-                <a14:hiddenFill xmlns:a14="http://schemas.microsoft.com/office/drawing/2010/main">
-                  <a:solidFill>
-                    <a:srgbClr val="FFFFFF"/>
-                  </a:solidFill>
-                </a14:hiddenFill>
-              </a:ext>
-            </a:extLst>
-          </p:spPr>
-        </p:pic>
-        <p:sp>
-          <p:nvSpPr>
-            <p:cNvPr id="14" name="TextBox 13">
-              <a:extLst>
-                <a:ext uri="{FF2B5EF4-FFF2-40B4-BE49-F238E27FC236}">
-                  <a16:creationId xmlns:a16="http://schemas.microsoft.com/office/drawing/2014/main" id="{CE8879E2-085A-4942-A33C-01270229D3F5}"/>
-                </a:ext>
-              </a:extLst>
-            </p:cNvPr>
-            <p:cNvSpPr txBox="1"/>
-            <p:nvPr/>
-          </p:nvSpPr>
-          <p:spPr>
-            <a:xfrm>
-              <a:off x="3576048" y="2621696"/>
-              <a:ext cx="1034770" cy="369332"/>
-            </a:xfrm>
-            <a:prstGeom prst="rect">
-              <a:avLst/>
-            </a:prstGeom>
-            <a:noFill/>
-          </p:spPr>
-          <p:txBody>
-            <a:bodyPr wrap="none" rtlCol="0">
-              <a:spAutoFit/>
-            </a:bodyPr>
-            <a:lstStyle/>
-            <a:p>
-              <a:r>
-                <a:rPr lang="en-US" dirty="0">
-                  <a:solidFill>
-                    <a:schemeClr val="bg1"/>
-                  </a:solidFill>
-                </a:rPr>
-                <a:t>Operator</a:t>
-              </a:r>
-            </a:p>
-          </p:txBody>
-        </p:sp>
-      </p:grpSp>
-      <p:sp>
-        <p:nvSpPr>
-          <p:cNvPr id="16" name="Oval 15">
-            <a:extLst>
-              <a:ext uri="{FF2B5EF4-FFF2-40B4-BE49-F238E27FC236}">
-                <a16:creationId xmlns:a16="http://schemas.microsoft.com/office/drawing/2014/main" id="{B3BA1375-15CB-AA4E-93F5-EC9DDE8B0A99}"/>
+      <p:sp>
+        <p:nvSpPr>
+          <p:cNvPr id="7" name="KEDA operator">
+            <a:extLst>
+              <a:ext uri="{FF2B5EF4-FFF2-40B4-BE49-F238E27FC236}">
+                <a16:creationId xmlns:a16="http://schemas.microsoft.com/office/drawing/2014/main" id="{3011F17D-3568-A14B-AEF5-7FC060455641}"/>
               </a:ext>
             </a:extLst>
           </p:cNvPr>
@@ -4096,7 +3943,139 @@
         </p:nvSpPr>
         <p:spPr>
           <a:xfrm>
-            <a:off x="2644346" y="3220865"/>
+            <a:off x="6262695" y="2540660"/>
+            <a:ext cx="1196411" cy="1330267"/>
+          </a:xfrm>
+          <a:prstGeom prst="rect">
+            <a:avLst/>
+          </a:prstGeom>
+        </p:spPr>
+        <p:style>
+          <a:lnRef idx="2">
+            <a:schemeClr val="accent2">
+              <a:shade val="50000"/>
+            </a:schemeClr>
+          </a:lnRef>
+          <a:fillRef idx="1">
+            <a:schemeClr val="accent2"/>
+          </a:fillRef>
+          <a:effectRef idx="0">
+            <a:schemeClr val="accent2"/>
+          </a:effectRef>
+          <a:fontRef idx="minor">
+            <a:schemeClr val="lt1"/>
+          </a:fontRef>
+        </p:style>
+        <p:txBody>
+          <a:bodyPr rtlCol="0" anchor="ctr" anchorCtr="1"/>
+          <a:lstStyle/>
+          <a:p>
+            <a:pPr algn="ctr"/>
+            <a:endParaRPr lang="en-US" dirty="0"/>
+          </a:p>
+        </p:txBody>
+      </p:sp>
+      <p:pic>
+        <p:nvPicPr>
+          <p:cNvPr id="13" name="KEDA logo">
+            <a:extLst>
+              <a:ext uri="{FF2B5EF4-FFF2-40B4-BE49-F238E27FC236}">
+                <a16:creationId xmlns:a16="http://schemas.microsoft.com/office/drawing/2014/main" id="{F26A7939-E93E-BA49-9C24-1A261D50F337}"/>
+              </a:ext>
+            </a:extLst>
+          </p:cNvPr>
+          <p:cNvPicPr>
+            <a:picLocks noChangeAspect="1" noChangeArrowheads="1"/>
+          </p:cNvPicPr>
+          <p:nvPr/>
+        </p:nvPicPr>
+        <p:blipFill>
+          <a:blip r:embed="rId4">
+            <a:extLst>
+              <a:ext uri="{28A0092B-C50C-407E-A947-70E740481C1C}">
+                <a14:useLocalDpi xmlns:a14="http://schemas.microsoft.com/office/drawing/2010/main" val="0"/>
+              </a:ext>
+            </a:extLst>
+          </a:blip>
+          <a:srcRect/>
+          <a:stretch>
+            <a:fillRect/>
+          </a:stretch>
+        </p:blipFill>
+        <p:spPr bwMode="auto">
+          <a:xfrm>
+            <a:off x="6482336" y="2980768"/>
+            <a:ext cx="757131" cy="295017"/>
+          </a:xfrm>
+          <a:prstGeom prst="rect">
+            <a:avLst/>
+          </a:prstGeom>
+          <a:noFill/>
+          <a:extLst>
+            <a:ext uri="{909E8E84-426E-40DD-AFC4-6F175D3DCCD1}">
+              <a14:hiddenFill xmlns:a14="http://schemas.microsoft.com/office/drawing/2010/main">
+                <a:solidFill>
+                  <a:srgbClr val="FFFFFF"/>
+                </a:solidFill>
+              </a14:hiddenFill>
+            </a:ext>
+          </a:extLst>
+        </p:spPr>
+      </p:pic>
+      <p:sp>
+        <p:nvSpPr>
+          <p:cNvPr id="14" name="Text Operator">
+            <a:extLst>
+              <a:ext uri="{FF2B5EF4-FFF2-40B4-BE49-F238E27FC236}">
+                <a16:creationId xmlns:a16="http://schemas.microsoft.com/office/drawing/2014/main" id="{CE8879E2-085A-4942-A33C-01270229D3F5}"/>
+              </a:ext>
+            </a:extLst>
+          </p:cNvPr>
+          <p:cNvSpPr txBox="1"/>
+          <p:nvPr/>
+        </p:nvSpPr>
+        <p:spPr>
+          <a:xfrm>
+            <a:off x="6343515" y="3235279"/>
+            <a:ext cx="1034770" cy="369332"/>
+          </a:xfrm>
+          <a:prstGeom prst="rect">
+            <a:avLst/>
+          </a:prstGeom>
+          <a:noFill/>
+        </p:spPr>
+        <p:txBody>
+          <a:bodyPr wrap="none" rtlCol="0">
+            <a:spAutoFit/>
+          </a:bodyPr>
+          <a:lstStyle/>
+          <a:p>
+            <a:r>
+              <a:rPr lang="en-US" dirty="0">
+                <a:solidFill>
+                  <a:schemeClr val="bg1"/>
+                </a:solidFill>
+              </a:rPr>
+              <a:t>Operator</a:t>
+            </a:r>
+          </a:p>
+        </p:txBody>
+      </p:sp>
+      <p:sp>
+        <p:nvSpPr>
+          <p:cNvPr id="16" name="hpa">
+            <a:extLst>
+              <a:ext uri="{FF2B5EF4-FFF2-40B4-BE49-F238E27FC236}">
+                <a16:creationId xmlns:a16="http://schemas.microsoft.com/office/drawing/2014/main" id="{B3BA1375-15CB-AA4E-93F5-EC9DDE8B0A99}"/>
+              </a:ext>
+            </a:extLst>
+          </p:cNvPr>
+          <p:cNvSpPr/>
+          <p:nvPr/>
+        </p:nvSpPr>
+        <p:spPr>
+          <a:xfrm>
+            <a:off x="926997" y="2846450"/>
             <a:ext cx="864188" cy="843811"/>
           </a:xfrm>
           <a:prstGeom prst="ellipse">
@@ -4136,7 +4115,7 @@
       </p:sp>
       <p:sp>
         <p:nvSpPr>
-          <p:cNvPr id="17" name="Rectangle 16">
+          <p:cNvPr id="17" name="Kube Controller">
             <a:extLst>
               <a:ext uri="{FF2B5EF4-FFF2-40B4-BE49-F238E27FC236}">
                 <a16:creationId xmlns:a16="http://schemas.microsoft.com/office/drawing/2014/main" id="{D84E5641-BF98-E24B-8255-81666D6EA61E}"/>
@@ -4148,7 +4127,7 @@
         </p:nvSpPr>
         <p:spPr>
           <a:xfrm>
-            <a:off x="2478235" y="869149"/>
+            <a:off x="2917147" y="869149"/>
             <a:ext cx="1304871" cy="850391"/>
           </a:xfrm>
           <a:prstGeom prst="rect">
@@ -4188,7 +4167,7 @@
       </p:sp>
       <p:pic>
         <p:nvPicPr>
-          <p:cNvPr id="3" name="Graphic 2" descr="Captain">
+          <p:cNvPr id="3" name="kubectl" descr="Captain">
             <a:extLst>
               <a:ext uri="{FF2B5EF4-FFF2-40B4-BE49-F238E27FC236}">
                 <a16:creationId xmlns:a16="http://schemas.microsoft.com/office/drawing/2014/main" id="{A49EA59F-653C-1A46-879F-81E0DDE5BF50}"/>
@@ -4214,7 +4193,7 @@
         </p:blipFill>
         <p:spPr>
           <a:xfrm>
-            <a:off x="6588751" y="4617283"/>
+            <a:off x="7863851" y="4681261"/>
             <a:ext cx="914400" cy="914400"/>
           </a:xfrm>
           <a:prstGeom prst="rect">
@@ -4224,20 +4203,22 @@
       </p:pic>
       <p:cxnSp>
         <p:nvCxnSpPr>
-          <p:cNvPr id="6" name="Straight Arrow Connector 5" descr="Create Target">
+          <p:cNvPr id="6" name="f kubectl t target" descr="Create Target">
             <a:extLst>
               <a:ext uri="{FF2B5EF4-FFF2-40B4-BE49-F238E27FC236}">
                 <a16:creationId xmlns:a16="http://schemas.microsoft.com/office/drawing/2014/main" id="{6BFBE3E5-A16E-BE49-82A0-1F8B2BA31DEA}"/>
               </a:ext>
             </a:extLst>
           </p:cNvPr>
-          <p:cNvCxnSpPr/>
+          <p:cNvCxnSpPr>
+            <a:cxnSpLocks/>
+          </p:cNvCxnSpPr>
           <p:nvPr/>
         </p:nvCxnSpPr>
         <p:spPr>
           <a:xfrm flipH="1" flipV="1">
-            <a:off x="1933303" y="3523046"/>
-            <a:ext cx="4519748" cy="1551437"/>
+            <a:off x="4113558" y="3165920"/>
+            <a:ext cx="3750296" cy="1773648"/>
           </a:xfrm>
           <a:prstGeom prst="straightConnector1">
             <a:avLst/>
@@ -4263,7 +4244,7 @@
       </p:cxnSp>
       <p:cxnSp>
         <p:nvCxnSpPr>
-          <p:cNvPr id="18" name="Straight Arrow Connector 17">
+          <p:cNvPr id="18" name="f kubectl t scaledobject">
             <a:extLst>
               <a:ext uri="{FF2B5EF4-FFF2-40B4-BE49-F238E27FC236}">
                 <a16:creationId xmlns:a16="http://schemas.microsoft.com/office/drawing/2014/main" id="{E34D6ADF-6B85-F44C-AD6C-9B0D993ED174}"/>
@@ -4276,9 +4257,9 @@
           <p:nvPr/>
         </p:nvCxnSpPr>
         <p:spPr>
-          <a:xfrm flipH="1" flipV="1">
-            <a:off x="3696029" y="5100778"/>
-            <a:ext cx="2892722" cy="219206"/>
+          <a:xfrm flipH="1">
+            <a:off x="4113558" y="5235996"/>
+            <a:ext cx="3611841" cy="0"/>
           </a:xfrm>
           <a:prstGeom prst="straightConnector1">
             <a:avLst/>
@@ -4304,7 +4285,7 @@
       </p:cxnSp>
       <p:cxnSp>
         <p:nvCxnSpPr>
-          <p:cNvPr id="19" name="Straight Arrow Connector 18">
+          <p:cNvPr id="19" name="f keda t scaledobject">
             <a:extLst>
               <a:ext uri="{FF2B5EF4-FFF2-40B4-BE49-F238E27FC236}">
                 <a16:creationId xmlns:a16="http://schemas.microsoft.com/office/drawing/2014/main" id="{78571CD0-531B-1046-8FC5-9D4B9973C12E}"/>
@@ -4318,8 +4299,8 @@
         </p:nvCxnSpPr>
         <p:spPr>
           <a:xfrm flipH="1">
-            <a:off x="3602736" y="3702914"/>
-            <a:ext cx="969266" cy="1097686"/>
+            <a:off x="4113558" y="3687447"/>
+            <a:ext cx="1982442" cy="1107049"/>
           </a:xfrm>
           <a:prstGeom prst="straightConnector1">
             <a:avLst/>
@@ -4345,7 +4326,7 @@
       </p:cxnSp>
       <p:cxnSp>
         <p:nvCxnSpPr>
-          <p:cNvPr id="24" name="Straight Arrow Connector 23">
+          <p:cNvPr id="24" name="f keda t hpa">
             <a:extLst>
               <a:ext uri="{FF2B5EF4-FFF2-40B4-BE49-F238E27FC236}">
                 <a16:creationId xmlns:a16="http://schemas.microsoft.com/office/drawing/2014/main" id="{29C1B618-ED74-DA4E-910B-4A831D319BA0}"/>
@@ -4358,9 +4339,9 @@
           <p:nvPr/>
         </p:nvCxnSpPr>
         <p:spPr>
-          <a:xfrm flipH="1">
-            <a:off x="3508534" y="3334954"/>
-            <a:ext cx="624554" cy="94046"/>
+          <a:xfrm flipH="1" flipV="1">
+            <a:off x="1872005" y="3501272"/>
+            <a:ext cx="4300208" cy="28717"/>
           </a:xfrm>
           <a:prstGeom prst="straightConnector1">
             <a:avLst/>
@@ -4386,7 +4367,7 @@
       </p:cxnSp>
       <p:cxnSp>
         <p:nvCxnSpPr>
-          <p:cNvPr id="27" name="Straight Arrow Connector 26">
+          <p:cNvPr id="27" name="f keda t target">
             <a:extLst>
               <a:ext uri="{FF2B5EF4-FFF2-40B4-BE49-F238E27FC236}">
                 <a16:creationId xmlns:a16="http://schemas.microsoft.com/office/drawing/2014/main" id="{73037384-DF63-5A4E-9025-3897A31BD834}"/>
@@ -4400,8 +4381,8 @@
         </p:nvCxnSpPr>
         <p:spPr>
           <a:xfrm flipH="1">
-            <a:off x="1945130" y="3043376"/>
-            <a:ext cx="2187958" cy="3335"/>
+            <a:off x="4113558" y="3046711"/>
+            <a:ext cx="2049498" cy="0"/>
           </a:xfrm>
           <a:prstGeom prst="straightConnector1">
             <a:avLst/>
@@ -4439,8 +4420,8 @@
         </p:nvSpPr>
         <p:spPr>
           <a:xfrm>
-            <a:off x="2369775" y="2777048"/>
-            <a:ext cx="1304871" cy="338554"/>
+            <a:off x="4484078" y="2762128"/>
+            <a:ext cx="1504284" cy="338554"/>
           </a:xfrm>
           <a:prstGeom prst="rect">
             <a:avLst/>
@@ -4455,7 +4436,206 @@
           <a:p>
             <a:r>
               <a:rPr lang="en-US" sz="1600" dirty="0"/>
-              <a:t>0-&gt;1 OR 1-&gt;0</a:t>
+              <a:t>0 to 1 / 1 to 0</a:t>
+            </a:r>
+          </a:p>
+        </p:txBody>
+      </p:sp>
+      <p:cxnSp>
+        <p:nvCxnSpPr>
+          <p:cNvPr id="54" name="f keda t queue">
+            <a:extLst>
+              <a:ext uri="{FF2B5EF4-FFF2-40B4-BE49-F238E27FC236}">
+                <a16:creationId xmlns:a16="http://schemas.microsoft.com/office/drawing/2014/main" id="{F7E50F71-C4E2-1D4B-8374-2E7427CFF4F5}"/>
+              </a:ext>
+            </a:extLst>
+          </p:cNvPr>
+          <p:cNvCxnSpPr>
+            <a:cxnSpLocks/>
+          </p:cNvCxnSpPr>
+          <p:nvPr/>
+        </p:nvCxnSpPr>
+        <p:spPr>
+          <a:xfrm flipV="1">
+            <a:off x="7459106" y="1490472"/>
+            <a:ext cx="1142825" cy="1019355"/>
+          </a:xfrm>
+          <a:prstGeom prst="straightConnector1">
+            <a:avLst/>
+          </a:prstGeom>
+          <a:ln w="19050">
+            <a:tailEnd type="triangle"/>
+          </a:ln>
+        </p:spPr>
+        <p:style>
+          <a:lnRef idx="1">
+            <a:schemeClr val="accent1"/>
+          </a:lnRef>
+          <a:fillRef idx="0">
+            <a:schemeClr val="accent1"/>
+          </a:fillRef>
+          <a:effectRef idx="0">
+            <a:schemeClr val="accent1"/>
+          </a:effectRef>
+          <a:fontRef idx="minor">
+            <a:schemeClr val="tx1"/>
+          </a:fontRef>
+        </p:style>
+      </p:cxnSp>
+      <p:cxnSp>
+        <p:nvCxnSpPr>
+          <p:cNvPr id="20" name="f kube-controller t hpa">
+            <a:extLst>
+              <a:ext uri="{FF2B5EF4-FFF2-40B4-BE49-F238E27FC236}">
+                <a16:creationId xmlns:a16="http://schemas.microsoft.com/office/drawing/2014/main" id="{AE957F92-9FE3-924F-8D2E-6A36988151CC}"/>
+              </a:ext>
+            </a:extLst>
+          </p:cNvPr>
+          <p:cNvCxnSpPr>
+            <a:cxnSpLocks/>
+          </p:cNvCxnSpPr>
+          <p:nvPr/>
+        </p:nvCxnSpPr>
+        <p:spPr>
+          <a:xfrm flipH="1">
+            <a:off x="1649339" y="1598064"/>
+            <a:ext cx="1136590" cy="1164064"/>
+          </a:xfrm>
+          <a:prstGeom prst="straightConnector1">
+            <a:avLst/>
+          </a:prstGeom>
+          <a:ln w="19050">
+            <a:tailEnd type="triangle"/>
+          </a:ln>
+        </p:spPr>
+        <p:style>
+          <a:lnRef idx="1">
+            <a:schemeClr val="accent1"/>
+          </a:lnRef>
+          <a:fillRef idx="0">
+            <a:schemeClr val="accent1"/>
+          </a:fillRef>
+          <a:effectRef idx="0">
+            <a:schemeClr val="accent1"/>
+          </a:effectRef>
+          <a:fontRef idx="minor">
+            <a:schemeClr val="tx1"/>
+          </a:fontRef>
+        </p:style>
+      </p:cxnSp>
+      <p:cxnSp>
+        <p:nvCxnSpPr>
+          <p:cNvPr id="26" name="f kube-controller t keda">
+            <a:extLst>
+              <a:ext uri="{FF2B5EF4-FFF2-40B4-BE49-F238E27FC236}">
+                <a16:creationId xmlns:a16="http://schemas.microsoft.com/office/drawing/2014/main" id="{D7A96EEA-1FB1-EA42-9B9E-A77AB18ADDBB}"/>
+              </a:ext>
+            </a:extLst>
+          </p:cNvPr>
+          <p:cNvCxnSpPr>
+            <a:cxnSpLocks/>
+          </p:cNvCxnSpPr>
+          <p:nvPr/>
+        </p:nvCxnSpPr>
+        <p:spPr>
+          <a:xfrm>
+            <a:off x="4317023" y="1490472"/>
+            <a:ext cx="1846033" cy="944997"/>
+          </a:xfrm>
+          <a:prstGeom prst="straightConnector1">
+            <a:avLst/>
+          </a:prstGeom>
+          <a:ln w="19050">
+            <a:tailEnd type="triangle"/>
+          </a:ln>
+        </p:spPr>
+        <p:style>
+          <a:lnRef idx="1">
+            <a:schemeClr val="accent1"/>
+          </a:lnRef>
+          <a:fillRef idx="0">
+            <a:schemeClr val="accent1"/>
+          </a:fillRef>
+          <a:effectRef idx="0">
+            <a:schemeClr val="accent1"/>
+          </a:effectRef>
+          <a:fontRef idx="minor">
+            <a:schemeClr val="tx1"/>
+          </a:fontRef>
+        </p:style>
+      </p:cxnSp>
+      <p:cxnSp>
+        <p:nvCxnSpPr>
+          <p:cNvPr id="29" name="f kube-controller t keda">
+            <a:extLst>
+              <a:ext uri="{FF2B5EF4-FFF2-40B4-BE49-F238E27FC236}">
+                <a16:creationId xmlns:a16="http://schemas.microsoft.com/office/drawing/2014/main" id="{A80E60B8-C3DF-D246-95C0-FC7BFEAAB6E2}"/>
+              </a:ext>
+            </a:extLst>
+          </p:cNvPr>
+          <p:cNvCxnSpPr>
+            <a:cxnSpLocks/>
+          </p:cNvCxnSpPr>
+          <p:nvPr/>
+        </p:nvCxnSpPr>
+        <p:spPr>
+          <a:xfrm>
+            <a:off x="3569676" y="1798716"/>
+            <a:ext cx="0" cy="636753"/>
+          </a:xfrm>
+          <a:prstGeom prst="straightConnector1">
+            <a:avLst/>
+          </a:prstGeom>
+          <a:ln w="19050">
+            <a:tailEnd type="triangle"/>
+          </a:ln>
+        </p:spPr>
+        <p:style>
+          <a:lnRef idx="1">
+            <a:schemeClr val="accent1"/>
+          </a:lnRef>
+          <a:fillRef idx="0">
+            <a:schemeClr val="accent1"/>
+          </a:fillRef>
+          <a:effectRef idx="0">
+            <a:schemeClr val="accent1"/>
+          </a:effectRef>
+          <a:fontRef idx="minor">
+            <a:schemeClr val="tx1"/>
+          </a:fontRef>
+        </p:style>
+      </p:cxnSp>
+      <p:sp>
+        <p:nvSpPr>
+          <p:cNvPr id="33" name="text 1 to more">
+            <a:extLst>
+              <a:ext uri="{FF2B5EF4-FFF2-40B4-BE49-F238E27FC236}">
+                <a16:creationId xmlns:a16="http://schemas.microsoft.com/office/drawing/2014/main" id="{75B8D7EA-8044-7545-ACDC-6EE16C626637}"/>
+              </a:ext>
+            </a:extLst>
+          </p:cNvPr>
+          <p:cNvSpPr txBox="1"/>
+          <p:nvPr/>
+        </p:nvSpPr>
+        <p:spPr>
+          <a:xfrm>
+            <a:off x="2638040" y="1904692"/>
+            <a:ext cx="2049497" cy="338554"/>
+          </a:xfrm>
+          <a:prstGeom prst="rect">
+            <a:avLst/>
+          </a:prstGeom>
+          <a:noFill/>
+        </p:spPr>
+        <p:txBody>
+          <a:bodyPr wrap="square" rtlCol="0">
+            <a:spAutoFit/>
+          </a:bodyPr>
+          <a:lstStyle/>
+          <a:p>
+            <a:r>
+              <a:rPr lang="en-US" sz="1600" dirty="0"/>
+              <a:t>1 to more / more to 1</a:t>
             </a:r>
           </a:p>
         </p:txBody>
@@ -4889,7 +5069,7 @@
                             </p:stCondLst>
                             <p:childTnLst>
                               <p:par>
-                                <p:cTn id="40" presetID="10" presetClass="entr" presetSubtype="0" fill="hold" grpId="0" nodeType="clickEffect">
+                                <p:cTn id="40" presetID="10" presetClass="entr" presetSubtype="0" fill="hold" nodeType="clickEffect">
                                   <p:stCondLst>
                                     <p:cond delay="0"/>
                                   </p:stCondLst>
@@ -4897,6 +5077,121 @@
                                     <p:set>
                                       <p:cBhvr>
                                         <p:cTn id="41" dur="1" fill="hold">
+                                          <p:stCondLst>
+                                            <p:cond delay="0"/>
+                                          </p:stCondLst>
+                                        </p:cTn>
+                                        <p:tgtEl>
+                                          <p:spTgt spid="54"/>
+                                        </p:tgtEl>
+                                        <p:attrNameLst>
+                                          <p:attrName>style.visibility</p:attrName>
+                                        </p:attrNameLst>
+                                      </p:cBhvr>
+                                      <p:to>
+                                        <p:strVal val="visible"/>
+                                      </p:to>
+                                    </p:set>
+                                    <p:animEffect transition="in" filter="fade">
+                                      <p:cBhvr>
+                                        <p:cTn id="42" dur="500"/>
+                                        <p:tgtEl>
+                                          <p:spTgt spid="54"/>
+                                        </p:tgtEl>
+                                      </p:cBhvr>
+                                    </p:animEffect>
+                                  </p:childTnLst>
+                                </p:cTn>
+                              </p:par>
+                              <p:par>
+                                <p:cTn id="43" presetID="1" presetClass="exit" presetSubtype="0" fill="hold" nodeType="withEffect">
+                                  <p:stCondLst>
+                                    <p:cond delay="0"/>
+                                  </p:stCondLst>
+                                  <p:childTnLst>
+                                    <p:set>
+                                      <p:cBhvr>
+                                        <p:cTn id="44" dur="1" fill="hold">
+                                          <p:stCondLst>
+                                            <p:cond delay="0"/>
+                                          </p:stCondLst>
+                                        </p:cTn>
+                                        <p:tgtEl>
+                                          <p:spTgt spid="24"/>
+                                        </p:tgtEl>
+                                        <p:attrNameLst>
+                                          <p:attrName>style.visibility</p:attrName>
+                                        </p:attrNameLst>
+                                      </p:cBhvr>
+                                      <p:to>
+                                        <p:strVal val="hidden"/>
+                                      </p:to>
+                                    </p:set>
+                                  </p:childTnLst>
+                                </p:cTn>
+                              </p:par>
+                            </p:childTnLst>
+                          </p:cTn>
+                        </p:par>
+                      </p:childTnLst>
+                    </p:cTn>
+                  </p:par>
+                  <p:par>
+                    <p:cTn id="45" fill="hold">
+                      <p:stCondLst>
+                        <p:cond delay="indefinite"/>
+                      </p:stCondLst>
+                      <p:childTnLst>
+                        <p:par>
+                          <p:cTn id="46" fill="hold">
+                            <p:stCondLst>
+                              <p:cond delay="0"/>
+                            </p:stCondLst>
+                            <p:childTnLst>
+                              <p:par>
+                                <p:cTn id="47" presetID="10" presetClass="entr" presetSubtype="0" fill="hold" nodeType="clickEffect">
+                                  <p:stCondLst>
+                                    <p:cond delay="0"/>
+                                  </p:stCondLst>
+                                  <p:childTnLst>
+                                    <p:set>
+                                      <p:cBhvr>
+                                        <p:cTn id="48" dur="1" fill="hold">
+                                          <p:stCondLst>
+                                            <p:cond delay="0"/>
+                                          </p:stCondLst>
+                                        </p:cTn>
+                                        <p:tgtEl>
+                                          <p:spTgt spid="27"/>
+                                        </p:tgtEl>
+                                        <p:attrNameLst>
+                                          <p:attrName>style.visibility</p:attrName>
+                                        </p:attrNameLst>
+                                      </p:cBhvr>
+                                      <p:to>
+                                        <p:strVal val="visible"/>
+                                      </p:to>
+                                    </p:set>
+                                    <p:animEffect transition="in" filter="fade">
+                                      <p:cBhvr>
+                                        <p:cTn id="49" dur="500"/>
+                                        <p:tgtEl>
+                                          <p:spTgt spid="27"/>
+                                        </p:tgtEl>
+                                      </p:cBhvr>
+                                    </p:animEffect>
+                                  </p:childTnLst>
+                                </p:cTn>
+                              </p:par>
+                              <p:par>
+                                <p:cTn id="50" presetID="10" presetClass="entr" presetSubtype="0" fill="hold" grpId="0" nodeType="withEffect">
+                                  <p:stCondLst>
+                                    <p:cond delay="0"/>
+                                  </p:stCondLst>
+                                  <p:childTnLst>
+                                    <p:set>
+                                      <p:cBhvr>
+                                        <p:cTn id="51" dur="1" fill="hold">
                                           <p:stCondLst>
                                             <p:cond delay="0"/>
                                           </p:stCondLst>
@@ -4914,7 +5209,7 @@
                                     </p:set>
                                     <p:animEffect transition="in" filter="fade">
                                       <p:cBhvr>
-                                        <p:cTn id="42" dur="500"/>
+                                        <p:cTn id="52" dur="500"/>
                                         <p:tgtEl>
                                           <p:spTgt spid="30"/>
                                         </p:tgtEl>
@@ -4923,21 +5218,39 @@
                                   </p:childTnLst>
                                 </p:cTn>
                               </p:par>
+                            </p:childTnLst>
+                          </p:cTn>
+                        </p:par>
+                      </p:childTnLst>
+                    </p:cTn>
+                  </p:par>
+                  <p:par>
+                    <p:cTn id="53" fill="hold">
+                      <p:stCondLst>
+                        <p:cond delay="indefinite"/>
+                      </p:stCondLst>
+                      <p:childTnLst>
+                        <p:par>
+                          <p:cTn id="54" fill="hold">
+                            <p:stCondLst>
+                              <p:cond delay="0"/>
+                            </p:stCondLst>
+                            <p:childTnLst>
                               <p:par>
-                                <p:cTn id="43" presetID="10" presetClass="entr" presetSubtype="0" fill="hold" nodeType="withEffect">
+                                <p:cTn id="55" presetID="10" presetClass="entr" presetSubtype="0" fill="hold" nodeType="clickEffect">
                                   <p:stCondLst>
                                     <p:cond delay="0"/>
                                   </p:stCondLst>
                                   <p:childTnLst>
                                     <p:set>
                                       <p:cBhvr>
-                                        <p:cTn id="44" dur="1" fill="hold">
+                                        <p:cTn id="56" dur="1" fill="hold">
                                           <p:stCondLst>
                                             <p:cond delay="0"/>
                                           </p:stCondLst>
                                         </p:cTn>
                                         <p:tgtEl>
-                                          <p:spTgt spid="27"/>
+                                          <p:spTgt spid="20"/>
                                         </p:tgtEl>
                                         <p:attrNameLst>
                                           <p:attrName>style.visibility</p:attrName>
@@ -4949,9 +5262,115 @@
                                     </p:set>
                                     <p:animEffect transition="in" filter="fade">
                                       <p:cBhvr>
-                                        <p:cTn id="45" dur="500"/>
+                                        <p:cTn id="57" dur="500"/>
                                         <p:tgtEl>
-                                          <p:spTgt spid="27"/>
+                                          <p:spTgt spid="20"/>
+                                        </p:tgtEl>
+                                      </p:cBhvr>
+                                    </p:animEffect>
+                                  </p:childTnLst>
+                                </p:cTn>
+                              </p:par>
+                            </p:childTnLst>
+                          </p:cTn>
+                        </p:par>
+                      </p:childTnLst>
+                    </p:cTn>
+                  </p:par>
+                  <p:par>
+                    <p:cTn id="58" fill="hold">
+                      <p:stCondLst>
+                        <p:cond delay="indefinite"/>
+                      </p:stCondLst>
+                      <p:childTnLst>
+                        <p:par>
+                          <p:cTn id="59" fill="hold">
+                            <p:stCondLst>
+                              <p:cond delay="0"/>
+                            </p:stCondLst>
+                            <p:childTnLst>
+                              <p:par>
+                                <p:cTn id="60" presetID="10" presetClass="entr" presetSubtype="0" fill="hold" nodeType="clickEffect">
+                                  <p:stCondLst>
+                                    <p:cond delay="0"/>
+                                  </p:stCondLst>
+                                  <p:childTnLst>
+                                    <p:set>
+                                      <p:cBhvr>
+                                        <p:cTn id="61" dur="1" fill="hold">
+                                          <p:stCondLst>
+                                            <p:cond delay="0"/>
+                                          </p:stCondLst>
+                                        </p:cTn>
+                                        <p:tgtEl>
+                                          <p:spTgt spid="26"/>
+                                        </p:tgtEl>
+                                        <p:attrNameLst>
+                                          <p:attrName>style.visibility</p:attrName>
+                                        </p:attrNameLst>
+                                      </p:cBhvr>
+                                      <p:to>
+                                        <p:strVal val="visible"/>
+                                      </p:to>
+                                    </p:set>
+                                    <p:animEffect transition="in" filter="fade">
+                                      <p:cBhvr>
+                                        <p:cTn id="62" dur="500"/>
+                                        <p:tgtEl>
+                                          <p:spTgt spid="26"/>
+                                        </p:tgtEl>
+                                      </p:cBhvr>
+                                    </p:animEffect>
+                                  </p:childTnLst>
+                                </p:cTn>
+                              </p:par>
+                            </p:childTnLst>
+                          </p:cTn>
+                        </p:par>
+                      </p:childTnLst>
+                    </p:cTn>
+                  </p:par>
+                  <p:par>
+                    <p:cTn id="63" fill="hold">
+                      <p:stCondLst>
+                        <p:cond delay="indefinite"/>
+                      </p:stCondLst>
+                      <p:childTnLst>
+                        <p:par>
+                          <p:cTn id="64" fill="hold">
+                            <p:stCondLst>
+                              <p:cond delay="0"/>
+                            </p:stCondLst>
+                            <p:childTnLst>
+                              <p:par>
+                                <p:cTn id="65" presetID="10" presetClass="entr" presetSubtype="0" fill="hold" nodeType="clickEffect">
+                                  <p:stCondLst>
+                                    <p:cond delay="0"/>
+                                  </p:stCondLst>
+                                  <p:childTnLst>
+                                    <p:set>
+                                      <p:cBhvr>
+                                        <p:cTn id="66" dur="1" fill="hold">
+                                          <p:stCondLst>
+                                            <p:cond delay="0"/>
+                                          </p:stCondLst>
+                                        </p:cTn>
+                                        <p:tgtEl>
+                                          <p:spTgt spid="29"/>
+                                        </p:tgtEl>
+                                        <p:attrNameLst>
+                                          <p:attrName>style.visibility</p:attrName>
+                                        </p:attrNameLst>
+                                      </p:cBhvr>
+                                      <p:to>
+                                        <p:strVal val="visible"/>
+                                      </p:to>
+                                    </p:set>
+                                    <p:animEffect transition="in" filter="fade">
+                                      <p:cBhvr>
+                                        <p:cTn id="67" dur="500"/>
+                                        <p:tgtEl>
+                                          <p:spTgt spid="29"/>
                                         </p:tgtEl>
                                       </p:cBhvr>
                                     </p:animEffect>
@@ -4959,29 +5378,37 @@
                                 </p:cTn>
                               </p:par>
                               <p:par>
-                                <p:cTn id="46" presetID="1" presetClass="exit" presetSubtype="0" fill="hold" nodeType="withEffect">
+                                <p:cTn id="68" presetID="10" presetClass="entr" presetSubtype="0" fill="hold" grpId="0" nodeType="withEffect">
                                   <p:stCondLst>
                                     <p:cond delay="0"/>
                                   </p:stCondLst>
                                   <p:childTnLst>
                                     <p:set>
                                       <p:cBhvr>
-                                        <p:cTn id="47" dur="1" fill="hold">
+                                        <p:cTn id="69" dur="1" fill="hold">
                                           <p:stCondLst>
                                             <p:cond delay="0"/>
                                           </p:stCondLst>
                                         </p:cTn>
                                         <p:tgtEl>
-                                          <p:spTgt spid="24"/>
+                                          <p:spTgt spid="33"/>
                                         </p:tgtEl>
                                         <p:attrNameLst>
                                           <p:attrName>style.visibility</p:attrName>
                                         </p:attrNameLst>
                                       </p:cBhvr>
                                       <p:to>
-                                        <p:strVal val="hidden"/>
+                                        <p:strVal val="visible"/>
                                       </p:to>
                                     </p:set>
+                                    <p:animEffect transition="in" filter="fade">
+                                      <p:cBhvr>
+                                        <p:cTn id="70" dur="500"/>
+                                        <p:tgtEl>
+                                          <p:spTgt spid="33"/>
+                                        </p:tgtEl>
+                                      </p:cBhvr>
+                                    </p:animEffect>
                                   </p:childTnLst>
                                 </p:cTn>
                               </p:par>
@@ -5017,6 +5444,7 @@
       <p:bldP spid="10" grpId="0" animBg="1"/>
       <p:bldP spid="16" grpId="0" animBg="1"/>
       <p:bldP spid="30" grpId="0"/>
+      <p:bldP spid="33" grpId="0"/>
     </p:bldLst>
   </p:timing>
 </p:sld>

</xml_diff>

<commit_message>
Added how HPA without KEDA
</commit_message>
<xml_diff>
--- a/preso.pptx
+++ b/preso.pptx
@@ -7,10 +7,14 @@
   <p:sldIdLst>
     <p:sldId id="256" r:id="rId2"/>
     <p:sldId id="257" r:id="rId3"/>
-    <p:sldId id="258" r:id="rId4"/>
-    <p:sldId id="259" r:id="rId5"/>
-    <p:sldId id="261" r:id="rId6"/>
-    <p:sldId id="260" r:id="rId7"/>
+    <p:sldId id="262" r:id="rId4"/>
+    <p:sldId id="263" r:id="rId5"/>
+    <p:sldId id="258" r:id="rId6"/>
+    <p:sldId id="264" r:id="rId7"/>
+    <p:sldId id="259" r:id="rId8"/>
+    <p:sldId id="261" r:id="rId9"/>
+    <p:sldId id="260" r:id="rId10"/>
+    <p:sldId id="265" r:id="rId11"/>
   </p:sldIdLst>
   <p:sldSz cx="12192000" cy="6858000"/>
   <p:notesSz cx="6858000" cy="9144000"/>
@@ -266,7 +270,7 @@
           <a:p>
             <a:fld id="{7C747D7E-6B19-984E-90F5-E9EEF49EFB72}" type="datetimeFigureOut">
               <a:rPr lang="en-US" smtClean="0"/>
-              <a:t>7/19/20</a:t>
+              <a:t>7/20/20</a:t>
             </a:fld>
             <a:endParaRPr lang="en-US"/>
           </a:p>
@@ -466,7 +470,7 @@
           <a:p>
             <a:fld id="{7C747D7E-6B19-984E-90F5-E9EEF49EFB72}" type="datetimeFigureOut">
               <a:rPr lang="en-US" smtClean="0"/>
-              <a:t>7/19/20</a:t>
+              <a:t>7/20/20</a:t>
             </a:fld>
             <a:endParaRPr lang="en-US"/>
           </a:p>
@@ -676,7 +680,7 @@
           <a:p>
             <a:fld id="{7C747D7E-6B19-984E-90F5-E9EEF49EFB72}" type="datetimeFigureOut">
               <a:rPr lang="en-US" smtClean="0"/>
-              <a:t>7/19/20</a:t>
+              <a:t>7/20/20</a:t>
             </a:fld>
             <a:endParaRPr lang="en-US"/>
           </a:p>
@@ -876,7 +880,7 @@
           <a:p>
             <a:fld id="{7C747D7E-6B19-984E-90F5-E9EEF49EFB72}" type="datetimeFigureOut">
               <a:rPr lang="en-US" smtClean="0"/>
-              <a:t>7/19/20</a:t>
+              <a:t>7/20/20</a:t>
             </a:fld>
             <a:endParaRPr lang="en-US"/>
           </a:p>
@@ -1152,7 +1156,7 @@
           <a:p>
             <a:fld id="{7C747D7E-6B19-984E-90F5-E9EEF49EFB72}" type="datetimeFigureOut">
               <a:rPr lang="en-US" smtClean="0"/>
-              <a:t>7/19/20</a:t>
+              <a:t>7/20/20</a:t>
             </a:fld>
             <a:endParaRPr lang="en-US"/>
           </a:p>
@@ -1420,7 +1424,7 @@
           <a:p>
             <a:fld id="{7C747D7E-6B19-984E-90F5-E9EEF49EFB72}" type="datetimeFigureOut">
               <a:rPr lang="en-US" smtClean="0"/>
-              <a:t>7/19/20</a:t>
+              <a:t>7/20/20</a:t>
             </a:fld>
             <a:endParaRPr lang="en-US"/>
           </a:p>
@@ -1835,7 +1839,7 @@
           <a:p>
             <a:fld id="{7C747D7E-6B19-984E-90F5-E9EEF49EFB72}" type="datetimeFigureOut">
               <a:rPr lang="en-US" smtClean="0"/>
-              <a:t>7/19/20</a:t>
+              <a:t>7/20/20</a:t>
             </a:fld>
             <a:endParaRPr lang="en-US"/>
           </a:p>
@@ -1977,7 +1981,7 @@
           <a:p>
             <a:fld id="{7C747D7E-6B19-984E-90F5-E9EEF49EFB72}" type="datetimeFigureOut">
               <a:rPr lang="en-US" smtClean="0"/>
-              <a:t>7/19/20</a:t>
+              <a:t>7/20/20</a:t>
             </a:fld>
             <a:endParaRPr lang="en-US"/>
           </a:p>
@@ -2090,7 +2094,7 @@
           <a:p>
             <a:fld id="{7C747D7E-6B19-984E-90F5-E9EEF49EFB72}" type="datetimeFigureOut">
               <a:rPr lang="en-US" smtClean="0"/>
-              <a:t>7/19/20</a:t>
+              <a:t>7/20/20</a:t>
             </a:fld>
             <a:endParaRPr lang="en-US"/>
           </a:p>
@@ -2403,7 +2407,7 @@
           <a:p>
             <a:fld id="{7C747D7E-6B19-984E-90F5-E9EEF49EFB72}" type="datetimeFigureOut">
               <a:rPr lang="en-US" smtClean="0"/>
-              <a:t>7/19/20</a:t>
+              <a:t>7/20/20</a:t>
             </a:fld>
             <a:endParaRPr lang="en-US"/>
           </a:p>
@@ -2692,7 +2696,7 @@
           <a:p>
             <a:fld id="{7C747D7E-6B19-984E-90F5-E9EEF49EFB72}" type="datetimeFigureOut">
               <a:rPr lang="en-US" smtClean="0"/>
-              <a:t>7/19/20</a:t>
+              <a:t>7/20/20</a:t>
             </a:fld>
             <a:endParaRPr lang="en-US"/>
           </a:p>
@@ -2935,7 +2939,7 @@
           <a:p>
             <a:fld id="{7C747D7E-6B19-984E-90F5-E9EEF49EFB72}" type="datetimeFigureOut">
               <a:rPr lang="en-US" smtClean="0"/>
-              <a:t>7/19/20</a:t>
+              <a:t>7/20/20</a:t>
             </a:fld>
             <a:endParaRPr lang="en-US"/>
           </a:p>
@@ -3439,6 +3443,1823 @@
 </p:sld>
 </file>
 
+<file path=ppt/slides/slide10.xml><?xml version="1.0" encoding="utf-8"?>
+<p:sld xmlns:a="http://schemas.openxmlformats.org/drawingml/2006/main" xmlns:r="http://schemas.openxmlformats.org/officeDocument/2006/relationships" xmlns:p="http://schemas.openxmlformats.org/presentationml/2006/main">
+  <p:cSld>
+    <p:spTree>
+      <p:nvGrpSpPr>
+        <p:cNvPr id="1" name=""/>
+        <p:cNvGrpSpPr/>
+        <p:nvPr/>
+      </p:nvGrpSpPr>
+      <p:grpSpPr>
+        <a:xfrm>
+          <a:off x="0" y="0"/>
+          <a:ext cx="0" cy="0"/>
+          <a:chOff x="0" y="0"/>
+          <a:chExt cx="0" cy="0"/>
+        </a:xfrm>
+      </p:grpSpPr>
+      <p:cxnSp>
+        <p:nvCxnSpPr>
+          <p:cNvPr id="54" name="f keda t myscaler">
+            <a:extLst>
+              <a:ext uri="{FF2B5EF4-FFF2-40B4-BE49-F238E27FC236}">
+                <a16:creationId xmlns:a16="http://schemas.microsoft.com/office/drawing/2014/main" id="{F7E50F71-C4E2-1D4B-8374-2E7427CFF4F5}"/>
+              </a:ext>
+            </a:extLst>
+          </p:cNvPr>
+          <p:cNvCxnSpPr>
+            <a:cxnSpLocks/>
+          </p:cNvCxnSpPr>
+          <p:nvPr/>
+        </p:nvCxnSpPr>
+        <p:spPr>
+          <a:xfrm flipV="1">
+            <a:off x="7459106" y="1765025"/>
+            <a:ext cx="0" cy="744804"/>
+          </a:xfrm>
+          <a:prstGeom prst="straightConnector1">
+            <a:avLst/>
+          </a:prstGeom>
+          <a:ln w="19050">
+            <a:tailEnd type="triangle"/>
+          </a:ln>
+        </p:spPr>
+        <p:style>
+          <a:lnRef idx="1">
+            <a:schemeClr val="accent1"/>
+          </a:lnRef>
+          <a:fillRef idx="0">
+            <a:schemeClr val="accent1"/>
+          </a:fillRef>
+          <a:effectRef idx="0">
+            <a:schemeClr val="accent1"/>
+          </a:effectRef>
+          <a:fontRef idx="minor">
+            <a:schemeClr val="tx1"/>
+          </a:fontRef>
+        </p:style>
+      </p:cxnSp>
+      <p:sp>
+        <p:nvSpPr>
+          <p:cNvPr id="4" name="K8s cluster">
+            <a:extLst>
+              <a:ext uri="{FF2B5EF4-FFF2-40B4-BE49-F238E27FC236}">
+                <a16:creationId xmlns:a16="http://schemas.microsoft.com/office/drawing/2014/main" id="{831A18A1-1E23-7A4C-B645-2373E8D3BFE7}"/>
+              </a:ext>
+            </a:extLst>
+          </p:cNvPr>
+          <p:cNvSpPr/>
+          <p:nvPr/>
+        </p:nvSpPr>
+        <p:spPr>
+          <a:xfrm>
+            <a:off x="331694" y="313765"/>
+            <a:ext cx="9088970" cy="6194611"/>
+          </a:xfrm>
+          <a:prstGeom prst="rect">
+            <a:avLst/>
+          </a:prstGeom>
+          <a:noFill/>
+          <a:ln w="38100"/>
+        </p:spPr>
+        <p:style>
+          <a:lnRef idx="2">
+            <a:schemeClr val="accent1">
+              <a:shade val="50000"/>
+            </a:schemeClr>
+          </a:lnRef>
+          <a:fillRef idx="1">
+            <a:schemeClr val="accent1"/>
+          </a:fillRef>
+          <a:effectRef idx="0">
+            <a:schemeClr val="accent1"/>
+          </a:effectRef>
+          <a:fontRef idx="minor">
+            <a:schemeClr val="lt1"/>
+          </a:fontRef>
+        </p:style>
+        <p:txBody>
+          <a:bodyPr rtlCol="0" anchor="ctr"/>
+          <a:lstStyle/>
+          <a:p>
+            <a:pPr algn="ctr"/>
+            <a:endParaRPr lang="en-US"/>
+          </a:p>
+        </p:txBody>
+      </p:sp>
+      <p:sp>
+        <p:nvSpPr>
+          <p:cNvPr id="9" name="Target">
+            <a:extLst>
+              <a:ext uri="{FF2B5EF4-FFF2-40B4-BE49-F238E27FC236}">
+                <a16:creationId xmlns:a16="http://schemas.microsoft.com/office/drawing/2014/main" id="{F3274F57-36FD-354F-8767-4F02319800B1}"/>
+              </a:ext>
+            </a:extLst>
+          </p:cNvPr>
+          <p:cNvSpPr/>
+          <p:nvPr/>
+        </p:nvSpPr>
+        <p:spPr>
+          <a:xfrm>
+            <a:off x="3146722" y="2540660"/>
+            <a:ext cx="880217" cy="666571"/>
+          </a:xfrm>
+          <a:prstGeom prst="rect">
+            <a:avLst/>
+          </a:prstGeom>
+        </p:spPr>
+        <p:style>
+          <a:lnRef idx="2">
+            <a:schemeClr val="accent6">
+              <a:shade val="50000"/>
+            </a:schemeClr>
+          </a:lnRef>
+          <a:fillRef idx="1">
+            <a:schemeClr val="accent6"/>
+          </a:fillRef>
+          <a:effectRef idx="0">
+            <a:schemeClr val="accent6"/>
+          </a:effectRef>
+          <a:fontRef idx="minor">
+            <a:schemeClr val="lt1"/>
+          </a:fontRef>
+        </p:style>
+        <p:txBody>
+          <a:bodyPr rtlCol="0" anchor="ctr"/>
+          <a:lstStyle/>
+          <a:p>
+            <a:pPr algn="ctr"/>
+            <a:r>
+              <a:rPr lang="en-US" dirty="0"/>
+              <a:t>Target</a:t>
+            </a:r>
+          </a:p>
+        </p:txBody>
+      </p:sp>
+      <p:sp>
+        <p:nvSpPr>
+          <p:cNvPr id="10" name="ScaledObject">
+            <a:extLst>
+              <a:ext uri="{FF2B5EF4-FFF2-40B4-BE49-F238E27FC236}">
+                <a16:creationId xmlns:a16="http://schemas.microsoft.com/office/drawing/2014/main" id="{2A7FA6F1-4E2E-7E43-92D1-7F65E9E18730}"/>
+              </a:ext>
+            </a:extLst>
+          </p:cNvPr>
+          <p:cNvSpPr/>
+          <p:nvPr/>
+        </p:nvSpPr>
+        <p:spPr>
+          <a:xfrm>
+            <a:off x="2917147" y="4559148"/>
+            <a:ext cx="1196411" cy="1158626"/>
+          </a:xfrm>
+          <a:prstGeom prst="ellipse">
+            <a:avLst/>
+          </a:prstGeom>
+        </p:spPr>
+        <p:style>
+          <a:lnRef idx="2">
+            <a:schemeClr val="accent2">
+              <a:shade val="50000"/>
+            </a:schemeClr>
+          </a:lnRef>
+          <a:fillRef idx="1">
+            <a:schemeClr val="accent2"/>
+          </a:fillRef>
+          <a:effectRef idx="0">
+            <a:schemeClr val="accent2"/>
+          </a:effectRef>
+          <a:fontRef idx="minor">
+            <a:schemeClr val="lt1"/>
+          </a:fontRef>
+        </p:style>
+        <p:txBody>
+          <a:bodyPr rtlCol="0" anchor="ctr" anchorCtr="1"/>
+          <a:lstStyle/>
+          <a:p>
+            <a:pPr algn="ctr"/>
+            <a:r>
+              <a:rPr lang="en-US"/>
+              <a:t>ScaledObject</a:t>
+            </a:r>
+            <a:endParaRPr lang="en-US" dirty="0"/>
+          </a:p>
+        </p:txBody>
+      </p:sp>
+      <p:pic>
+        <p:nvPicPr>
+          <p:cNvPr id="12" name="K8s logo" descr="Kubernetes - Wikipedia">
+            <a:extLst>
+              <a:ext uri="{FF2B5EF4-FFF2-40B4-BE49-F238E27FC236}">
+                <a16:creationId xmlns:a16="http://schemas.microsoft.com/office/drawing/2014/main" id="{3887F463-ACD4-1346-B765-EFF06E10AFE3}"/>
+              </a:ext>
+            </a:extLst>
+          </p:cNvPr>
+          <p:cNvPicPr>
+            <a:picLocks noChangeAspect="1" noChangeArrowheads="1"/>
+          </p:cNvPicPr>
+          <p:nvPr/>
+        </p:nvPicPr>
+        <p:blipFill>
+          <a:blip r:embed="rId2">
+            <a:extLst>
+              <a:ext uri="{28A0092B-C50C-407E-A947-70E740481C1C}">
+                <a14:useLocalDpi xmlns:a14="http://schemas.microsoft.com/office/drawing/2010/main" val="0"/>
+              </a:ext>
+            </a:extLst>
+          </a:blip>
+          <a:srcRect/>
+          <a:stretch>
+            <a:fillRect/>
+          </a:stretch>
+        </p:blipFill>
+        <p:spPr bwMode="auto">
+          <a:xfrm>
+            <a:off x="8778165" y="342899"/>
+            <a:ext cx="535159" cy="519525"/>
+          </a:xfrm>
+          <a:prstGeom prst="rect">
+            <a:avLst/>
+          </a:prstGeom>
+          <a:noFill/>
+          <a:extLst>
+            <a:ext uri="{909E8E84-426E-40DD-AFC4-6F175D3DCCD1}">
+              <a14:hiddenFill xmlns:a14="http://schemas.microsoft.com/office/drawing/2010/main">
+                <a:solidFill>
+                  <a:srgbClr val="FFFFFF"/>
+                </a:solidFill>
+              </a14:hiddenFill>
+            </a:ext>
+          </a:extLst>
+        </p:spPr>
+      </p:pic>
+      <p:sp>
+        <p:nvSpPr>
+          <p:cNvPr id="7" name="KEDA operator">
+            <a:extLst>
+              <a:ext uri="{FF2B5EF4-FFF2-40B4-BE49-F238E27FC236}">
+                <a16:creationId xmlns:a16="http://schemas.microsoft.com/office/drawing/2014/main" id="{3011F17D-3568-A14B-AEF5-7FC060455641}"/>
+              </a:ext>
+            </a:extLst>
+          </p:cNvPr>
+          <p:cNvSpPr/>
+          <p:nvPr/>
+        </p:nvSpPr>
+        <p:spPr>
+          <a:xfrm>
+            <a:off x="6870361" y="2582713"/>
+            <a:ext cx="1196411" cy="1330267"/>
+          </a:xfrm>
+          <a:prstGeom prst="rect">
+            <a:avLst/>
+          </a:prstGeom>
+        </p:spPr>
+        <p:style>
+          <a:lnRef idx="2">
+            <a:schemeClr val="accent2">
+              <a:shade val="50000"/>
+            </a:schemeClr>
+          </a:lnRef>
+          <a:fillRef idx="1">
+            <a:schemeClr val="accent2"/>
+          </a:fillRef>
+          <a:effectRef idx="0">
+            <a:schemeClr val="accent2"/>
+          </a:effectRef>
+          <a:fontRef idx="minor">
+            <a:schemeClr val="lt1"/>
+          </a:fontRef>
+        </p:style>
+        <p:txBody>
+          <a:bodyPr rtlCol="0" anchor="ctr" anchorCtr="1"/>
+          <a:lstStyle/>
+          <a:p>
+            <a:pPr algn="ctr"/>
+            <a:endParaRPr lang="en-US" dirty="0"/>
+          </a:p>
+        </p:txBody>
+      </p:sp>
+      <p:pic>
+        <p:nvPicPr>
+          <p:cNvPr id="13" name="KEDA logo">
+            <a:extLst>
+              <a:ext uri="{FF2B5EF4-FFF2-40B4-BE49-F238E27FC236}">
+                <a16:creationId xmlns:a16="http://schemas.microsoft.com/office/drawing/2014/main" id="{F26A7939-E93E-BA49-9C24-1A261D50F337}"/>
+              </a:ext>
+            </a:extLst>
+          </p:cNvPr>
+          <p:cNvPicPr>
+            <a:picLocks noChangeAspect="1" noChangeArrowheads="1"/>
+          </p:cNvPicPr>
+          <p:nvPr/>
+        </p:nvPicPr>
+        <p:blipFill>
+          <a:blip r:embed="rId3">
+            <a:extLst>
+              <a:ext uri="{28A0092B-C50C-407E-A947-70E740481C1C}">
+                <a14:useLocalDpi xmlns:a14="http://schemas.microsoft.com/office/drawing/2010/main" val="0"/>
+              </a:ext>
+            </a:extLst>
+          </a:blip>
+          <a:srcRect/>
+          <a:stretch>
+            <a:fillRect/>
+          </a:stretch>
+        </p:blipFill>
+        <p:spPr bwMode="auto">
+          <a:xfrm>
+            <a:off x="7090002" y="3022821"/>
+            <a:ext cx="757131" cy="295017"/>
+          </a:xfrm>
+          <a:prstGeom prst="rect">
+            <a:avLst/>
+          </a:prstGeom>
+          <a:noFill/>
+          <a:extLst>
+            <a:ext uri="{909E8E84-426E-40DD-AFC4-6F175D3DCCD1}">
+              <a14:hiddenFill xmlns:a14="http://schemas.microsoft.com/office/drawing/2010/main">
+                <a:solidFill>
+                  <a:srgbClr val="FFFFFF"/>
+                </a:solidFill>
+              </a14:hiddenFill>
+            </a:ext>
+          </a:extLst>
+        </p:spPr>
+      </p:pic>
+      <p:sp>
+        <p:nvSpPr>
+          <p:cNvPr id="14" name="Text Operator">
+            <a:extLst>
+              <a:ext uri="{FF2B5EF4-FFF2-40B4-BE49-F238E27FC236}">
+                <a16:creationId xmlns:a16="http://schemas.microsoft.com/office/drawing/2014/main" id="{CE8879E2-085A-4942-A33C-01270229D3F5}"/>
+              </a:ext>
+            </a:extLst>
+          </p:cNvPr>
+          <p:cNvSpPr txBox="1"/>
+          <p:nvPr/>
+        </p:nvSpPr>
+        <p:spPr>
+          <a:xfrm>
+            <a:off x="6951181" y="3277332"/>
+            <a:ext cx="1034770" cy="369332"/>
+          </a:xfrm>
+          <a:prstGeom prst="rect">
+            <a:avLst/>
+          </a:prstGeom>
+          <a:noFill/>
+        </p:spPr>
+        <p:txBody>
+          <a:bodyPr wrap="none" rtlCol="0">
+            <a:spAutoFit/>
+          </a:bodyPr>
+          <a:lstStyle/>
+          <a:p>
+            <a:r>
+              <a:rPr lang="en-US" dirty="0">
+                <a:solidFill>
+                  <a:schemeClr val="bg1"/>
+                </a:solidFill>
+              </a:rPr>
+              <a:t>Operator</a:t>
+            </a:r>
+          </a:p>
+        </p:txBody>
+      </p:sp>
+      <p:sp>
+        <p:nvSpPr>
+          <p:cNvPr id="16" name="hpa">
+            <a:extLst>
+              <a:ext uri="{FF2B5EF4-FFF2-40B4-BE49-F238E27FC236}">
+                <a16:creationId xmlns:a16="http://schemas.microsoft.com/office/drawing/2014/main" id="{B3BA1375-15CB-AA4E-93F5-EC9DDE8B0A99}"/>
+              </a:ext>
+            </a:extLst>
+          </p:cNvPr>
+          <p:cNvSpPr/>
+          <p:nvPr/>
+        </p:nvSpPr>
+        <p:spPr>
+          <a:xfrm>
+            <a:off x="926997" y="2846450"/>
+            <a:ext cx="864188" cy="843811"/>
+          </a:xfrm>
+          <a:prstGeom prst="ellipse">
+            <a:avLst/>
+          </a:prstGeom>
+          <a:solidFill>
+            <a:srgbClr val="316AE1"/>
+          </a:solidFill>
+        </p:spPr>
+        <p:style>
+          <a:lnRef idx="2">
+            <a:schemeClr val="accent1">
+              <a:shade val="50000"/>
+            </a:schemeClr>
+          </a:lnRef>
+          <a:fillRef idx="1">
+            <a:schemeClr val="accent1"/>
+          </a:fillRef>
+          <a:effectRef idx="0">
+            <a:schemeClr val="accent1"/>
+          </a:effectRef>
+          <a:fontRef idx="minor">
+            <a:schemeClr val="lt1"/>
+          </a:fontRef>
+        </p:style>
+        <p:txBody>
+          <a:bodyPr rtlCol="0" anchor="ctr"/>
+          <a:lstStyle/>
+          <a:p>
+            <a:pPr algn="ctr"/>
+            <a:r>
+              <a:rPr lang="en-US" dirty="0"/>
+              <a:t>HPA</a:t>
+            </a:r>
+          </a:p>
+        </p:txBody>
+      </p:sp>
+      <p:sp>
+        <p:nvSpPr>
+          <p:cNvPr id="17" name="Kube Controller">
+            <a:extLst>
+              <a:ext uri="{FF2B5EF4-FFF2-40B4-BE49-F238E27FC236}">
+                <a16:creationId xmlns:a16="http://schemas.microsoft.com/office/drawing/2014/main" id="{D84E5641-BF98-E24B-8255-81666D6EA61E}"/>
+              </a:ext>
+            </a:extLst>
+          </p:cNvPr>
+          <p:cNvSpPr/>
+          <p:nvPr/>
+        </p:nvSpPr>
+        <p:spPr>
+          <a:xfrm>
+            <a:off x="2917147" y="869149"/>
+            <a:ext cx="1304871" cy="850391"/>
+          </a:xfrm>
+          <a:prstGeom prst="rect">
+            <a:avLst/>
+          </a:prstGeom>
+          <a:solidFill>
+            <a:srgbClr val="316AE1"/>
+          </a:solidFill>
+        </p:spPr>
+        <p:style>
+          <a:lnRef idx="2">
+            <a:schemeClr val="accent1">
+              <a:shade val="50000"/>
+            </a:schemeClr>
+          </a:lnRef>
+          <a:fillRef idx="1">
+            <a:schemeClr val="accent1"/>
+          </a:fillRef>
+          <a:effectRef idx="0">
+            <a:schemeClr val="accent1"/>
+          </a:effectRef>
+          <a:fontRef idx="minor">
+            <a:schemeClr val="lt1"/>
+          </a:fontRef>
+        </p:style>
+        <p:txBody>
+          <a:bodyPr rtlCol="0" anchor="ctr"/>
+          <a:lstStyle/>
+          <a:p>
+            <a:pPr algn="ctr"/>
+            <a:r>
+              <a:rPr lang="en-US" dirty="0"/>
+              <a:t>Kubernetes Controllers</a:t>
+            </a:r>
+          </a:p>
+        </p:txBody>
+      </p:sp>
+      <p:pic>
+        <p:nvPicPr>
+          <p:cNvPr id="3" name="kubectl" descr="Captain">
+            <a:extLst>
+              <a:ext uri="{FF2B5EF4-FFF2-40B4-BE49-F238E27FC236}">
+                <a16:creationId xmlns:a16="http://schemas.microsoft.com/office/drawing/2014/main" id="{A49EA59F-653C-1A46-879F-81E0DDE5BF50}"/>
+              </a:ext>
+            </a:extLst>
+          </p:cNvPr>
+          <p:cNvPicPr>
+            <a:picLocks noChangeAspect="1"/>
+          </p:cNvPicPr>
+          <p:nvPr/>
+        </p:nvPicPr>
+        <p:blipFill>
+          <a:blip r:embed="rId4">
+            <a:extLst>
+              <a:ext uri="{96DAC541-7B7A-43D3-8B79-37D633B846F1}">
+                <asvg:svgBlip xmlns:asvg="http://schemas.microsoft.com/office/drawing/2016/SVG/main" r:embed="rId5"/>
+              </a:ext>
+            </a:extLst>
+          </a:blip>
+          <a:stretch>
+            <a:fillRect/>
+          </a:stretch>
+        </p:blipFill>
+        <p:spPr>
+          <a:xfrm>
+            <a:off x="9877864" y="4794496"/>
+            <a:ext cx="914400" cy="914400"/>
+          </a:xfrm>
+          <a:prstGeom prst="rect">
+            <a:avLst/>
+          </a:prstGeom>
+        </p:spPr>
+      </p:pic>
+      <p:cxnSp>
+        <p:nvCxnSpPr>
+          <p:cNvPr id="6" name="f kubectl t target" descr="Create Target">
+            <a:extLst>
+              <a:ext uri="{FF2B5EF4-FFF2-40B4-BE49-F238E27FC236}">
+                <a16:creationId xmlns:a16="http://schemas.microsoft.com/office/drawing/2014/main" id="{6BFBE3E5-A16E-BE49-82A0-1F8B2BA31DEA}"/>
+              </a:ext>
+            </a:extLst>
+          </p:cNvPr>
+          <p:cNvCxnSpPr>
+            <a:cxnSpLocks/>
+          </p:cNvCxnSpPr>
+          <p:nvPr/>
+        </p:nvCxnSpPr>
+        <p:spPr>
+          <a:xfrm flipH="1" flipV="1">
+            <a:off x="4113559" y="3165920"/>
+            <a:ext cx="5667898" cy="1734166"/>
+          </a:xfrm>
+          <a:prstGeom prst="straightConnector1">
+            <a:avLst/>
+          </a:prstGeom>
+          <a:ln w="19050">
+            <a:tailEnd type="triangle"/>
+          </a:ln>
+        </p:spPr>
+        <p:style>
+          <a:lnRef idx="1">
+            <a:schemeClr val="accent1"/>
+          </a:lnRef>
+          <a:fillRef idx="0">
+            <a:schemeClr val="accent1"/>
+          </a:fillRef>
+          <a:effectRef idx="0">
+            <a:schemeClr val="accent1"/>
+          </a:effectRef>
+          <a:fontRef idx="minor">
+            <a:schemeClr val="tx1"/>
+          </a:fontRef>
+        </p:style>
+      </p:cxnSp>
+      <p:cxnSp>
+        <p:nvCxnSpPr>
+          <p:cNvPr id="18" name="f kubectl t scaledobject">
+            <a:extLst>
+              <a:ext uri="{FF2B5EF4-FFF2-40B4-BE49-F238E27FC236}">
+                <a16:creationId xmlns:a16="http://schemas.microsoft.com/office/drawing/2014/main" id="{E34D6ADF-6B85-F44C-AD6C-9B0D993ED174}"/>
+              </a:ext>
+            </a:extLst>
+          </p:cNvPr>
+          <p:cNvCxnSpPr>
+            <a:cxnSpLocks/>
+          </p:cNvCxnSpPr>
+          <p:nvPr/>
+        </p:nvCxnSpPr>
+        <p:spPr>
+          <a:xfrm flipH="1" flipV="1">
+            <a:off x="4113560" y="5235996"/>
+            <a:ext cx="5556651" cy="15700"/>
+          </a:xfrm>
+          <a:prstGeom prst="straightConnector1">
+            <a:avLst/>
+          </a:prstGeom>
+          <a:ln w="19050">
+            <a:tailEnd type="triangle"/>
+          </a:ln>
+        </p:spPr>
+        <p:style>
+          <a:lnRef idx="1">
+            <a:schemeClr val="accent1"/>
+          </a:lnRef>
+          <a:fillRef idx="0">
+            <a:schemeClr val="accent1"/>
+          </a:fillRef>
+          <a:effectRef idx="0">
+            <a:schemeClr val="accent1"/>
+          </a:effectRef>
+          <a:fontRef idx="minor">
+            <a:schemeClr val="tx1"/>
+          </a:fontRef>
+        </p:style>
+      </p:cxnSp>
+      <p:cxnSp>
+        <p:nvCxnSpPr>
+          <p:cNvPr id="19" name="f keda t scaledobject">
+            <a:extLst>
+              <a:ext uri="{FF2B5EF4-FFF2-40B4-BE49-F238E27FC236}">
+                <a16:creationId xmlns:a16="http://schemas.microsoft.com/office/drawing/2014/main" id="{78571CD0-531B-1046-8FC5-9D4B9973C12E}"/>
+              </a:ext>
+            </a:extLst>
+          </p:cNvPr>
+          <p:cNvCxnSpPr>
+            <a:cxnSpLocks/>
+          </p:cNvCxnSpPr>
+          <p:nvPr/>
+        </p:nvCxnSpPr>
+        <p:spPr>
+          <a:xfrm flipH="1">
+            <a:off x="4113558" y="3673088"/>
+            <a:ext cx="2585453" cy="1121408"/>
+          </a:xfrm>
+          <a:prstGeom prst="straightConnector1">
+            <a:avLst/>
+          </a:prstGeom>
+          <a:ln w="19050">
+            <a:tailEnd type="triangle"/>
+          </a:ln>
+        </p:spPr>
+        <p:style>
+          <a:lnRef idx="1">
+            <a:schemeClr val="accent1"/>
+          </a:lnRef>
+          <a:fillRef idx="0">
+            <a:schemeClr val="accent1"/>
+          </a:fillRef>
+          <a:effectRef idx="0">
+            <a:schemeClr val="accent1"/>
+          </a:effectRef>
+          <a:fontRef idx="minor">
+            <a:schemeClr val="tx1"/>
+          </a:fontRef>
+        </p:style>
+      </p:cxnSp>
+      <p:cxnSp>
+        <p:nvCxnSpPr>
+          <p:cNvPr id="24" name="f keda t hpa">
+            <a:extLst>
+              <a:ext uri="{FF2B5EF4-FFF2-40B4-BE49-F238E27FC236}">
+                <a16:creationId xmlns:a16="http://schemas.microsoft.com/office/drawing/2014/main" id="{29C1B618-ED74-DA4E-910B-4A831D319BA0}"/>
+              </a:ext>
+            </a:extLst>
+          </p:cNvPr>
+          <p:cNvCxnSpPr>
+            <a:cxnSpLocks/>
+          </p:cNvCxnSpPr>
+          <p:nvPr/>
+        </p:nvCxnSpPr>
+        <p:spPr>
+          <a:xfrm flipH="1" flipV="1">
+            <a:off x="1872005" y="3501273"/>
+            <a:ext cx="4827006" cy="3372"/>
+          </a:xfrm>
+          <a:prstGeom prst="straightConnector1">
+            <a:avLst/>
+          </a:prstGeom>
+          <a:ln w="19050">
+            <a:tailEnd type="triangle"/>
+          </a:ln>
+        </p:spPr>
+        <p:style>
+          <a:lnRef idx="1">
+            <a:schemeClr val="accent1"/>
+          </a:lnRef>
+          <a:fillRef idx="0">
+            <a:schemeClr val="accent1"/>
+          </a:fillRef>
+          <a:effectRef idx="0">
+            <a:schemeClr val="accent1"/>
+          </a:effectRef>
+          <a:fontRef idx="minor">
+            <a:schemeClr val="tx1"/>
+          </a:fontRef>
+        </p:style>
+      </p:cxnSp>
+      <p:cxnSp>
+        <p:nvCxnSpPr>
+          <p:cNvPr id="27" name="f keda t target">
+            <a:extLst>
+              <a:ext uri="{FF2B5EF4-FFF2-40B4-BE49-F238E27FC236}">
+                <a16:creationId xmlns:a16="http://schemas.microsoft.com/office/drawing/2014/main" id="{73037384-DF63-5A4E-9025-3897A31BD834}"/>
+              </a:ext>
+            </a:extLst>
+          </p:cNvPr>
+          <p:cNvCxnSpPr>
+            <a:cxnSpLocks/>
+          </p:cNvCxnSpPr>
+          <p:nvPr/>
+        </p:nvCxnSpPr>
+        <p:spPr>
+          <a:xfrm flipH="1">
+            <a:off x="4113558" y="3046711"/>
+            <a:ext cx="2585453" cy="0"/>
+          </a:xfrm>
+          <a:prstGeom prst="straightConnector1">
+            <a:avLst/>
+          </a:prstGeom>
+          <a:ln w="19050">
+            <a:tailEnd type="triangle"/>
+          </a:ln>
+        </p:spPr>
+        <p:style>
+          <a:lnRef idx="1">
+            <a:schemeClr val="accent1"/>
+          </a:lnRef>
+          <a:fillRef idx="0">
+            <a:schemeClr val="accent1"/>
+          </a:fillRef>
+          <a:effectRef idx="0">
+            <a:schemeClr val="accent1"/>
+          </a:effectRef>
+          <a:fontRef idx="minor">
+            <a:schemeClr val="tx1"/>
+          </a:fontRef>
+        </p:style>
+      </p:cxnSp>
+      <p:sp>
+        <p:nvSpPr>
+          <p:cNvPr id="30" name="TextBox 29">
+            <a:extLst>
+              <a:ext uri="{FF2B5EF4-FFF2-40B4-BE49-F238E27FC236}">
+                <a16:creationId xmlns:a16="http://schemas.microsoft.com/office/drawing/2014/main" id="{14BB70D9-01DF-CF48-BA08-44281E757484}"/>
+              </a:ext>
+            </a:extLst>
+          </p:cNvPr>
+          <p:cNvSpPr txBox="1"/>
+          <p:nvPr/>
+        </p:nvSpPr>
+        <p:spPr>
+          <a:xfrm>
+            <a:off x="4484078" y="2762128"/>
+            <a:ext cx="1504284" cy="338554"/>
+          </a:xfrm>
+          <a:prstGeom prst="rect">
+            <a:avLst/>
+          </a:prstGeom>
+          <a:noFill/>
+        </p:spPr>
+        <p:txBody>
+          <a:bodyPr wrap="square" rtlCol="0">
+            <a:spAutoFit/>
+          </a:bodyPr>
+          <a:lstStyle/>
+          <a:p>
+            <a:r>
+              <a:rPr lang="en-US" sz="1600" dirty="0"/>
+              <a:t>0 to 1 / 1 to 0</a:t>
+            </a:r>
+          </a:p>
+        </p:txBody>
+      </p:sp>
+      <p:cxnSp>
+        <p:nvCxnSpPr>
+          <p:cNvPr id="20" name="f kube-controller t hpa">
+            <a:extLst>
+              <a:ext uri="{FF2B5EF4-FFF2-40B4-BE49-F238E27FC236}">
+                <a16:creationId xmlns:a16="http://schemas.microsoft.com/office/drawing/2014/main" id="{AE957F92-9FE3-924F-8D2E-6A36988151CC}"/>
+              </a:ext>
+            </a:extLst>
+          </p:cNvPr>
+          <p:cNvCxnSpPr>
+            <a:cxnSpLocks/>
+          </p:cNvCxnSpPr>
+          <p:nvPr/>
+        </p:nvCxnSpPr>
+        <p:spPr>
+          <a:xfrm flipH="1">
+            <a:off x="1649339" y="1598064"/>
+            <a:ext cx="1136590" cy="1164064"/>
+          </a:xfrm>
+          <a:prstGeom prst="straightConnector1">
+            <a:avLst/>
+          </a:prstGeom>
+          <a:ln w="19050">
+            <a:tailEnd type="triangle"/>
+          </a:ln>
+        </p:spPr>
+        <p:style>
+          <a:lnRef idx="1">
+            <a:schemeClr val="accent1"/>
+          </a:lnRef>
+          <a:fillRef idx="0">
+            <a:schemeClr val="accent1"/>
+          </a:fillRef>
+          <a:effectRef idx="0">
+            <a:schemeClr val="accent1"/>
+          </a:effectRef>
+          <a:fontRef idx="minor">
+            <a:schemeClr val="tx1"/>
+          </a:fontRef>
+        </p:style>
+      </p:cxnSp>
+      <p:cxnSp>
+        <p:nvCxnSpPr>
+          <p:cNvPr id="26" name="f kube-controller t keda">
+            <a:extLst>
+              <a:ext uri="{FF2B5EF4-FFF2-40B4-BE49-F238E27FC236}">
+                <a16:creationId xmlns:a16="http://schemas.microsoft.com/office/drawing/2014/main" id="{D7A96EEA-1FB1-EA42-9B9E-A77AB18ADDBB}"/>
+              </a:ext>
+            </a:extLst>
+          </p:cNvPr>
+          <p:cNvCxnSpPr>
+            <a:cxnSpLocks/>
+          </p:cNvCxnSpPr>
+          <p:nvPr/>
+        </p:nvCxnSpPr>
+        <p:spPr>
+          <a:xfrm>
+            <a:off x="4317023" y="1490472"/>
+            <a:ext cx="1846033" cy="944997"/>
+          </a:xfrm>
+          <a:prstGeom prst="straightConnector1">
+            <a:avLst/>
+          </a:prstGeom>
+          <a:ln w="19050">
+            <a:tailEnd type="triangle"/>
+          </a:ln>
+        </p:spPr>
+        <p:style>
+          <a:lnRef idx="1">
+            <a:schemeClr val="accent1"/>
+          </a:lnRef>
+          <a:fillRef idx="0">
+            <a:schemeClr val="accent1"/>
+          </a:fillRef>
+          <a:effectRef idx="0">
+            <a:schemeClr val="accent1"/>
+          </a:effectRef>
+          <a:fontRef idx="minor">
+            <a:schemeClr val="tx1"/>
+          </a:fontRef>
+        </p:style>
+      </p:cxnSp>
+      <p:cxnSp>
+        <p:nvCxnSpPr>
+          <p:cNvPr id="29" name="f kube-controller t keda">
+            <a:extLst>
+              <a:ext uri="{FF2B5EF4-FFF2-40B4-BE49-F238E27FC236}">
+                <a16:creationId xmlns:a16="http://schemas.microsoft.com/office/drawing/2014/main" id="{A80E60B8-C3DF-D246-95C0-FC7BFEAAB6E2}"/>
+              </a:ext>
+            </a:extLst>
+          </p:cNvPr>
+          <p:cNvCxnSpPr>
+            <a:cxnSpLocks/>
+          </p:cNvCxnSpPr>
+          <p:nvPr/>
+        </p:nvCxnSpPr>
+        <p:spPr>
+          <a:xfrm>
+            <a:off x="3569676" y="1798716"/>
+            <a:ext cx="0" cy="636753"/>
+          </a:xfrm>
+          <a:prstGeom prst="straightConnector1">
+            <a:avLst/>
+          </a:prstGeom>
+          <a:ln w="19050">
+            <a:tailEnd type="triangle"/>
+          </a:ln>
+        </p:spPr>
+        <p:style>
+          <a:lnRef idx="1">
+            <a:schemeClr val="accent1"/>
+          </a:lnRef>
+          <a:fillRef idx="0">
+            <a:schemeClr val="accent1"/>
+          </a:fillRef>
+          <a:effectRef idx="0">
+            <a:schemeClr val="accent1"/>
+          </a:effectRef>
+          <a:fontRef idx="minor">
+            <a:schemeClr val="tx1"/>
+          </a:fontRef>
+        </p:style>
+      </p:cxnSp>
+      <p:sp>
+        <p:nvSpPr>
+          <p:cNvPr id="33" name="text 1 to more">
+            <a:extLst>
+              <a:ext uri="{FF2B5EF4-FFF2-40B4-BE49-F238E27FC236}">
+                <a16:creationId xmlns:a16="http://schemas.microsoft.com/office/drawing/2014/main" id="{75B8D7EA-8044-7545-ACDC-6EE16C626637}"/>
+              </a:ext>
+            </a:extLst>
+          </p:cNvPr>
+          <p:cNvSpPr txBox="1"/>
+          <p:nvPr/>
+        </p:nvSpPr>
+        <p:spPr>
+          <a:xfrm>
+            <a:off x="2638040" y="1904692"/>
+            <a:ext cx="2049497" cy="338554"/>
+          </a:xfrm>
+          <a:prstGeom prst="rect">
+            <a:avLst/>
+          </a:prstGeom>
+          <a:noFill/>
+        </p:spPr>
+        <p:txBody>
+          <a:bodyPr wrap="square" rtlCol="0">
+            <a:spAutoFit/>
+          </a:bodyPr>
+          <a:lstStyle/>
+          <a:p>
+            <a:r>
+              <a:rPr lang="en-US" sz="1600" dirty="0"/>
+              <a:t>1 to more / more to 1</a:t>
+            </a:r>
+          </a:p>
+        </p:txBody>
+      </p:sp>
+      <p:sp>
+        <p:nvSpPr>
+          <p:cNvPr id="22" name="Rectangle 21">
+            <a:extLst>
+              <a:ext uri="{FF2B5EF4-FFF2-40B4-BE49-F238E27FC236}">
+                <a16:creationId xmlns:a16="http://schemas.microsoft.com/office/drawing/2014/main" id="{9A0C3CE2-1DCE-4346-BF21-6034EA633B06}"/>
+              </a:ext>
+            </a:extLst>
+          </p:cNvPr>
+          <p:cNvSpPr/>
+          <p:nvPr/>
+        </p:nvSpPr>
+        <p:spPr>
+          <a:xfrm>
+            <a:off x="6870361" y="772057"/>
+            <a:ext cx="1094481" cy="889090"/>
+          </a:xfrm>
+          <a:prstGeom prst="rect">
+            <a:avLst/>
+          </a:prstGeom>
+        </p:spPr>
+        <p:style>
+          <a:lnRef idx="2">
+            <a:schemeClr val="accent2">
+              <a:shade val="50000"/>
+            </a:schemeClr>
+          </a:lnRef>
+          <a:fillRef idx="1">
+            <a:schemeClr val="accent2"/>
+          </a:fillRef>
+          <a:effectRef idx="0">
+            <a:schemeClr val="accent2"/>
+          </a:effectRef>
+          <a:fontRef idx="minor">
+            <a:schemeClr val="lt1"/>
+          </a:fontRef>
+        </p:style>
+        <p:txBody>
+          <a:bodyPr rtlCol="0" anchor="ctr"/>
+          <a:lstStyle/>
+          <a:p>
+            <a:pPr algn="ctr"/>
+            <a:r>
+              <a:rPr lang="en-US" dirty="0"/>
+              <a:t>My Scaler</a:t>
+            </a:r>
+          </a:p>
+        </p:txBody>
+      </p:sp>
+    </p:spTree>
+    <p:extLst>
+      <p:ext uri="{BB962C8B-B14F-4D97-AF65-F5344CB8AC3E}">
+        <p14:creationId xmlns:p14="http://schemas.microsoft.com/office/powerpoint/2010/main" val="130098000"/>
+      </p:ext>
+    </p:extLst>
+  </p:cSld>
+  <p:clrMapOvr>
+    <a:masterClrMapping/>
+  </p:clrMapOvr>
+  <p:timing>
+    <p:tnLst>
+      <p:par>
+        <p:cTn id="1" dur="indefinite" restart="never" nodeType="tmRoot">
+          <p:childTnLst>
+            <p:seq concurrent="1" nextAc="seek">
+              <p:cTn id="2" dur="indefinite" nodeType="mainSeq">
+                <p:childTnLst>
+                  <p:par>
+                    <p:cTn id="3" fill="hold">
+                      <p:stCondLst>
+                        <p:cond delay="indefinite"/>
+                      </p:stCondLst>
+                      <p:childTnLst>
+                        <p:par>
+                          <p:cTn id="4" fill="hold">
+                            <p:stCondLst>
+                              <p:cond delay="0"/>
+                            </p:stCondLst>
+                            <p:childTnLst>
+                              <p:par>
+                                <p:cTn id="5" presetID="10" presetClass="entr" presetSubtype="0" fill="hold" grpId="0" nodeType="clickEffect">
+                                  <p:stCondLst>
+                                    <p:cond delay="0"/>
+                                  </p:stCondLst>
+                                  <p:childTnLst>
+                                    <p:set>
+                                      <p:cBhvr>
+                                        <p:cTn id="6" dur="1" fill="hold">
+                                          <p:stCondLst>
+                                            <p:cond delay="0"/>
+                                          </p:stCondLst>
+                                        </p:cTn>
+                                        <p:tgtEl>
+                                          <p:spTgt spid="9"/>
+                                        </p:tgtEl>
+                                        <p:attrNameLst>
+                                          <p:attrName>style.visibility</p:attrName>
+                                        </p:attrNameLst>
+                                      </p:cBhvr>
+                                      <p:to>
+                                        <p:strVal val="visible"/>
+                                      </p:to>
+                                    </p:set>
+                                    <p:animEffect transition="in" filter="fade">
+                                      <p:cBhvr>
+                                        <p:cTn id="7" dur="500"/>
+                                        <p:tgtEl>
+                                          <p:spTgt spid="9"/>
+                                        </p:tgtEl>
+                                      </p:cBhvr>
+                                    </p:animEffect>
+                                  </p:childTnLst>
+                                </p:cTn>
+                              </p:par>
+                              <p:par>
+                                <p:cTn id="8" presetID="10" presetClass="entr" presetSubtype="0" fill="hold" nodeType="withEffect">
+                                  <p:stCondLst>
+                                    <p:cond delay="0"/>
+                                  </p:stCondLst>
+                                  <p:childTnLst>
+                                    <p:set>
+                                      <p:cBhvr>
+                                        <p:cTn id="9" dur="1" fill="hold">
+                                          <p:stCondLst>
+                                            <p:cond delay="0"/>
+                                          </p:stCondLst>
+                                        </p:cTn>
+                                        <p:tgtEl>
+                                          <p:spTgt spid="6"/>
+                                        </p:tgtEl>
+                                        <p:attrNameLst>
+                                          <p:attrName>style.visibility</p:attrName>
+                                        </p:attrNameLst>
+                                      </p:cBhvr>
+                                      <p:to>
+                                        <p:strVal val="visible"/>
+                                      </p:to>
+                                    </p:set>
+                                    <p:animEffect transition="in" filter="fade">
+                                      <p:cBhvr>
+                                        <p:cTn id="10" dur="500"/>
+                                        <p:tgtEl>
+                                          <p:spTgt spid="6"/>
+                                        </p:tgtEl>
+                                      </p:cBhvr>
+                                    </p:animEffect>
+                                  </p:childTnLst>
+                                </p:cTn>
+                              </p:par>
+                            </p:childTnLst>
+                          </p:cTn>
+                        </p:par>
+                      </p:childTnLst>
+                    </p:cTn>
+                  </p:par>
+                  <p:par>
+                    <p:cTn id="11" fill="hold">
+                      <p:stCondLst>
+                        <p:cond delay="indefinite"/>
+                      </p:stCondLst>
+                      <p:childTnLst>
+                        <p:par>
+                          <p:cTn id="12" fill="hold">
+                            <p:stCondLst>
+                              <p:cond delay="0"/>
+                            </p:stCondLst>
+                            <p:childTnLst>
+                              <p:par>
+                                <p:cTn id="13" presetID="1" presetClass="exit" presetSubtype="0" fill="hold" nodeType="clickEffect">
+                                  <p:stCondLst>
+                                    <p:cond delay="0"/>
+                                  </p:stCondLst>
+                                  <p:childTnLst>
+                                    <p:set>
+                                      <p:cBhvr>
+                                        <p:cTn id="14" dur="1" fill="hold">
+                                          <p:stCondLst>
+                                            <p:cond delay="0"/>
+                                          </p:stCondLst>
+                                        </p:cTn>
+                                        <p:tgtEl>
+                                          <p:spTgt spid="6"/>
+                                        </p:tgtEl>
+                                        <p:attrNameLst>
+                                          <p:attrName>style.visibility</p:attrName>
+                                        </p:attrNameLst>
+                                      </p:cBhvr>
+                                      <p:to>
+                                        <p:strVal val="hidden"/>
+                                      </p:to>
+                                    </p:set>
+                                  </p:childTnLst>
+                                </p:cTn>
+                              </p:par>
+                              <p:par>
+                                <p:cTn id="15" presetID="10" presetClass="entr" presetSubtype="0" fill="hold" grpId="0" nodeType="withEffect">
+                                  <p:stCondLst>
+                                    <p:cond delay="0"/>
+                                  </p:stCondLst>
+                                  <p:childTnLst>
+                                    <p:set>
+                                      <p:cBhvr>
+                                        <p:cTn id="16" dur="1" fill="hold">
+                                          <p:stCondLst>
+                                            <p:cond delay="0"/>
+                                          </p:stCondLst>
+                                        </p:cTn>
+                                        <p:tgtEl>
+                                          <p:spTgt spid="10"/>
+                                        </p:tgtEl>
+                                        <p:attrNameLst>
+                                          <p:attrName>style.visibility</p:attrName>
+                                        </p:attrNameLst>
+                                      </p:cBhvr>
+                                      <p:to>
+                                        <p:strVal val="visible"/>
+                                      </p:to>
+                                    </p:set>
+                                    <p:animEffect transition="in" filter="fade">
+                                      <p:cBhvr>
+                                        <p:cTn id="17" dur="500"/>
+                                        <p:tgtEl>
+                                          <p:spTgt spid="10"/>
+                                        </p:tgtEl>
+                                      </p:cBhvr>
+                                    </p:animEffect>
+                                  </p:childTnLst>
+                                </p:cTn>
+                              </p:par>
+                              <p:par>
+                                <p:cTn id="18" presetID="10" presetClass="entr" presetSubtype="0" fill="hold" nodeType="withEffect">
+                                  <p:stCondLst>
+                                    <p:cond delay="0"/>
+                                  </p:stCondLst>
+                                  <p:childTnLst>
+                                    <p:set>
+                                      <p:cBhvr>
+                                        <p:cTn id="19" dur="1" fill="hold">
+                                          <p:stCondLst>
+                                            <p:cond delay="0"/>
+                                          </p:stCondLst>
+                                        </p:cTn>
+                                        <p:tgtEl>
+                                          <p:spTgt spid="18"/>
+                                        </p:tgtEl>
+                                        <p:attrNameLst>
+                                          <p:attrName>style.visibility</p:attrName>
+                                        </p:attrNameLst>
+                                      </p:cBhvr>
+                                      <p:to>
+                                        <p:strVal val="visible"/>
+                                      </p:to>
+                                    </p:set>
+                                    <p:animEffect transition="in" filter="fade">
+                                      <p:cBhvr>
+                                        <p:cTn id="20" dur="500"/>
+                                        <p:tgtEl>
+                                          <p:spTgt spid="18"/>
+                                        </p:tgtEl>
+                                      </p:cBhvr>
+                                    </p:animEffect>
+                                  </p:childTnLst>
+                                </p:cTn>
+                              </p:par>
+                            </p:childTnLst>
+                          </p:cTn>
+                        </p:par>
+                      </p:childTnLst>
+                    </p:cTn>
+                  </p:par>
+                  <p:par>
+                    <p:cTn id="21" fill="hold">
+                      <p:stCondLst>
+                        <p:cond delay="indefinite"/>
+                      </p:stCondLst>
+                      <p:childTnLst>
+                        <p:par>
+                          <p:cTn id="22" fill="hold">
+                            <p:stCondLst>
+                              <p:cond delay="0"/>
+                            </p:stCondLst>
+                            <p:childTnLst>
+                              <p:par>
+                                <p:cTn id="23" presetID="1" presetClass="exit" presetSubtype="0" fill="hold" nodeType="clickEffect">
+                                  <p:stCondLst>
+                                    <p:cond delay="0"/>
+                                  </p:stCondLst>
+                                  <p:childTnLst>
+                                    <p:set>
+                                      <p:cBhvr>
+                                        <p:cTn id="24" dur="1" fill="hold">
+                                          <p:stCondLst>
+                                            <p:cond delay="0"/>
+                                          </p:stCondLst>
+                                        </p:cTn>
+                                        <p:tgtEl>
+                                          <p:spTgt spid="18"/>
+                                        </p:tgtEl>
+                                        <p:attrNameLst>
+                                          <p:attrName>style.visibility</p:attrName>
+                                        </p:attrNameLst>
+                                      </p:cBhvr>
+                                      <p:to>
+                                        <p:strVal val="hidden"/>
+                                      </p:to>
+                                    </p:set>
+                                  </p:childTnLst>
+                                </p:cTn>
+                              </p:par>
+                              <p:par>
+                                <p:cTn id="25" presetID="10" presetClass="entr" presetSubtype="0" fill="hold" nodeType="withEffect">
+                                  <p:stCondLst>
+                                    <p:cond delay="0"/>
+                                  </p:stCondLst>
+                                  <p:childTnLst>
+                                    <p:set>
+                                      <p:cBhvr>
+                                        <p:cTn id="26" dur="1" fill="hold">
+                                          <p:stCondLst>
+                                            <p:cond delay="0"/>
+                                          </p:stCondLst>
+                                        </p:cTn>
+                                        <p:tgtEl>
+                                          <p:spTgt spid="19"/>
+                                        </p:tgtEl>
+                                        <p:attrNameLst>
+                                          <p:attrName>style.visibility</p:attrName>
+                                        </p:attrNameLst>
+                                      </p:cBhvr>
+                                      <p:to>
+                                        <p:strVal val="visible"/>
+                                      </p:to>
+                                    </p:set>
+                                    <p:animEffect transition="in" filter="fade">
+                                      <p:cBhvr>
+                                        <p:cTn id="27" dur="500"/>
+                                        <p:tgtEl>
+                                          <p:spTgt spid="19"/>
+                                        </p:tgtEl>
+                                      </p:cBhvr>
+                                    </p:animEffect>
+                                  </p:childTnLst>
+                                </p:cTn>
+                              </p:par>
+                            </p:childTnLst>
+                          </p:cTn>
+                        </p:par>
+                      </p:childTnLst>
+                    </p:cTn>
+                  </p:par>
+                  <p:par>
+                    <p:cTn id="28" fill="hold">
+                      <p:stCondLst>
+                        <p:cond delay="indefinite"/>
+                      </p:stCondLst>
+                      <p:childTnLst>
+                        <p:par>
+                          <p:cTn id="29" fill="hold">
+                            <p:stCondLst>
+                              <p:cond delay="0"/>
+                            </p:stCondLst>
+                            <p:childTnLst>
+                              <p:par>
+                                <p:cTn id="30" presetID="10" presetClass="entr" presetSubtype="0" fill="hold" grpId="0" nodeType="clickEffect">
+                                  <p:stCondLst>
+                                    <p:cond delay="0"/>
+                                  </p:stCondLst>
+                                  <p:childTnLst>
+                                    <p:set>
+                                      <p:cBhvr>
+                                        <p:cTn id="31" dur="1" fill="hold">
+                                          <p:stCondLst>
+                                            <p:cond delay="0"/>
+                                          </p:stCondLst>
+                                        </p:cTn>
+                                        <p:tgtEl>
+                                          <p:spTgt spid="16"/>
+                                        </p:tgtEl>
+                                        <p:attrNameLst>
+                                          <p:attrName>style.visibility</p:attrName>
+                                        </p:attrNameLst>
+                                      </p:cBhvr>
+                                      <p:to>
+                                        <p:strVal val="visible"/>
+                                      </p:to>
+                                    </p:set>
+                                    <p:animEffect transition="in" filter="fade">
+                                      <p:cBhvr>
+                                        <p:cTn id="32" dur="500"/>
+                                        <p:tgtEl>
+                                          <p:spTgt spid="16"/>
+                                        </p:tgtEl>
+                                      </p:cBhvr>
+                                    </p:animEffect>
+                                  </p:childTnLst>
+                                </p:cTn>
+                              </p:par>
+                              <p:par>
+                                <p:cTn id="33" presetID="10" presetClass="entr" presetSubtype="0" fill="hold" nodeType="withEffect">
+                                  <p:stCondLst>
+                                    <p:cond delay="0"/>
+                                  </p:stCondLst>
+                                  <p:childTnLst>
+                                    <p:set>
+                                      <p:cBhvr>
+                                        <p:cTn id="34" dur="1" fill="hold">
+                                          <p:stCondLst>
+                                            <p:cond delay="0"/>
+                                          </p:stCondLst>
+                                        </p:cTn>
+                                        <p:tgtEl>
+                                          <p:spTgt spid="24"/>
+                                        </p:tgtEl>
+                                        <p:attrNameLst>
+                                          <p:attrName>style.visibility</p:attrName>
+                                        </p:attrNameLst>
+                                      </p:cBhvr>
+                                      <p:to>
+                                        <p:strVal val="visible"/>
+                                      </p:to>
+                                    </p:set>
+                                    <p:animEffect transition="in" filter="fade">
+                                      <p:cBhvr>
+                                        <p:cTn id="35" dur="500"/>
+                                        <p:tgtEl>
+                                          <p:spTgt spid="24"/>
+                                        </p:tgtEl>
+                                      </p:cBhvr>
+                                    </p:animEffect>
+                                  </p:childTnLst>
+                                </p:cTn>
+                              </p:par>
+                              <p:par>
+                                <p:cTn id="36" presetID="1" presetClass="exit" presetSubtype="0" fill="hold" nodeType="withEffect">
+                                  <p:stCondLst>
+                                    <p:cond delay="0"/>
+                                  </p:stCondLst>
+                                  <p:childTnLst>
+                                    <p:set>
+                                      <p:cBhvr>
+                                        <p:cTn id="37" dur="1" fill="hold">
+                                          <p:stCondLst>
+                                            <p:cond delay="0"/>
+                                          </p:stCondLst>
+                                        </p:cTn>
+                                        <p:tgtEl>
+                                          <p:spTgt spid="19"/>
+                                        </p:tgtEl>
+                                        <p:attrNameLst>
+                                          <p:attrName>style.visibility</p:attrName>
+                                        </p:attrNameLst>
+                                      </p:cBhvr>
+                                      <p:to>
+                                        <p:strVal val="hidden"/>
+                                      </p:to>
+                                    </p:set>
+                                  </p:childTnLst>
+                                </p:cTn>
+                              </p:par>
+                            </p:childTnLst>
+                          </p:cTn>
+                        </p:par>
+                      </p:childTnLst>
+                    </p:cTn>
+                  </p:par>
+                  <p:par>
+                    <p:cTn id="38" fill="hold">
+                      <p:stCondLst>
+                        <p:cond delay="indefinite"/>
+                      </p:stCondLst>
+                      <p:childTnLst>
+                        <p:par>
+                          <p:cTn id="39" fill="hold">
+                            <p:stCondLst>
+                              <p:cond delay="0"/>
+                            </p:stCondLst>
+                            <p:childTnLst>
+                              <p:par>
+                                <p:cTn id="40" presetID="10" presetClass="entr" presetSubtype="0" fill="hold" nodeType="clickEffect">
+                                  <p:stCondLst>
+                                    <p:cond delay="0"/>
+                                  </p:stCondLst>
+                                  <p:childTnLst>
+                                    <p:set>
+                                      <p:cBhvr>
+                                        <p:cTn id="41" dur="1" fill="hold">
+                                          <p:stCondLst>
+                                            <p:cond delay="0"/>
+                                          </p:stCondLst>
+                                        </p:cTn>
+                                        <p:tgtEl>
+                                          <p:spTgt spid="27"/>
+                                        </p:tgtEl>
+                                        <p:attrNameLst>
+                                          <p:attrName>style.visibility</p:attrName>
+                                        </p:attrNameLst>
+                                      </p:cBhvr>
+                                      <p:to>
+                                        <p:strVal val="visible"/>
+                                      </p:to>
+                                    </p:set>
+                                    <p:animEffect transition="in" filter="fade">
+                                      <p:cBhvr>
+                                        <p:cTn id="42" dur="500"/>
+                                        <p:tgtEl>
+                                          <p:spTgt spid="27"/>
+                                        </p:tgtEl>
+                                      </p:cBhvr>
+                                    </p:animEffect>
+                                  </p:childTnLst>
+                                </p:cTn>
+                              </p:par>
+                              <p:par>
+                                <p:cTn id="43" presetID="1" presetClass="exit" presetSubtype="0" fill="hold" nodeType="withEffect">
+                                  <p:stCondLst>
+                                    <p:cond delay="0"/>
+                                  </p:stCondLst>
+                                  <p:childTnLst>
+                                    <p:set>
+                                      <p:cBhvr>
+                                        <p:cTn id="44" dur="1" fill="hold">
+                                          <p:stCondLst>
+                                            <p:cond delay="0"/>
+                                          </p:stCondLst>
+                                        </p:cTn>
+                                        <p:tgtEl>
+                                          <p:spTgt spid="24"/>
+                                        </p:tgtEl>
+                                        <p:attrNameLst>
+                                          <p:attrName>style.visibility</p:attrName>
+                                        </p:attrNameLst>
+                                      </p:cBhvr>
+                                      <p:to>
+                                        <p:strVal val="hidden"/>
+                                      </p:to>
+                                    </p:set>
+                                  </p:childTnLst>
+                                </p:cTn>
+                              </p:par>
+                              <p:par>
+                                <p:cTn id="45" presetID="10" presetClass="entr" presetSubtype="0" fill="hold" grpId="0" nodeType="withEffect">
+                                  <p:stCondLst>
+                                    <p:cond delay="0"/>
+                                  </p:stCondLst>
+                                  <p:childTnLst>
+                                    <p:set>
+                                      <p:cBhvr>
+                                        <p:cTn id="46" dur="1" fill="hold">
+                                          <p:stCondLst>
+                                            <p:cond delay="0"/>
+                                          </p:stCondLst>
+                                        </p:cTn>
+                                        <p:tgtEl>
+                                          <p:spTgt spid="30"/>
+                                        </p:tgtEl>
+                                        <p:attrNameLst>
+                                          <p:attrName>style.visibility</p:attrName>
+                                        </p:attrNameLst>
+                                      </p:cBhvr>
+                                      <p:to>
+                                        <p:strVal val="visible"/>
+                                      </p:to>
+                                    </p:set>
+                                    <p:animEffect transition="in" filter="fade">
+                                      <p:cBhvr>
+                                        <p:cTn id="47" dur="500"/>
+                                        <p:tgtEl>
+                                          <p:spTgt spid="30"/>
+                                        </p:tgtEl>
+                                      </p:cBhvr>
+                                    </p:animEffect>
+                                  </p:childTnLst>
+                                </p:cTn>
+                              </p:par>
+                            </p:childTnLst>
+                          </p:cTn>
+                        </p:par>
+                      </p:childTnLst>
+                    </p:cTn>
+                  </p:par>
+                  <p:par>
+                    <p:cTn id="48" fill="hold">
+                      <p:stCondLst>
+                        <p:cond delay="indefinite"/>
+                      </p:stCondLst>
+                      <p:childTnLst>
+                        <p:par>
+                          <p:cTn id="49" fill="hold">
+                            <p:stCondLst>
+                              <p:cond delay="0"/>
+                            </p:stCondLst>
+                            <p:childTnLst>
+                              <p:par>
+                                <p:cTn id="50" presetID="10" presetClass="entr" presetSubtype="0" fill="hold" nodeType="clickEffect">
+                                  <p:stCondLst>
+                                    <p:cond delay="0"/>
+                                  </p:stCondLst>
+                                  <p:childTnLst>
+                                    <p:set>
+                                      <p:cBhvr>
+                                        <p:cTn id="51" dur="1" fill="hold">
+                                          <p:stCondLst>
+                                            <p:cond delay="0"/>
+                                          </p:stCondLst>
+                                        </p:cTn>
+                                        <p:tgtEl>
+                                          <p:spTgt spid="20"/>
+                                        </p:tgtEl>
+                                        <p:attrNameLst>
+                                          <p:attrName>style.visibility</p:attrName>
+                                        </p:attrNameLst>
+                                      </p:cBhvr>
+                                      <p:to>
+                                        <p:strVal val="visible"/>
+                                      </p:to>
+                                    </p:set>
+                                    <p:animEffect transition="in" filter="fade">
+                                      <p:cBhvr>
+                                        <p:cTn id="52" dur="500"/>
+                                        <p:tgtEl>
+                                          <p:spTgt spid="20"/>
+                                        </p:tgtEl>
+                                      </p:cBhvr>
+                                    </p:animEffect>
+                                  </p:childTnLst>
+                                </p:cTn>
+                              </p:par>
+                            </p:childTnLst>
+                          </p:cTn>
+                        </p:par>
+                      </p:childTnLst>
+                    </p:cTn>
+                  </p:par>
+                  <p:par>
+                    <p:cTn id="53" fill="hold">
+                      <p:stCondLst>
+                        <p:cond delay="indefinite"/>
+                      </p:stCondLst>
+                      <p:childTnLst>
+                        <p:par>
+                          <p:cTn id="54" fill="hold">
+                            <p:stCondLst>
+                              <p:cond delay="0"/>
+                            </p:stCondLst>
+                            <p:childTnLst>
+                              <p:par>
+                                <p:cTn id="55" presetID="10" presetClass="entr" presetSubtype="0" fill="hold" nodeType="clickEffect">
+                                  <p:stCondLst>
+                                    <p:cond delay="0"/>
+                                  </p:stCondLst>
+                                  <p:childTnLst>
+                                    <p:set>
+                                      <p:cBhvr>
+                                        <p:cTn id="56" dur="1" fill="hold">
+                                          <p:stCondLst>
+                                            <p:cond delay="0"/>
+                                          </p:stCondLst>
+                                        </p:cTn>
+                                        <p:tgtEl>
+                                          <p:spTgt spid="26"/>
+                                        </p:tgtEl>
+                                        <p:attrNameLst>
+                                          <p:attrName>style.visibility</p:attrName>
+                                        </p:attrNameLst>
+                                      </p:cBhvr>
+                                      <p:to>
+                                        <p:strVal val="visible"/>
+                                      </p:to>
+                                    </p:set>
+                                    <p:animEffect transition="in" filter="fade">
+                                      <p:cBhvr>
+                                        <p:cTn id="57" dur="500"/>
+                                        <p:tgtEl>
+                                          <p:spTgt spid="26"/>
+                                        </p:tgtEl>
+                                      </p:cBhvr>
+                                    </p:animEffect>
+                                  </p:childTnLst>
+                                </p:cTn>
+                              </p:par>
+                            </p:childTnLst>
+                          </p:cTn>
+                        </p:par>
+                      </p:childTnLst>
+                    </p:cTn>
+                  </p:par>
+                  <p:par>
+                    <p:cTn id="58" fill="hold">
+                      <p:stCondLst>
+                        <p:cond delay="indefinite"/>
+                      </p:stCondLst>
+                      <p:childTnLst>
+                        <p:par>
+                          <p:cTn id="59" fill="hold">
+                            <p:stCondLst>
+                              <p:cond delay="0"/>
+                            </p:stCondLst>
+                            <p:childTnLst>
+                              <p:par>
+                                <p:cTn id="60" presetID="10" presetClass="entr" presetSubtype="0" fill="hold" nodeType="clickEffect">
+                                  <p:stCondLst>
+                                    <p:cond delay="0"/>
+                                  </p:stCondLst>
+                                  <p:childTnLst>
+                                    <p:set>
+                                      <p:cBhvr>
+                                        <p:cTn id="61" dur="1" fill="hold">
+                                          <p:stCondLst>
+                                            <p:cond delay="0"/>
+                                          </p:stCondLst>
+                                        </p:cTn>
+                                        <p:tgtEl>
+                                          <p:spTgt spid="29"/>
+                                        </p:tgtEl>
+                                        <p:attrNameLst>
+                                          <p:attrName>style.visibility</p:attrName>
+                                        </p:attrNameLst>
+                                      </p:cBhvr>
+                                      <p:to>
+                                        <p:strVal val="visible"/>
+                                      </p:to>
+                                    </p:set>
+                                    <p:animEffect transition="in" filter="fade">
+                                      <p:cBhvr>
+                                        <p:cTn id="62" dur="500"/>
+                                        <p:tgtEl>
+                                          <p:spTgt spid="29"/>
+                                        </p:tgtEl>
+                                      </p:cBhvr>
+                                    </p:animEffect>
+                                  </p:childTnLst>
+                                </p:cTn>
+                              </p:par>
+                              <p:par>
+                                <p:cTn id="63" presetID="10" presetClass="entr" presetSubtype="0" fill="hold" grpId="0" nodeType="withEffect">
+                                  <p:stCondLst>
+                                    <p:cond delay="0"/>
+                                  </p:stCondLst>
+                                  <p:childTnLst>
+                                    <p:set>
+                                      <p:cBhvr>
+                                        <p:cTn id="64" dur="1" fill="hold">
+                                          <p:stCondLst>
+                                            <p:cond delay="0"/>
+                                          </p:stCondLst>
+                                        </p:cTn>
+                                        <p:tgtEl>
+                                          <p:spTgt spid="33"/>
+                                        </p:tgtEl>
+                                        <p:attrNameLst>
+                                          <p:attrName>style.visibility</p:attrName>
+                                        </p:attrNameLst>
+                                      </p:cBhvr>
+                                      <p:to>
+                                        <p:strVal val="visible"/>
+                                      </p:to>
+                                    </p:set>
+                                    <p:animEffect transition="in" filter="fade">
+                                      <p:cBhvr>
+                                        <p:cTn id="65" dur="500"/>
+                                        <p:tgtEl>
+                                          <p:spTgt spid="33"/>
+                                        </p:tgtEl>
+                                      </p:cBhvr>
+                                    </p:animEffect>
+                                  </p:childTnLst>
+                                </p:cTn>
+                              </p:par>
+                            </p:childTnLst>
+                          </p:cTn>
+                        </p:par>
+                      </p:childTnLst>
+                    </p:cTn>
+                  </p:par>
+                  <p:par>
+                    <p:cTn id="66" fill="hold">
+                      <p:stCondLst>
+                        <p:cond delay="indefinite"/>
+                      </p:stCondLst>
+                      <p:childTnLst>
+                        <p:par>
+                          <p:cTn id="67" fill="hold">
+                            <p:stCondLst>
+                              <p:cond delay="0"/>
+                            </p:stCondLst>
+                            <p:childTnLst>
+                              <p:par>
+                                <p:cTn id="68" presetID="10" presetClass="entr" presetSubtype="0" fill="hold" nodeType="clickEffect">
+                                  <p:stCondLst>
+                                    <p:cond delay="0"/>
+                                  </p:stCondLst>
+                                  <p:childTnLst>
+                                    <p:set>
+                                      <p:cBhvr>
+                                        <p:cTn id="69" dur="1" fill="hold">
+                                          <p:stCondLst>
+                                            <p:cond delay="0"/>
+                                          </p:stCondLst>
+                                        </p:cTn>
+                                        <p:tgtEl>
+                                          <p:spTgt spid="54"/>
+                                        </p:tgtEl>
+                                        <p:attrNameLst>
+                                          <p:attrName>style.visibility</p:attrName>
+                                        </p:attrNameLst>
+                                      </p:cBhvr>
+                                      <p:to>
+                                        <p:strVal val="visible"/>
+                                      </p:to>
+                                    </p:set>
+                                    <p:animEffect transition="in" filter="fade">
+                                      <p:cBhvr>
+                                        <p:cTn id="70" dur="500"/>
+                                        <p:tgtEl>
+                                          <p:spTgt spid="54"/>
+                                        </p:tgtEl>
+                                      </p:cBhvr>
+                                    </p:animEffect>
+                                  </p:childTnLst>
+                                </p:cTn>
+                              </p:par>
+                              <p:par>
+                                <p:cTn id="71" presetID="10" presetClass="entr" presetSubtype="0" fill="hold" grpId="0" nodeType="withEffect">
+                                  <p:stCondLst>
+                                    <p:cond delay="0"/>
+                                  </p:stCondLst>
+                                  <p:childTnLst>
+                                    <p:set>
+                                      <p:cBhvr>
+                                        <p:cTn id="72" dur="1" fill="hold">
+                                          <p:stCondLst>
+                                            <p:cond delay="0"/>
+                                          </p:stCondLst>
+                                        </p:cTn>
+                                        <p:tgtEl>
+                                          <p:spTgt spid="22"/>
+                                        </p:tgtEl>
+                                        <p:attrNameLst>
+                                          <p:attrName>style.visibility</p:attrName>
+                                        </p:attrNameLst>
+                                      </p:cBhvr>
+                                      <p:to>
+                                        <p:strVal val="visible"/>
+                                      </p:to>
+                                    </p:set>
+                                    <p:animEffect transition="in" filter="fade">
+                                      <p:cBhvr>
+                                        <p:cTn id="73" dur="500"/>
+                                        <p:tgtEl>
+                                          <p:spTgt spid="22"/>
+                                        </p:tgtEl>
+                                      </p:cBhvr>
+                                    </p:animEffect>
+                                  </p:childTnLst>
+                                </p:cTn>
+                              </p:par>
+                            </p:childTnLst>
+                          </p:cTn>
+                        </p:par>
+                      </p:childTnLst>
+                    </p:cTn>
+                  </p:par>
+                </p:childTnLst>
+              </p:cTn>
+              <p:prevCondLst>
+                <p:cond evt="onPrev" delay="0">
+                  <p:tgtEl>
+                    <p:sldTgt/>
+                  </p:tgtEl>
+                </p:cond>
+              </p:prevCondLst>
+              <p:nextCondLst>
+                <p:cond evt="onNext" delay="0">
+                  <p:tgtEl>
+                    <p:sldTgt/>
+                  </p:tgtEl>
+                </p:cond>
+              </p:nextCondLst>
+            </p:seq>
+          </p:childTnLst>
+        </p:cTn>
+      </p:par>
+    </p:tnLst>
+    <p:bldLst>
+      <p:bldP spid="9" grpId="0" animBg="1"/>
+      <p:bldP spid="10" grpId="0" animBg="1"/>
+      <p:bldP spid="16" grpId="0" animBg="1"/>
+      <p:bldP spid="30" grpId="0"/>
+      <p:bldP spid="33" grpId="0"/>
+      <p:bldP spid="22" grpId="0" animBg="1"/>
+    </p:bldLst>
+  </p:timing>
+</p:sld>
+</file>
+
 <file path=ppt/slides/slide2.xml><?xml version="1.0" encoding="utf-8"?>
 <p:sld xmlns:a="http://schemas.openxmlformats.org/drawingml/2006/main" xmlns:r="http://schemas.openxmlformats.org/officeDocument/2006/relationships" xmlns:p="http://schemas.openxmlformats.org/presentationml/2006/main">
   <p:cSld>
@@ -3541,67 +5362,1141 @@
       </p:grpSpPr>
       <p:sp>
         <p:nvSpPr>
-          <p:cNvPr id="4" name="Title 3">
-            <a:extLst>
-              <a:ext uri="{FF2B5EF4-FFF2-40B4-BE49-F238E27FC236}">
-                <a16:creationId xmlns:a16="http://schemas.microsoft.com/office/drawing/2014/main" id="{81493473-C789-6340-9A5E-E3B87060176D}"/>
-              </a:ext>
-            </a:extLst>
-          </p:cNvPr>
-          <p:cNvSpPr>
-            <a:spLocks noGrp="1"/>
-          </p:cNvSpPr>
-          <p:nvPr>
-            <p:ph type="ctrTitle"/>
-          </p:nvPr>
-        </p:nvSpPr>
-        <p:spPr/>
-        <p:txBody>
-          <a:bodyPr/>
+          <p:cNvPr id="6" name="K8s cluster">
+            <a:extLst>
+              <a:ext uri="{FF2B5EF4-FFF2-40B4-BE49-F238E27FC236}">
+                <a16:creationId xmlns:a16="http://schemas.microsoft.com/office/drawing/2014/main" id="{03273D92-BB84-D840-8124-21F217B12FCB}"/>
+              </a:ext>
+            </a:extLst>
+          </p:cNvPr>
+          <p:cNvSpPr/>
+          <p:nvPr/>
+        </p:nvSpPr>
+        <p:spPr>
+          <a:xfrm>
+            <a:off x="331694" y="313765"/>
+            <a:ext cx="7257825" cy="6194611"/>
+          </a:xfrm>
+          <a:prstGeom prst="rect">
+            <a:avLst/>
+          </a:prstGeom>
+          <a:noFill/>
+          <a:ln w="38100"/>
+        </p:spPr>
+        <p:style>
+          <a:lnRef idx="2">
+            <a:schemeClr val="accent1">
+              <a:shade val="50000"/>
+            </a:schemeClr>
+          </a:lnRef>
+          <a:fillRef idx="1">
+            <a:schemeClr val="accent1"/>
+          </a:fillRef>
+          <a:effectRef idx="0">
+            <a:schemeClr val="accent1"/>
+          </a:effectRef>
+          <a:fontRef idx="minor">
+            <a:schemeClr val="lt1"/>
+          </a:fontRef>
+        </p:style>
+        <p:txBody>
+          <a:bodyPr rtlCol="0" anchor="ctr"/>
           <a:lstStyle/>
           <a:p>
+            <a:pPr algn="ctr"/>
+            <a:endParaRPr lang="en-US"/>
+          </a:p>
+        </p:txBody>
+      </p:sp>
+      <p:sp>
+        <p:nvSpPr>
+          <p:cNvPr id="7" name="Target">
+            <a:extLst>
+              <a:ext uri="{FF2B5EF4-FFF2-40B4-BE49-F238E27FC236}">
+                <a16:creationId xmlns:a16="http://schemas.microsoft.com/office/drawing/2014/main" id="{17EFE706-B083-294E-86B9-C1538A6AA390}"/>
+              </a:ext>
+            </a:extLst>
+          </p:cNvPr>
+          <p:cNvSpPr/>
+          <p:nvPr/>
+        </p:nvSpPr>
+        <p:spPr>
+          <a:xfrm>
+            <a:off x="3146722" y="2540660"/>
+            <a:ext cx="880217" cy="666571"/>
+          </a:xfrm>
+          <a:prstGeom prst="rect">
+            <a:avLst/>
+          </a:prstGeom>
+        </p:spPr>
+        <p:style>
+          <a:lnRef idx="2">
+            <a:schemeClr val="accent6">
+              <a:shade val="50000"/>
+            </a:schemeClr>
+          </a:lnRef>
+          <a:fillRef idx="1">
+            <a:schemeClr val="accent6"/>
+          </a:fillRef>
+          <a:effectRef idx="0">
+            <a:schemeClr val="accent6"/>
+          </a:effectRef>
+          <a:fontRef idx="minor">
+            <a:schemeClr val="lt1"/>
+          </a:fontRef>
+        </p:style>
+        <p:txBody>
+          <a:bodyPr rtlCol="0" anchor="ctr"/>
+          <a:lstStyle/>
+          <a:p>
+            <a:pPr algn="ctr"/>
             <a:r>
               <a:rPr lang="en-US" dirty="0"/>
-              <a:t>KEDA’s Role</a:t>
-            </a:r>
-          </a:p>
-        </p:txBody>
-      </p:sp>
-      <p:sp>
-        <p:nvSpPr>
-          <p:cNvPr id="5" name="Subtitle 4">
-            <a:extLst>
-              <a:ext uri="{FF2B5EF4-FFF2-40B4-BE49-F238E27FC236}">
-                <a16:creationId xmlns:a16="http://schemas.microsoft.com/office/drawing/2014/main" id="{3F497F65-F9ED-2A41-B292-E76F7297D8D8}"/>
-              </a:ext>
-            </a:extLst>
-          </p:cNvPr>
-          <p:cNvSpPr>
-            <a:spLocks noGrp="1"/>
-          </p:cNvSpPr>
-          <p:nvPr>
-            <p:ph type="subTitle" idx="1"/>
-          </p:nvPr>
-        </p:nvSpPr>
-        <p:spPr/>
-        <p:txBody>
-          <a:bodyPr/>
+              <a:t>Target</a:t>
+            </a:r>
+          </a:p>
+        </p:txBody>
+      </p:sp>
+      <p:pic>
+        <p:nvPicPr>
+          <p:cNvPr id="10" name="K8s logo" descr="Kubernetes - Wikipedia">
+            <a:extLst>
+              <a:ext uri="{FF2B5EF4-FFF2-40B4-BE49-F238E27FC236}">
+                <a16:creationId xmlns:a16="http://schemas.microsoft.com/office/drawing/2014/main" id="{E81E348A-78E1-2745-AA90-496C3F54A1DC}"/>
+              </a:ext>
+            </a:extLst>
+          </p:cNvPr>
+          <p:cNvPicPr>
+            <a:picLocks noChangeAspect="1" noChangeArrowheads="1"/>
+          </p:cNvPicPr>
+          <p:nvPr/>
+        </p:nvPicPr>
+        <p:blipFill>
+          <a:blip r:embed="rId2">
+            <a:extLst>
+              <a:ext uri="{28A0092B-C50C-407E-A947-70E740481C1C}">
+                <a14:useLocalDpi xmlns:a14="http://schemas.microsoft.com/office/drawing/2010/main" val="0"/>
+              </a:ext>
+            </a:extLst>
+          </a:blip>
+          <a:srcRect/>
+          <a:stretch>
+            <a:fillRect/>
+          </a:stretch>
+        </p:blipFill>
+        <p:spPr bwMode="auto">
+          <a:xfrm>
+            <a:off x="6923947" y="349624"/>
+            <a:ext cx="535159" cy="519525"/>
+          </a:xfrm>
+          <a:prstGeom prst="rect">
+            <a:avLst/>
+          </a:prstGeom>
+          <a:noFill/>
+          <a:extLst>
+            <a:ext uri="{909E8E84-426E-40DD-AFC4-6F175D3DCCD1}">
+              <a14:hiddenFill xmlns:a14="http://schemas.microsoft.com/office/drawing/2010/main">
+                <a:solidFill>
+                  <a:srgbClr val="FFFFFF"/>
+                </a:solidFill>
+              </a14:hiddenFill>
+            </a:ext>
+          </a:extLst>
+        </p:spPr>
+      </p:pic>
+      <p:sp>
+        <p:nvSpPr>
+          <p:cNvPr id="13" name="Text Operator">
+            <a:extLst>
+              <a:ext uri="{FF2B5EF4-FFF2-40B4-BE49-F238E27FC236}">
+                <a16:creationId xmlns:a16="http://schemas.microsoft.com/office/drawing/2014/main" id="{0065DB4F-A190-7A45-A0D0-ADEFDCF4F635}"/>
+              </a:ext>
+            </a:extLst>
+          </p:cNvPr>
+          <p:cNvSpPr txBox="1"/>
+          <p:nvPr/>
+        </p:nvSpPr>
+        <p:spPr>
+          <a:xfrm>
+            <a:off x="6343515" y="3235279"/>
+            <a:ext cx="1034770" cy="369332"/>
+          </a:xfrm>
+          <a:prstGeom prst="rect">
+            <a:avLst/>
+          </a:prstGeom>
+          <a:noFill/>
+        </p:spPr>
+        <p:txBody>
+          <a:bodyPr wrap="none" rtlCol="0">
+            <a:spAutoFit/>
+          </a:bodyPr>
           <a:lstStyle/>
           <a:p>
-            <a:endParaRPr lang="en-US"/>
+            <a:r>
+              <a:rPr lang="en-US" dirty="0">
+                <a:solidFill>
+                  <a:schemeClr val="bg1"/>
+                </a:solidFill>
+              </a:rPr>
+              <a:t>Operator</a:t>
+            </a:r>
+          </a:p>
+        </p:txBody>
+      </p:sp>
+      <p:sp>
+        <p:nvSpPr>
+          <p:cNvPr id="14" name="hpa">
+            <a:extLst>
+              <a:ext uri="{FF2B5EF4-FFF2-40B4-BE49-F238E27FC236}">
+                <a16:creationId xmlns:a16="http://schemas.microsoft.com/office/drawing/2014/main" id="{897114C1-904A-9040-B195-B4CB76528231}"/>
+              </a:ext>
+            </a:extLst>
+          </p:cNvPr>
+          <p:cNvSpPr/>
+          <p:nvPr/>
+        </p:nvSpPr>
+        <p:spPr>
+          <a:xfrm>
+            <a:off x="926997" y="2846450"/>
+            <a:ext cx="864188" cy="843811"/>
+          </a:xfrm>
+          <a:prstGeom prst="ellipse">
+            <a:avLst/>
+          </a:prstGeom>
+          <a:solidFill>
+            <a:srgbClr val="316AE1"/>
+          </a:solidFill>
+        </p:spPr>
+        <p:style>
+          <a:lnRef idx="2">
+            <a:schemeClr val="accent1">
+              <a:shade val="50000"/>
+            </a:schemeClr>
+          </a:lnRef>
+          <a:fillRef idx="1">
+            <a:schemeClr val="accent1"/>
+          </a:fillRef>
+          <a:effectRef idx="0">
+            <a:schemeClr val="accent1"/>
+          </a:effectRef>
+          <a:fontRef idx="minor">
+            <a:schemeClr val="lt1"/>
+          </a:fontRef>
+        </p:style>
+        <p:txBody>
+          <a:bodyPr rtlCol="0" anchor="ctr"/>
+          <a:lstStyle/>
+          <a:p>
+            <a:pPr algn="ctr"/>
+            <a:r>
+              <a:rPr lang="en-US" dirty="0"/>
+              <a:t>HPA</a:t>
+            </a:r>
+          </a:p>
+        </p:txBody>
+      </p:sp>
+      <p:sp>
+        <p:nvSpPr>
+          <p:cNvPr id="15" name="Kube Controller">
+            <a:extLst>
+              <a:ext uri="{FF2B5EF4-FFF2-40B4-BE49-F238E27FC236}">
+                <a16:creationId xmlns:a16="http://schemas.microsoft.com/office/drawing/2014/main" id="{B7FB56F5-A64A-544B-A99D-5B6DCBC9894B}"/>
+              </a:ext>
+            </a:extLst>
+          </p:cNvPr>
+          <p:cNvSpPr/>
+          <p:nvPr/>
+        </p:nvSpPr>
+        <p:spPr>
+          <a:xfrm>
+            <a:off x="2917147" y="869149"/>
+            <a:ext cx="1304871" cy="850391"/>
+          </a:xfrm>
+          <a:prstGeom prst="rect">
+            <a:avLst/>
+          </a:prstGeom>
+          <a:solidFill>
+            <a:srgbClr val="316AE1"/>
+          </a:solidFill>
+        </p:spPr>
+        <p:style>
+          <a:lnRef idx="2">
+            <a:schemeClr val="accent1">
+              <a:shade val="50000"/>
+            </a:schemeClr>
+          </a:lnRef>
+          <a:fillRef idx="1">
+            <a:schemeClr val="accent1"/>
+          </a:fillRef>
+          <a:effectRef idx="0">
+            <a:schemeClr val="accent1"/>
+          </a:effectRef>
+          <a:fontRef idx="minor">
+            <a:schemeClr val="lt1"/>
+          </a:fontRef>
+        </p:style>
+        <p:txBody>
+          <a:bodyPr rtlCol="0" anchor="ctr"/>
+          <a:lstStyle/>
+          <a:p>
+            <a:pPr algn="ctr"/>
+            <a:r>
+              <a:rPr lang="en-US" dirty="0"/>
+              <a:t>Kubernetes Controllers</a:t>
+            </a:r>
+          </a:p>
+        </p:txBody>
+      </p:sp>
+      <p:pic>
+        <p:nvPicPr>
+          <p:cNvPr id="16" name="kubectl" descr="Captain">
+            <a:extLst>
+              <a:ext uri="{FF2B5EF4-FFF2-40B4-BE49-F238E27FC236}">
+                <a16:creationId xmlns:a16="http://schemas.microsoft.com/office/drawing/2014/main" id="{1C59ADC6-90B1-1547-926F-41E3DDC72F32}"/>
+              </a:ext>
+            </a:extLst>
+          </p:cNvPr>
+          <p:cNvPicPr>
+            <a:picLocks noChangeAspect="1"/>
+          </p:cNvPicPr>
+          <p:nvPr/>
+        </p:nvPicPr>
+        <p:blipFill>
+          <a:blip r:embed="rId3">
+            <a:extLst>
+              <a:ext uri="{96DAC541-7B7A-43D3-8B79-37D633B846F1}">
+                <asvg:svgBlip xmlns:asvg="http://schemas.microsoft.com/office/drawing/2016/SVG/main" r:embed="rId4"/>
+              </a:ext>
+            </a:extLst>
+          </a:blip>
+          <a:stretch>
+            <a:fillRect/>
+          </a:stretch>
+        </p:blipFill>
+        <p:spPr>
+          <a:xfrm>
+            <a:off x="7863851" y="4681261"/>
+            <a:ext cx="914400" cy="914400"/>
+          </a:xfrm>
+          <a:prstGeom prst="rect">
+            <a:avLst/>
+          </a:prstGeom>
+        </p:spPr>
+      </p:pic>
+      <p:cxnSp>
+        <p:nvCxnSpPr>
+          <p:cNvPr id="17" name="f kubectl t target" descr="Create Target">
+            <a:extLst>
+              <a:ext uri="{FF2B5EF4-FFF2-40B4-BE49-F238E27FC236}">
+                <a16:creationId xmlns:a16="http://schemas.microsoft.com/office/drawing/2014/main" id="{04A0A9D5-6813-3349-96F4-856999B35A79}"/>
+              </a:ext>
+            </a:extLst>
+          </p:cNvPr>
+          <p:cNvCxnSpPr>
+            <a:cxnSpLocks/>
+          </p:cNvCxnSpPr>
+          <p:nvPr/>
+        </p:nvCxnSpPr>
+        <p:spPr>
+          <a:xfrm flipH="1" flipV="1">
+            <a:off x="4113558" y="3165920"/>
+            <a:ext cx="3750296" cy="1773648"/>
+          </a:xfrm>
+          <a:prstGeom prst="straightConnector1">
+            <a:avLst/>
+          </a:prstGeom>
+          <a:ln w="19050">
+            <a:tailEnd type="triangle"/>
+          </a:ln>
+        </p:spPr>
+        <p:style>
+          <a:lnRef idx="1">
+            <a:schemeClr val="accent1"/>
+          </a:lnRef>
+          <a:fillRef idx="0">
+            <a:schemeClr val="accent1"/>
+          </a:fillRef>
+          <a:effectRef idx="0">
+            <a:schemeClr val="accent1"/>
+          </a:effectRef>
+          <a:fontRef idx="minor">
+            <a:schemeClr val="tx1"/>
+          </a:fontRef>
+        </p:style>
+      </p:cxnSp>
+      <p:cxnSp>
+        <p:nvCxnSpPr>
+          <p:cNvPr id="24" name="f kube-controller t hpa">
+            <a:extLst>
+              <a:ext uri="{FF2B5EF4-FFF2-40B4-BE49-F238E27FC236}">
+                <a16:creationId xmlns:a16="http://schemas.microsoft.com/office/drawing/2014/main" id="{219197AF-1CAB-C441-8E6F-A90B2DD65C24}"/>
+              </a:ext>
+            </a:extLst>
+          </p:cNvPr>
+          <p:cNvCxnSpPr>
+            <a:cxnSpLocks/>
+          </p:cNvCxnSpPr>
+          <p:nvPr/>
+        </p:nvCxnSpPr>
+        <p:spPr>
+          <a:xfrm flipH="1">
+            <a:off x="1649339" y="1598064"/>
+            <a:ext cx="1136590" cy="1164064"/>
+          </a:xfrm>
+          <a:prstGeom prst="straightConnector1">
+            <a:avLst/>
+          </a:prstGeom>
+          <a:ln w="19050">
+            <a:tailEnd type="triangle"/>
+          </a:ln>
+        </p:spPr>
+        <p:style>
+          <a:lnRef idx="1">
+            <a:schemeClr val="accent1"/>
+          </a:lnRef>
+          <a:fillRef idx="0">
+            <a:schemeClr val="accent1"/>
+          </a:fillRef>
+          <a:effectRef idx="0">
+            <a:schemeClr val="accent1"/>
+          </a:effectRef>
+          <a:fontRef idx="minor">
+            <a:schemeClr val="tx1"/>
+          </a:fontRef>
+        </p:style>
+      </p:cxnSp>
+      <p:cxnSp>
+        <p:nvCxnSpPr>
+          <p:cNvPr id="26" name="f kube-controller t keda">
+            <a:extLst>
+              <a:ext uri="{FF2B5EF4-FFF2-40B4-BE49-F238E27FC236}">
+                <a16:creationId xmlns:a16="http://schemas.microsoft.com/office/drawing/2014/main" id="{20AAE950-D83C-3E40-9CBA-E255F2603478}"/>
+              </a:ext>
+            </a:extLst>
+          </p:cNvPr>
+          <p:cNvCxnSpPr>
+            <a:cxnSpLocks/>
+          </p:cNvCxnSpPr>
+          <p:nvPr/>
+        </p:nvCxnSpPr>
+        <p:spPr>
+          <a:xfrm>
+            <a:off x="3569676" y="1798716"/>
+            <a:ext cx="0" cy="636753"/>
+          </a:xfrm>
+          <a:prstGeom prst="straightConnector1">
+            <a:avLst/>
+          </a:prstGeom>
+          <a:ln w="19050">
+            <a:tailEnd type="triangle"/>
+          </a:ln>
+        </p:spPr>
+        <p:style>
+          <a:lnRef idx="1">
+            <a:schemeClr val="accent1"/>
+          </a:lnRef>
+          <a:fillRef idx="0">
+            <a:schemeClr val="accent1"/>
+          </a:fillRef>
+          <a:effectRef idx="0">
+            <a:schemeClr val="accent1"/>
+          </a:effectRef>
+          <a:fontRef idx="minor">
+            <a:schemeClr val="tx1"/>
+          </a:fontRef>
+        </p:style>
+      </p:cxnSp>
+      <p:sp>
+        <p:nvSpPr>
+          <p:cNvPr id="27" name="text 1 to more">
+            <a:extLst>
+              <a:ext uri="{FF2B5EF4-FFF2-40B4-BE49-F238E27FC236}">
+                <a16:creationId xmlns:a16="http://schemas.microsoft.com/office/drawing/2014/main" id="{50D3A479-C983-F343-A498-493CDB982F89}"/>
+              </a:ext>
+            </a:extLst>
+          </p:cNvPr>
+          <p:cNvSpPr txBox="1"/>
+          <p:nvPr/>
+        </p:nvSpPr>
+        <p:spPr>
+          <a:xfrm>
+            <a:off x="2638040" y="1904692"/>
+            <a:ext cx="2049497" cy="338554"/>
+          </a:xfrm>
+          <a:prstGeom prst="rect">
+            <a:avLst/>
+          </a:prstGeom>
+          <a:noFill/>
+        </p:spPr>
+        <p:txBody>
+          <a:bodyPr wrap="square" rtlCol="0">
+            <a:spAutoFit/>
+          </a:bodyPr>
+          <a:lstStyle/>
+          <a:p>
+            <a:r>
+              <a:rPr lang="en-US" sz="1600" dirty="0"/>
+              <a:t>1 to more / more to 1</a:t>
+            </a:r>
+          </a:p>
+        </p:txBody>
+      </p:sp>
+      <p:cxnSp>
+        <p:nvCxnSpPr>
+          <p:cNvPr id="28" name="f kubectl t HPA" descr="Create Target">
+            <a:extLst>
+              <a:ext uri="{FF2B5EF4-FFF2-40B4-BE49-F238E27FC236}">
+                <a16:creationId xmlns:a16="http://schemas.microsoft.com/office/drawing/2014/main" id="{022E64A3-1B3F-B24B-8DB6-16D1F2DB411D}"/>
+              </a:ext>
+            </a:extLst>
+          </p:cNvPr>
+          <p:cNvCxnSpPr>
+            <a:cxnSpLocks/>
+          </p:cNvCxnSpPr>
+          <p:nvPr/>
+        </p:nvCxnSpPr>
+        <p:spPr>
+          <a:xfrm flipH="1" flipV="1">
+            <a:off x="1877804" y="3488987"/>
+            <a:ext cx="5986047" cy="1669927"/>
+          </a:xfrm>
+          <a:prstGeom prst="straightConnector1">
+            <a:avLst/>
+          </a:prstGeom>
+          <a:ln w="19050">
+            <a:tailEnd type="triangle"/>
+          </a:ln>
+        </p:spPr>
+        <p:style>
+          <a:lnRef idx="1">
+            <a:schemeClr val="accent1"/>
+          </a:lnRef>
+          <a:fillRef idx="0">
+            <a:schemeClr val="accent1"/>
+          </a:fillRef>
+          <a:effectRef idx="0">
+            <a:schemeClr val="accent1"/>
+          </a:effectRef>
+          <a:fontRef idx="minor">
+            <a:schemeClr val="tx1"/>
+          </a:fontRef>
+        </p:style>
+      </p:cxnSp>
+      <p:cxnSp>
+        <p:nvCxnSpPr>
+          <p:cNvPr id="31" name="kube-controller to k8s">
+            <a:extLst>
+              <a:ext uri="{FF2B5EF4-FFF2-40B4-BE49-F238E27FC236}">
+                <a16:creationId xmlns:a16="http://schemas.microsoft.com/office/drawing/2014/main" id="{B220B7A4-1290-824D-901D-3B301B338008}"/>
+              </a:ext>
+            </a:extLst>
+          </p:cNvPr>
+          <p:cNvCxnSpPr/>
+          <p:nvPr/>
+        </p:nvCxnSpPr>
+        <p:spPr>
+          <a:xfrm flipV="1">
+            <a:off x="4382219" y="690113"/>
+            <a:ext cx="2303253" cy="439947"/>
+          </a:xfrm>
+          <a:prstGeom prst="straightConnector1">
+            <a:avLst/>
+          </a:prstGeom>
+          <a:ln w="19050">
+            <a:tailEnd type="triangle"/>
+          </a:ln>
+        </p:spPr>
+        <p:style>
+          <a:lnRef idx="1">
+            <a:schemeClr val="accent1"/>
+          </a:lnRef>
+          <a:fillRef idx="0">
+            <a:schemeClr val="accent1"/>
+          </a:fillRef>
+          <a:effectRef idx="0">
+            <a:schemeClr val="accent1"/>
+          </a:effectRef>
+          <a:fontRef idx="minor">
+            <a:schemeClr val="tx1"/>
+          </a:fontRef>
+        </p:style>
+      </p:cxnSp>
+      <p:sp>
+        <p:nvSpPr>
+          <p:cNvPr id="32" name="TextBox 31">
+            <a:extLst>
+              <a:ext uri="{FF2B5EF4-FFF2-40B4-BE49-F238E27FC236}">
+                <a16:creationId xmlns:a16="http://schemas.microsoft.com/office/drawing/2014/main" id="{A512A620-8245-CB4B-A79D-EC86077A749E}"/>
+              </a:ext>
+            </a:extLst>
+          </p:cNvPr>
+          <p:cNvSpPr txBox="1"/>
+          <p:nvPr/>
+        </p:nvSpPr>
+        <p:spPr>
+          <a:xfrm>
+            <a:off x="5842672" y="499817"/>
+            <a:ext cx="292068" cy="369332"/>
+          </a:xfrm>
+          <a:prstGeom prst="rect">
+            <a:avLst/>
+          </a:prstGeom>
+          <a:noFill/>
+        </p:spPr>
+        <p:txBody>
+          <a:bodyPr wrap="none" rtlCol="0">
+            <a:spAutoFit/>
+          </a:bodyPr>
+          <a:lstStyle/>
+          <a:p>
+            <a:r>
+              <a:rPr lang="en-US" dirty="0"/>
+              <a:t>?</a:t>
+            </a:r>
           </a:p>
         </p:txBody>
       </p:sp>
     </p:spTree>
     <p:extLst>
       <p:ext uri="{BB962C8B-B14F-4D97-AF65-F5344CB8AC3E}">
-        <p14:creationId xmlns:p14="http://schemas.microsoft.com/office/powerpoint/2010/main" val="950693121"/>
+        <p14:creationId xmlns:p14="http://schemas.microsoft.com/office/powerpoint/2010/main" val="1613341757"/>
       </p:ext>
     </p:extLst>
   </p:cSld>
   <p:clrMapOvr>
     <a:masterClrMapping/>
   </p:clrMapOvr>
+  <p:timing>
+    <p:tnLst>
+      <p:par>
+        <p:cTn id="1" dur="indefinite" restart="never" nodeType="tmRoot">
+          <p:childTnLst>
+            <p:seq concurrent="1" nextAc="seek">
+              <p:cTn id="2" dur="indefinite" nodeType="mainSeq">
+                <p:childTnLst>
+                  <p:par>
+                    <p:cTn id="3" fill="hold">
+                      <p:stCondLst>
+                        <p:cond delay="indefinite"/>
+                      </p:stCondLst>
+                      <p:childTnLst>
+                        <p:par>
+                          <p:cTn id="4" fill="hold">
+                            <p:stCondLst>
+                              <p:cond delay="0"/>
+                            </p:stCondLst>
+                            <p:childTnLst>
+                              <p:par>
+                                <p:cTn id="5" presetID="10" presetClass="entr" presetSubtype="0" fill="hold" grpId="0" nodeType="clickEffect">
+                                  <p:stCondLst>
+                                    <p:cond delay="0"/>
+                                  </p:stCondLst>
+                                  <p:childTnLst>
+                                    <p:set>
+                                      <p:cBhvr>
+                                        <p:cTn id="6" dur="1" fill="hold">
+                                          <p:stCondLst>
+                                            <p:cond delay="0"/>
+                                          </p:stCondLst>
+                                        </p:cTn>
+                                        <p:tgtEl>
+                                          <p:spTgt spid="7"/>
+                                        </p:tgtEl>
+                                        <p:attrNameLst>
+                                          <p:attrName>style.visibility</p:attrName>
+                                        </p:attrNameLst>
+                                      </p:cBhvr>
+                                      <p:to>
+                                        <p:strVal val="visible"/>
+                                      </p:to>
+                                    </p:set>
+                                    <p:animEffect transition="in" filter="fade">
+                                      <p:cBhvr>
+                                        <p:cTn id="7" dur="500"/>
+                                        <p:tgtEl>
+                                          <p:spTgt spid="7"/>
+                                        </p:tgtEl>
+                                      </p:cBhvr>
+                                    </p:animEffect>
+                                  </p:childTnLst>
+                                </p:cTn>
+                              </p:par>
+                              <p:par>
+                                <p:cTn id="8" presetID="10" presetClass="entr" presetSubtype="0" fill="hold" nodeType="withEffect">
+                                  <p:stCondLst>
+                                    <p:cond delay="0"/>
+                                  </p:stCondLst>
+                                  <p:childTnLst>
+                                    <p:set>
+                                      <p:cBhvr>
+                                        <p:cTn id="9" dur="1" fill="hold">
+                                          <p:stCondLst>
+                                            <p:cond delay="0"/>
+                                          </p:stCondLst>
+                                        </p:cTn>
+                                        <p:tgtEl>
+                                          <p:spTgt spid="17"/>
+                                        </p:tgtEl>
+                                        <p:attrNameLst>
+                                          <p:attrName>style.visibility</p:attrName>
+                                        </p:attrNameLst>
+                                      </p:cBhvr>
+                                      <p:to>
+                                        <p:strVal val="visible"/>
+                                      </p:to>
+                                    </p:set>
+                                    <p:animEffect transition="in" filter="fade">
+                                      <p:cBhvr>
+                                        <p:cTn id="10" dur="500"/>
+                                        <p:tgtEl>
+                                          <p:spTgt spid="17"/>
+                                        </p:tgtEl>
+                                      </p:cBhvr>
+                                    </p:animEffect>
+                                  </p:childTnLst>
+                                </p:cTn>
+                              </p:par>
+                            </p:childTnLst>
+                          </p:cTn>
+                        </p:par>
+                      </p:childTnLst>
+                    </p:cTn>
+                  </p:par>
+                  <p:par>
+                    <p:cTn id="11" fill="hold">
+                      <p:stCondLst>
+                        <p:cond delay="indefinite"/>
+                      </p:stCondLst>
+                      <p:childTnLst>
+                        <p:par>
+                          <p:cTn id="12" fill="hold">
+                            <p:stCondLst>
+                              <p:cond delay="0"/>
+                            </p:stCondLst>
+                            <p:childTnLst>
+                              <p:par>
+                                <p:cTn id="13" presetID="1" presetClass="exit" presetSubtype="0" fill="hold" nodeType="clickEffect">
+                                  <p:stCondLst>
+                                    <p:cond delay="0"/>
+                                  </p:stCondLst>
+                                  <p:childTnLst>
+                                    <p:set>
+                                      <p:cBhvr>
+                                        <p:cTn id="14" dur="1" fill="hold">
+                                          <p:stCondLst>
+                                            <p:cond delay="0"/>
+                                          </p:stCondLst>
+                                        </p:cTn>
+                                        <p:tgtEl>
+                                          <p:spTgt spid="17"/>
+                                        </p:tgtEl>
+                                        <p:attrNameLst>
+                                          <p:attrName>style.visibility</p:attrName>
+                                        </p:attrNameLst>
+                                      </p:cBhvr>
+                                      <p:to>
+                                        <p:strVal val="hidden"/>
+                                      </p:to>
+                                    </p:set>
+                                  </p:childTnLst>
+                                </p:cTn>
+                              </p:par>
+                            </p:childTnLst>
+                          </p:cTn>
+                        </p:par>
+                      </p:childTnLst>
+                    </p:cTn>
+                  </p:par>
+                  <p:par>
+                    <p:cTn id="15" fill="hold">
+                      <p:stCondLst>
+                        <p:cond delay="indefinite"/>
+                      </p:stCondLst>
+                      <p:childTnLst>
+                        <p:par>
+                          <p:cTn id="16" fill="hold">
+                            <p:stCondLst>
+                              <p:cond delay="0"/>
+                            </p:stCondLst>
+                            <p:childTnLst>
+                              <p:par>
+                                <p:cTn id="17" presetID="10" presetClass="entr" presetSubtype="0" fill="hold" grpId="0" nodeType="clickEffect">
+                                  <p:stCondLst>
+                                    <p:cond delay="0"/>
+                                  </p:stCondLst>
+                                  <p:childTnLst>
+                                    <p:set>
+                                      <p:cBhvr>
+                                        <p:cTn id="18" dur="1" fill="hold">
+                                          <p:stCondLst>
+                                            <p:cond delay="0"/>
+                                          </p:stCondLst>
+                                        </p:cTn>
+                                        <p:tgtEl>
+                                          <p:spTgt spid="14"/>
+                                        </p:tgtEl>
+                                        <p:attrNameLst>
+                                          <p:attrName>style.visibility</p:attrName>
+                                        </p:attrNameLst>
+                                      </p:cBhvr>
+                                      <p:to>
+                                        <p:strVal val="visible"/>
+                                      </p:to>
+                                    </p:set>
+                                    <p:animEffect transition="in" filter="fade">
+                                      <p:cBhvr>
+                                        <p:cTn id="19" dur="500"/>
+                                        <p:tgtEl>
+                                          <p:spTgt spid="14"/>
+                                        </p:tgtEl>
+                                      </p:cBhvr>
+                                    </p:animEffect>
+                                  </p:childTnLst>
+                                </p:cTn>
+                              </p:par>
+                              <p:par>
+                                <p:cTn id="20" presetID="10" presetClass="entr" presetSubtype="0" fill="hold" nodeType="withEffect">
+                                  <p:stCondLst>
+                                    <p:cond delay="0"/>
+                                  </p:stCondLst>
+                                  <p:childTnLst>
+                                    <p:set>
+                                      <p:cBhvr>
+                                        <p:cTn id="21" dur="1" fill="hold">
+                                          <p:stCondLst>
+                                            <p:cond delay="0"/>
+                                          </p:stCondLst>
+                                        </p:cTn>
+                                        <p:tgtEl>
+                                          <p:spTgt spid="28"/>
+                                        </p:tgtEl>
+                                        <p:attrNameLst>
+                                          <p:attrName>style.visibility</p:attrName>
+                                        </p:attrNameLst>
+                                      </p:cBhvr>
+                                      <p:to>
+                                        <p:strVal val="visible"/>
+                                      </p:to>
+                                    </p:set>
+                                    <p:animEffect transition="in" filter="fade">
+                                      <p:cBhvr>
+                                        <p:cTn id="22" dur="500"/>
+                                        <p:tgtEl>
+                                          <p:spTgt spid="28"/>
+                                        </p:tgtEl>
+                                      </p:cBhvr>
+                                    </p:animEffect>
+                                  </p:childTnLst>
+                                </p:cTn>
+                              </p:par>
+                            </p:childTnLst>
+                          </p:cTn>
+                        </p:par>
+                      </p:childTnLst>
+                    </p:cTn>
+                  </p:par>
+                  <p:par>
+                    <p:cTn id="23" fill="hold">
+                      <p:stCondLst>
+                        <p:cond delay="indefinite"/>
+                      </p:stCondLst>
+                      <p:childTnLst>
+                        <p:par>
+                          <p:cTn id="24" fill="hold">
+                            <p:stCondLst>
+                              <p:cond delay="0"/>
+                            </p:stCondLst>
+                            <p:childTnLst>
+                              <p:par>
+                                <p:cTn id="25" presetID="1" presetClass="exit" presetSubtype="0" fill="hold" nodeType="clickEffect">
+                                  <p:stCondLst>
+                                    <p:cond delay="0"/>
+                                  </p:stCondLst>
+                                  <p:childTnLst>
+                                    <p:set>
+                                      <p:cBhvr>
+                                        <p:cTn id="26" dur="1" fill="hold">
+                                          <p:stCondLst>
+                                            <p:cond delay="0"/>
+                                          </p:stCondLst>
+                                        </p:cTn>
+                                        <p:tgtEl>
+                                          <p:spTgt spid="28"/>
+                                        </p:tgtEl>
+                                        <p:attrNameLst>
+                                          <p:attrName>style.visibility</p:attrName>
+                                        </p:attrNameLst>
+                                      </p:cBhvr>
+                                      <p:to>
+                                        <p:strVal val="hidden"/>
+                                      </p:to>
+                                    </p:set>
+                                  </p:childTnLst>
+                                </p:cTn>
+                              </p:par>
+                            </p:childTnLst>
+                          </p:cTn>
+                        </p:par>
+                      </p:childTnLst>
+                    </p:cTn>
+                  </p:par>
+                  <p:par>
+                    <p:cTn id="27" fill="hold">
+                      <p:stCondLst>
+                        <p:cond delay="indefinite"/>
+                      </p:stCondLst>
+                      <p:childTnLst>
+                        <p:par>
+                          <p:cTn id="28" fill="hold">
+                            <p:stCondLst>
+                              <p:cond delay="0"/>
+                            </p:stCondLst>
+                            <p:childTnLst>
+                              <p:par>
+                                <p:cTn id="29" presetID="10" presetClass="entr" presetSubtype="0" fill="hold" nodeType="clickEffect">
+                                  <p:stCondLst>
+                                    <p:cond delay="0"/>
+                                  </p:stCondLst>
+                                  <p:childTnLst>
+                                    <p:set>
+                                      <p:cBhvr>
+                                        <p:cTn id="30" dur="1" fill="hold">
+                                          <p:stCondLst>
+                                            <p:cond delay="0"/>
+                                          </p:stCondLst>
+                                        </p:cTn>
+                                        <p:tgtEl>
+                                          <p:spTgt spid="24"/>
+                                        </p:tgtEl>
+                                        <p:attrNameLst>
+                                          <p:attrName>style.visibility</p:attrName>
+                                        </p:attrNameLst>
+                                      </p:cBhvr>
+                                      <p:to>
+                                        <p:strVal val="visible"/>
+                                      </p:to>
+                                    </p:set>
+                                    <p:animEffect transition="in" filter="fade">
+                                      <p:cBhvr>
+                                        <p:cTn id="31" dur="500"/>
+                                        <p:tgtEl>
+                                          <p:spTgt spid="24"/>
+                                        </p:tgtEl>
+                                      </p:cBhvr>
+                                    </p:animEffect>
+                                  </p:childTnLst>
+                                </p:cTn>
+                              </p:par>
+                            </p:childTnLst>
+                          </p:cTn>
+                        </p:par>
+                      </p:childTnLst>
+                    </p:cTn>
+                  </p:par>
+                  <p:par>
+                    <p:cTn id="32" fill="hold">
+                      <p:stCondLst>
+                        <p:cond delay="indefinite"/>
+                      </p:stCondLst>
+                      <p:childTnLst>
+                        <p:par>
+                          <p:cTn id="33" fill="hold">
+                            <p:stCondLst>
+                              <p:cond delay="0"/>
+                            </p:stCondLst>
+                            <p:childTnLst>
+                              <p:par>
+                                <p:cTn id="34" presetID="10" presetClass="entr" presetSubtype="0" fill="hold" nodeType="clickEffect">
+                                  <p:stCondLst>
+                                    <p:cond delay="0"/>
+                                  </p:stCondLst>
+                                  <p:childTnLst>
+                                    <p:set>
+                                      <p:cBhvr>
+                                        <p:cTn id="35" dur="1" fill="hold">
+                                          <p:stCondLst>
+                                            <p:cond delay="0"/>
+                                          </p:stCondLst>
+                                        </p:cTn>
+                                        <p:tgtEl>
+                                          <p:spTgt spid="26"/>
+                                        </p:tgtEl>
+                                        <p:attrNameLst>
+                                          <p:attrName>style.visibility</p:attrName>
+                                        </p:attrNameLst>
+                                      </p:cBhvr>
+                                      <p:to>
+                                        <p:strVal val="visible"/>
+                                      </p:to>
+                                    </p:set>
+                                    <p:animEffect transition="in" filter="fade">
+                                      <p:cBhvr>
+                                        <p:cTn id="36" dur="500"/>
+                                        <p:tgtEl>
+                                          <p:spTgt spid="26"/>
+                                        </p:tgtEl>
+                                      </p:cBhvr>
+                                    </p:animEffect>
+                                  </p:childTnLst>
+                                </p:cTn>
+                              </p:par>
+                              <p:par>
+                                <p:cTn id="37" presetID="10" presetClass="entr" presetSubtype="0" fill="hold" grpId="0" nodeType="withEffect">
+                                  <p:stCondLst>
+                                    <p:cond delay="0"/>
+                                  </p:stCondLst>
+                                  <p:childTnLst>
+                                    <p:set>
+                                      <p:cBhvr>
+                                        <p:cTn id="38" dur="1" fill="hold">
+                                          <p:stCondLst>
+                                            <p:cond delay="0"/>
+                                          </p:stCondLst>
+                                        </p:cTn>
+                                        <p:tgtEl>
+                                          <p:spTgt spid="27"/>
+                                        </p:tgtEl>
+                                        <p:attrNameLst>
+                                          <p:attrName>style.visibility</p:attrName>
+                                        </p:attrNameLst>
+                                      </p:cBhvr>
+                                      <p:to>
+                                        <p:strVal val="visible"/>
+                                      </p:to>
+                                    </p:set>
+                                    <p:animEffect transition="in" filter="fade">
+                                      <p:cBhvr>
+                                        <p:cTn id="39" dur="500"/>
+                                        <p:tgtEl>
+                                          <p:spTgt spid="27"/>
+                                        </p:tgtEl>
+                                      </p:cBhvr>
+                                    </p:animEffect>
+                                  </p:childTnLst>
+                                </p:cTn>
+                              </p:par>
+                            </p:childTnLst>
+                          </p:cTn>
+                        </p:par>
+                      </p:childTnLst>
+                    </p:cTn>
+                  </p:par>
+                  <p:par>
+                    <p:cTn id="40" fill="hold">
+                      <p:stCondLst>
+                        <p:cond delay="indefinite"/>
+                      </p:stCondLst>
+                      <p:childTnLst>
+                        <p:par>
+                          <p:cTn id="41" fill="hold">
+                            <p:stCondLst>
+                              <p:cond delay="0"/>
+                            </p:stCondLst>
+                            <p:childTnLst>
+                              <p:par>
+                                <p:cTn id="42" presetID="10" presetClass="entr" presetSubtype="0" fill="hold" grpId="0" nodeType="clickEffect">
+                                  <p:stCondLst>
+                                    <p:cond delay="0"/>
+                                  </p:stCondLst>
+                                  <p:childTnLst>
+                                    <p:set>
+                                      <p:cBhvr>
+                                        <p:cTn id="43" dur="1" fill="hold">
+                                          <p:stCondLst>
+                                            <p:cond delay="0"/>
+                                          </p:stCondLst>
+                                        </p:cTn>
+                                        <p:tgtEl>
+                                          <p:spTgt spid="32"/>
+                                        </p:tgtEl>
+                                        <p:attrNameLst>
+                                          <p:attrName>style.visibility</p:attrName>
+                                        </p:attrNameLst>
+                                      </p:cBhvr>
+                                      <p:to>
+                                        <p:strVal val="visible"/>
+                                      </p:to>
+                                    </p:set>
+                                    <p:animEffect transition="in" filter="fade">
+                                      <p:cBhvr>
+                                        <p:cTn id="44" dur="500"/>
+                                        <p:tgtEl>
+                                          <p:spTgt spid="32"/>
+                                        </p:tgtEl>
+                                      </p:cBhvr>
+                                    </p:animEffect>
+                                  </p:childTnLst>
+                                </p:cTn>
+                              </p:par>
+                              <p:par>
+                                <p:cTn id="45" presetID="10" presetClass="entr" presetSubtype="0" fill="hold" nodeType="withEffect">
+                                  <p:stCondLst>
+                                    <p:cond delay="0"/>
+                                  </p:stCondLst>
+                                  <p:childTnLst>
+                                    <p:set>
+                                      <p:cBhvr>
+                                        <p:cTn id="46" dur="1" fill="hold">
+                                          <p:stCondLst>
+                                            <p:cond delay="0"/>
+                                          </p:stCondLst>
+                                        </p:cTn>
+                                        <p:tgtEl>
+                                          <p:spTgt spid="31"/>
+                                        </p:tgtEl>
+                                        <p:attrNameLst>
+                                          <p:attrName>style.visibility</p:attrName>
+                                        </p:attrNameLst>
+                                      </p:cBhvr>
+                                      <p:to>
+                                        <p:strVal val="visible"/>
+                                      </p:to>
+                                    </p:set>
+                                    <p:animEffect transition="in" filter="fade">
+                                      <p:cBhvr>
+                                        <p:cTn id="47" dur="500"/>
+                                        <p:tgtEl>
+                                          <p:spTgt spid="31"/>
+                                        </p:tgtEl>
+                                      </p:cBhvr>
+                                    </p:animEffect>
+                                  </p:childTnLst>
+                                </p:cTn>
+                              </p:par>
+                            </p:childTnLst>
+                          </p:cTn>
+                        </p:par>
+                      </p:childTnLst>
+                    </p:cTn>
+                  </p:par>
+                </p:childTnLst>
+              </p:cTn>
+              <p:prevCondLst>
+                <p:cond evt="onPrev" delay="0">
+                  <p:tgtEl>
+                    <p:sldTgt/>
+                  </p:tgtEl>
+                </p:cond>
+              </p:prevCondLst>
+              <p:nextCondLst>
+                <p:cond evt="onNext" delay="0">
+                  <p:tgtEl>
+                    <p:sldTgt/>
+                  </p:tgtEl>
+                </p:cond>
+              </p:nextCondLst>
+            </p:seq>
+          </p:childTnLst>
+        </p:cTn>
+      </p:par>
+    </p:tnLst>
+    <p:bldLst>
+      <p:bldP spid="7" grpId="0" animBg="1"/>
+      <p:bldP spid="14" grpId="0" animBg="1"/>
+      <p:bldP spid="27" grpId="0"/>
+      <p:bldP spid="32" grpId="0"/>
+    </p:bldLst>
+  </p:timing>
 </p:sld>
 </file>
 
@@ -3624,6 +6519,291 @@
       </p:grpSpPr>
       <p:sp>
         <p:nvSpPr>
+          <p:cNvPr id="2" name="Title 1">
+            <a:extLst>
+              <a:ext uri="{FF2B5EF4-FFF2-40B4-BE49-F238E27FC236}">
+                <a16:creationId xmlns:a16="http://schemas.microsoft.com/office/drawing/2014/main" id="{99D8DFFE-7F86-A44D-A4D5-1F9B7BC41356}"/>
+              </a:ext>
+            </a:extLst>
+          </p:cNvPr>
+          <p:cNvSpPr>
+            <a:spLocks noGrp="1"/>
+          </p:cNvSpPr>
+          <p:nvPr>
+            <p:ph type="title"/>
+          </p:nvPr>
+        </p:nvSpPr>
+        <p:spPr/>
+        <p:txBody>
+          <a:bodyPr/>
+          <a:lstStyle/>
+          <a:p>
+            <a:r>
+              <a:rPr lang="en-US" dirty="0"/>
+              <a:t>Problems with HPA only</a:t>
+            </a:r>
+          </a:p>
+        </p:txBody>
+      </p:sp>
+      <p:sp>
+        <p:nvSpPr>
+          <p:cNvPr id="3" name="Content Placeholder 2">
+            <a:extLst>
+              <a:ext uri="{FF2B5EF4-FFF2-40B4-BE49-F238E27FC236}">
+                <a16:creationId xmlns:a16="http://schemas.microsoft.com/office/drawing/2014/main" id="{7C1314C0-3165-D74D-BDB0-CFD6BAE2A7F9}"/>
+              </a:ext>
+            </a:extLst>
+          </p:cNvPr>
+          <p:cNvSpPr>
+            <a:spLocks noGrp="1"/>
+          </p:cNvSpPr>
+          <p:nvPr>
+            <p:ph idx="1"/>
+          </p:nvPr>
+        </p:nvSpPr>
+        <p:spPr/>
+        <p:txBody>
+          <a:bodyPr/>
+          <a:lstStyle/>
+          <a:p>
+            <a:r>
+              <a:rPr lang="en-US" dirty="0"/>
+              <a:t>No “0 to 1” and “1 to 0”</a:t>
+            </a:r>
+          </a:p>
+          <a:p>
+            <a:r>
+              <a:rPr lang="en-US" dirty="0"/>
+              <a:t>Only CPU and Memory by default</a:t>
+            </a:r>
+          </a:p>
+          <a:p>
+            <a:r>
+              <a:rPr lang="en-US" dirty="0"/>
+              <a:t>No easy way for your own scaler</a:t>
+            </a:r>
+          </a:p>
+          <a:p>
+            <a:endParaRPr lang="en-US" dirty="0"/>
+          </a:p>
+          <a:p>
+            <a:endParaRPr lang="en-US" dirty="0"/>
+          </a:p>
+        </p:txBody>
+      </p:sp>
+    </p:spTree>
+    <p:extLst>
+      <p:ext uri="{BB962C8B-B14F-4D97-AF65-F5344CB8AC3E}">
+        <p14:creationId xmlns:p14="http://schemas.microsoft.com/office/powerpoint/2010/main" val="1561030645"/>
+      </p:ext>
+    </p:extLst>
+  </p:cSld>
+  <p:clrMapOvr>
+    <a:masterClrMapping/>
+  </p:clrMapOvr>
+</p:sld>
+</file>
+
+<file path=ppt/slides/slide5.xml><?xml version="1.0" encoding="utf-8"?>
+<p:sld xmlns:a="http://schemas.openxmlformats.org/drawingml/2006/main" xmlns:r="http://schemas.openxmlformats.org/officeDocument/2006/relationships" xmlns:p="http://schemas.openxmlformats.org/presentationml/2006/main">
+  <p:cSld>
+    <p:spTree>
+      <p:nvGrpSpPr>
+        <p:cNvPr id="1" name=""/>
+        <p:cNvGrpSpPr/>
+        <p:nvPr/>
+      </p:nvGrpSpPr>
+      <p:grpSpPr>
+        <a:xfrm>
+          <a:off x="0" y="0"/>
+          <a:ext cx="0" cy="0"/>
+          <a:chOff x="0" y="0"/>
+          <a:chExt cx="0" cy="0"/>
+        </a:xfrm>
+      </p:grpSpPr>
+      <p:sp>
+        <p:nvSpPr>
+          <p:cNvPr id="4" name="Title 3">
+            <a:extLst>
+              <a:ext uri="{FF2B5EF4-FFF2-40B4-BE49-F238E27FC236}">
+                <a16:creationId xmlns:a16="http://schemas.microsoft.com/office/drawing/2014/main" id="{81493473-C789-6340-9A5E-E3B87060176D}"/>
+              </a:ext>
+            </a:extLst>
+          </p:cNvPr>
+          <p:cNvSpPr>
+            <a:spLocks noGrp="1"/>
+          </p:cNvSpPr>
+          <p:nvPr>
+            <p:ph type="ctrTitle"/>
+          </p:nvPr>
+        </p:nvSpPr>
+        <p:spPr/>
+        <p:txBody>
+          <a:bodyPr/>
+          <a:lstStyle/>
+          <a:p>
+            <a:r>
+              <a:rPr lang="en-US" dirty="0"/>
+              <a:t>KEDA’s Role</a:t>
+            </a:r>
+          </a:p>
+        </p:txBody>
+      </p:sp>
+      <p:sp>
+        <p:nvSpPr>
+          <p:cNvPr id="5" name="Subtitle 4">
+            <a:extLst>
+              <a:ext uri="{FF2B5EF4-FFF2-40B4-BE49-F238E27FC236}">
+                <a16:creationId xmlns:a16="http://schemas.microsoft.com/office/drawing/2014/main" id="{3F497F65-F9ED-2A41-B292-E76F7297D8D8}"/>
+              </a:ext>
+            </a:extLst>
+          </p:cNvPr>
+          <p:cNvSpPr>
+            <a:spLocks noGrp="1"/>
+          </p:cNvSpPr>
+          <p:nvPr>
+            <p:ph type="subTitle" idx="1"/>
+          </p:nvPr>
+        </p:nvSpPr>
+        <p:spPr/>
+        <p:txBody>
+          <a:bodyPr/>
+          <a:lstStyle/>
+          <a:p>
+            <a:endParaRPr lang="en-US"/>
+          </a:p>
+        </p:txBody>
+      </p:sp>
+    </p:spTree>
+    <p:extLst>
+      <p:ext uri="{BB962C8B-B14F-4D97-AF65-F5344CB8AC3E}">
+        <p14:creationId xmlns:p14="http://schemas.microsoft.com/office/powerpoint/2010/main" val="950693121"/>
+      </p:ext>
+    </p:extLst>
+  </p:cSld>
+  <p:clrMapOvr>
+    <a:masterClrMapping/>
+  </p:clrMapOvr>
+</p:sld>
+</file>
+
+<file path=ppt/slides/slide6.xml><?xml version="1.0" encoding="utf-8"?>
+<p:sld xmlns:a="http://schemas.openxmlformats.org/drawingml/2006/main" xmlns:r="http://schemas.openxmlformats.org/officeDocument/2006/relationships" xmlns:p="http://schemas.openxmlformats.org/presentationml/2006/main">
+  <p:cSld>
+    <p:spTree>
+      <p:nvGrpSpPr>
+        <p:cNvPr id="1" name=""/>
+        <p:cNvGrpSpPr/>
+        <p:nvPr/>
+      </p:nvGrpSpPr>
+      <p:grpSpPr>
+        <a:xfrm>
+          <a:off x="0" y="0"/>
+          <a:ext cx="0" cy="0"/>
+          <a:chOff x="0" y="0"/>
+          <a:chExt cx="0" cy="0"/>
+        </a:xfrm>
+      </p:grpSpPr>
+      <p:sp>
+        <p:nvSpPr>
+          <p:cNvPr id="2" name="Title 1">
+            <a:extLst>
+              <a:ext uri="{FF2B5EF4-FFF2-40B4-BE49-F238E27FC236}">
+                <a16:creationId xmlns:a16="http://schemas.microsoft.com/office/drawing/2014/main" id="{2A6B3E5D-467D-AE47-A075-E32FC5595D2C}"/>
+              </a:ext>
+            </a:extLst>
+          </p:cNvPr>
+          <p:cNvSpPr>
+            <a:spLocks noGrp="1"/>
+          </p:cNvSpPr>
+          <p:nvPr>
+            <p:ph type="title"/>
+          </p:nvPr>
+        </p:nvSpPr>
+        <p:spPr/>
+        <p:txBody>
+          <a:bodyPr/>
+          <a:lstStyle/>
+          <a:p>
+            <a:r>
+              <a:rPr lang="en-US" dirty="0"/>
+              <a:t>KEDA brings in</a:t>
+            </a:r>
+          </a:p>
+        </p:txBody>
+      </p:sp>
+      <p:sp>
+        <p:nvSpPr>
+          <p:cNvPr id="3" name="Content Placeholder 2">
+            <a:extLst>
+              <a:ext uri="{FF2B5EF4-FFF2-40B4-BE49-F238E27FC236}">
+                <a16:creationId xmlns:a16="http://schemas.microsoft.com/office/drawing/2014/main" id="{173BC152-0E92-2348-851F-2BA8DE523BF5}"/>
+              </a:ext>
+            </a:extLst>
+          </p:cNvPr>
+          <p:cNvSpPr>
+            <a:spLocks noGrp="1"/>
+          </p:cNvSpPr>
+          <p:nvPr>
+            <p:ph idx="1"/>
+          </p:nvPr>
+        </p:nvSpPr>
+        <p:spPr/>
+        <p:txBody>
+          <a:bodyPr/>
+          <a:lstStyle/>
+          <a:p>
+            <a:r>
+              <a:rPr lang="en-US" dirty="0"/>
+              <a:t>Acts as a metric server for many scalers</a:t>
+            </a:r>
+          </a:p>
+          <a:p>
+            <a:r>
+              <a:rPr lang="en-US" dirty="0"/>
+              <a:t>Support for “0 to 1” and “1 to 0”</a:t>
+            </a:r>
+          </a:p>
+          <a:p>
+            <a:r>
+              <a:rPr lang="en-US" dirty="0"/>
+              <a:t>Build your own scaler</a:t>
+            </a:r>
+          </a:p>
+        </p:txBody>
+      </p:sp>
+    </p:spTree>
+    <p:extLst>
+      <p:ext uri="{BB962C8B-B14F-4D97-AF65-F5344CB8AC3E}">
+        <p14:creationId xmlns:p14="http://schemas.microsoft.com/office/powerpoint/2010/main" val="2953676721"/>
+      </p:ext>
+    </p:extLst>
+  </p:cSld>
+  <p:clrMapOvr>
+    <a:masterClrMapping/>
+  </p:clrMapOvr>
+</p:sld>
+</file>
+
+<file path=ppt/slides/slide7.xml><?xml version="1.0" encoding="utf-8"?>
+<p:sld xmlns:a="http://schemas.openxmlformats.org/drawingml/2006/main" xmlns:r="http://schemas.openxmlformats.org/officeDocument/2006/relationships" xmlns:p="http://schemas.openxmlformats.org/presentationml/2006/main">
+  <p:cSld>
+    <p:spTree>
+      <p:nvGrpSpPr>
+        <p:cNvPr id="1" name=""/>
+        <p:cNvGrpSpPr/>
+        <p:nvPr/>
+      </p:nvGrpSpPr>
+      <p:grpSpPr>
+        <a:xfrm>
+          <a:off x="0" y="0"/>
+          <a:ext cx="0" cy="0"/>
+          <a:chOff x="0" y="0"/>
+          <a:chExt cx="0" cy="0"/>
+        </a:xfrm>
+      </p:grpSpPr>
+      <p:sp>
+        <p:nvSpPr>
           <p:cNvPr id="4" name="Title 3">
             <a:extLst>
               <a:ext uri="{FF2B5EF4-FFF2-40B4-BE49-F238E27FC236}">
@@ -3688,7 +6868,7 @@
 </p:sld>
 </file>
 
-<file path=ppt/slides/slide5.xml><?xml version="1.0" encoding="utf-8"?>
+<file path=ppt/slides/slide8.xml><?xml version="1.0" encoding="utf-8"?>
 <p:sld xmlns:a="http://schemas.openxmlformats.org/drawingml/2006/main" xmlns:r="http://schemas.openxmlformats.org/officeDocument/2006/relationships" xmlns:p="http://schemas.openxmlformats.org/presentationml/2006/main">
   <p:cSld>
     <p:spTree>
@@ -5450,7 +8630,7 @@
 </p:sld>
 </file>
 
-<file path=ppt/slides/slide6.xml><?xml version="1.0" encoding="utf-8"?>
+<file path=ppt/slides/slide9.xml><?xml version="1.0" encoding="utf-8"?>
 <p:sld xmlns:a="http://schemas.openxmlformats.org/drawingml/2006/main" xmlns:r="http://schemas.openxmlformats.org/officeDocument/2006/relationships" xmlns:p="http://schemas.openxmlformats.org/presentationml/2006/main">
   <p:cSld>
     <p:spTree>

</xml_diff>

<commit_message>
Add references to the end of the slides
</commit_message>
<xml_diff>
--- a/preso.pptx
+++ b/preso.pptx
@@ -5,7 +5,7 @@
     <p:sldMasterId id="2147483660" r:id="rId1"/>
   </p:sldMasterIdLst>
   <p:notesMasterIdLst>
-    <p:notesMasterId r:id="rId18"/>
+    <p:notesMasterId r:id="rId19"/>
   </p:notesMasterIdLst>
   <p:sldIdLst>
     <p:sldId id="256" r:id="rId2"/>
@@ -24,6 +24,7 @@
     <p:sldId id="265" r:id="rId15"/>
     <p:sldId id="271" r:id="rId16"/>
     <p:sldId id="266" r:id="rId17"/>
+    <p:sldId id="272" r:id="rId18"/>
   </p:sldIdLst>
   <p:sldSz cx="12192000" cy="6858000"/>
   <p:notesSz cx="6858000" cy="9144000"/>
@@ -8813,6 +8814,159 @@
     <p:extLst>
       <p:ext uri="{BB962C8B-B14F-4D97-AF65-F5344CB8AC3E}">
         <p14:creationId xmlns:p14="http://schemas.microsoft.com/office/powerpoint/2010/main" val="2823262607"/>
+      </p:ext>
+    </p:extLst>
+  </p:cSld>
+  <p:clrMapOvr>
+    <a:masterClrMapping/>
+  </p:clrMapOvr>
+</p:sld>
+</file>
+
+<file path=ppt/slides/slide17.xml><?xml version="1.0" encoding="utf-8"?>
+<p:sld xmlns:a="http://schemas.openxmlformats.org/drawingml/2006/main" xmlns:r="http://schemas.openxmlformats.org/officeDocument/2006/relationships" xmlns:p="http://schemas.openxmlformats.org/presentationml/2006/main">
+  <p:cSld>
+    <p:spTree>
+      <p:nvGrpSpPr>
+        <p:cNvPr id="1" name=""/>
+        <p:cNvGrpSpPr/>
+        <p:nvPr/>
+      </p:nvGrpSpPr>
+      <p:grpSpPr>
+        <a:xfrm>
+          <a:off x="0" y="0"/>
+          <a:ext cx="0" cy="0"/>
+          <a:chOff x="0" y="0"/>
+          <a:chExt cx="0" cy="0"/>
+        </a:xfrm>
+      </p:grpSpPr>
+      <p:sp>
+        <p:nvSpPr>
+          <p:cNvPr id="2" name="Title 1">
+            <a:extLst>
+              <a:ext uri="{FF2B5EF4-FFF2-40B4-BE49-F238E27FC236}">
+                <a16:creationId xmlns:a16="http://schemas.microsoft.com/office/drawing/2014/main" id="{2D1D3786-4DD3-7C48-9A94-B341A7FFFB85}"/>
+              </a:ext>
+            </a:extLst>
+          </p:cNvPr>
+          <p:cNvSpPr>
+            <a:spLocks noGrp="1"/>
+          </p:cNvSpPr>
+          <p:nvPr>
+            <p:ph type="title"/>
+          </p:nvPr>
+        </p:nvSpPr>
+        <p:spPr/>
+        <p:txBody>
+          <a:bodyPr/>
+          <a:lstStyle/>
+          <a:p>
+            <a:r>
+              <a:rPr lang="en-US" dirty="0"/>
+              <a:t>References</a:t>
+            </a:r>
+          </a:p>
+        </p:txBody>
+      </p:sp>
+      <p:sp>
+        <p:nvSpPr>
+          <p:cNvPr id="3" name="Content Placeholder 2">
+            <a:extLst>
+              <a:ext uri="{FF2B5EF4-FFF2-40B4-BE49-F238E27FC236}">
+                <a16:creationId xmlns:a16="http://schemas.microsoft.com/office/drawing/2014/main" id="{E21FA19F-419A-7841-863D-9CE064E37FF2}"/>
+              </a:ext>
+            </a:extLst>
+          </p:cNvPr>
+          <p:cNvSpPr>
+            <a:spLocks noGrp="1"/>
+          </p:cNvSpPr>
+          <p:nvPr>
+            <p:ph idx="1"/>
+          </p:nvPr>
+        </p:nvSpPr>
+        <p:spPr/>
+        <p:txBody>
+          <a:bodyPr/>
+          <a:lstStyle/>
+          <a:p>
+            <a:r>
+              <a:rPr lang="en-US" dirty="0">
+                <a:hlinkClick r:id="rId2"/>
+              </a:rPr>
+              <a:t>Horizontal  Pod Autoscaler</a:t>
+            </a:r>
+            <a:endParaRPr lang="en-US" dirty="0"/>
+          </a:p>
+          <a:p>
+            <a:r>
+              <a:rPr lang="en-US" dirty="0">
+                <a:hlinkClick r:id="rId3"/>
+              </a:rPr>
+              <a:t>Horizontal Pod Autoscaler Walkthrough</a:t>
+            </a:r>
+            <a:endParaRPr lang="en-US" dirty="0"/>
+          </a:p>
+          <a:p>
+            <a:r>
+              <a:rPr lang="en-US" dirty="0">
+                <a:hlinkClick r:id="rId4"/>
+              </a:rPr>
+              <a:t>https://keda.sh/</a:t>
+            </a:r>
+            <a:endParaRPr lang="en-US" dirty="0"/>
+          </a:p>
+          <a:p>
+            <a:r>
+              <a:rPr lang="en-US" dirty="0">
+                <a:hlinkClick r:id="rId5"/>
+              </a:rPr>
+              <a:t>KEDA on GitHub</a:t>
+            </a:r>
+            <a:endParaRPr lang="en-US" dirty="0"/>
+          </a:p>
+          <a:p>
+            <a:r>
+              <a:rPr lang="en-US" dirty="0">
+                <a:hlinkClick r:id="rId6"/>
+              </a:rPr>
+              <a:t>KEDA Samples</a:t>
+            </a:r>
+            <a:endParaRPr lang="en-US" dirty="0"/>
+          </a:p>
+          <a:p>
+            <a:r>
+              <a:rPr lang="en-US" dirty="0">
+                <a:hlinkClick r:id="rId7"/>
+              </a:rPr>
+              <a:t>Https://emadashi.com</a:t>
+            </a:r>
+            <a:r>
+              <a:rPr lang="en-US" dirty="0"/>
+              <a:t> </a:t>
+            </a:r>
+            <a:r>
+              <a:rPr lang="en-US" dirty="0">
+                <a:sym typeface="Wingdings" pitchFamily="2" charset="2"/>
+              </a:rPr>
+              <a:t></a:t>
+            </a:r>
+            <a:endParaRPr lang="en-US" dirty="0"/>
+          </a:p>
+          <a:p>
+            <a:r>
+              <a:rPr lang="en-US" dirty="0">
+                <a:hlinkClick r:id="rId8"/>
+              </a:rPr>
+              <a:t>Mock-server</a:t>
+            </a:r>
+            <a:endParaRPr lang="en-US" dirty="0"/>
+          </a:p>
+        </p:txBody>
+      </p:sp>
+    </p:spTree>
+    <p:extLst>
+      <p:ext uri="{BB962C8B-B14F-4D97-AF65-F5344CB8AC3E}">
+        <p14:creationId xmlns:p14="http://schemas.microsoft.com/office/powerpoint/2010/main" val="2713068039"/>
       </p:ext>
     </p:extLst>
   </p:cSld>

</xml_diff>

<commit_message>
Tailor for including RabbitMQ sample
</commit_message>
<xml_diff>
--- a/preso.pptx
+++ b/preso.pptx
@@ -5,7 +5,7 @@
     <p:sldMasterId id="2147483660" r:id="rId1"/>
   </p:sldMasterIdLst>
   <p:notesMasterIdLst>
-    <p:notesMasterId r:id="rId19"/>
+    <p:notesMasterId r:id="rId24"/>
   </p:notesMasterIdLst>
   <p:sldIdLst>
     <p:sldId id="256" r:id="rId2"/>
@@ -21,10 +21,15 @@
     <p:sldId id="261" r:id="rId12"/>
     <p:sldId id="269" r:id="rId13"/>
     <p:sldId id="260" r:id="rId14"/>
-    <p:sldId id="265" r:id="rId15"/>
-    <p:sldId id="271" r:id="rId16"/>
-    <p:sldId id="266" r:id="rId17"/>
-    <p:sldId id="272" r:id="rId18"/>
+    <p:sldId id="271" r:id="rId15"/>
+    <p:sldId id="275" r:id="rId16"/>
+    <p:sldId id="273" r:id="rId17"/>
+    <p:sldId id="265" r:id="rId18"/>
+    <p:sldId id="266" r:id="rId19"/>
+    <p:sldId id="274" r:id="rId20"/>
+    <p:sldId id="276" r:id="rId21"/>
+    <p:sldId id="277" r:id="rId22"/>
+    <p:sldId id="272" r:id="rId23"/>
   </p:sldIdLst>
   <p:sldSz cx="12192000" cy="6858000"/>
   <p:notesSz cx="6858000" cy="9144000"/>
@@ -213,7 +218,7 @@
           <a:p>
             <a:fld id="{05D5B59A-0EDA-EF41-85FF-03176606BBBE}" type="datetimeFigureOut">
               <a:rPr lang="en-US" smtClean="0"/>
-              <a:t>7/28/20</a:t>
+              <a:t>8/25/20</a:t>
             </a:fld>
             <a:endParaRPr lang="en-US"/>
           </a:p>
@@ -786,7 +791,7 @@
           <a:p>
             <a:fld id="{7C747D7E-6B19-984E-90F5-E9EEF49EFB72}" type="datetimeFigureOut">
               <a:rPr lang="en-US" smtClean="0"/>
-              <a:t>7/28/20</a:t>
+              <a:t>8/25/20</a:t>
             </a:fld>
             <a:endParaRPr lang="en-US"/>
           </a:p>
@@ -956,7 +961,7 @@
           <a:p>
             <a:fld id="{7C747D7E-6B19-984E-90F5-E9EEF49EFB72}" type="datetimeFigureOut">
               <a:rPr lang="en-US" smtClean="0"/>
-              <a:t>7/28/20</a:t>
+              <a:t>8/25/20</a:t>
             </a:fld>
             <a:endParaRPr lang="en-US"/>
           </a:p>
@@ -1136,7 +1141,7 @@
           <a:p>
             <a:fld id="{7C747D7E-6B19-984E-90F5-E9EEF49EFB72}" type="datetimeFigureOut">
               <a:rPr lang="en-US" smtClean="0"/>
-              <a:t>7/28/20</a:t>
+              <a:t>8/25/20</a:t>
             </a:fld>
             <a:endParaRPr lang="en-US"/>
           </a:p>
@@ -1306,7 +1311,7 @@
           <a:p>
             <a:fld id="{7C747D7E-6B19-984E-90F5-E9EEF49EFB72}" type="datetimeFigureOut">
               <a:rPr lang="en-US" smtClean="0"/>
-              <a:t>7/28/20</a:t>
+              <a:t>8/25/20</a:t>
             </a:fld>
             <a:endParaRPr lang="en-US"/>
           </a:p>
@@ -1552,7 +1557,7 @@
           <a:p>
             <a:fld id="{7C747D7E-6B19-984E-90F5-E9EEF49EFB72}" type="datetimeFigureOut">
               <a:rPr lang="en-US" smtClean="0"/>
-              <a:t>7/28/20</a:t>
+              <a:t>8/25/20</a:t>
             </a:fld>
             <a:endParaRPr lang="en-US"/>
           </a:p>
@@ -1784,7 +1789,7 @@
           <a:p>
             <a:fld id="{7C747D7E-6B19-984E-90F5-E9EEF49EFB72}" type="datetimeFigureOut">
               <a:rPr lang="en-US" smtClean="0"/>
-              <a:t>7/28/20</a:t>
+              <a:t>8/25/20</a:t>
             </a:fld>
             <a:endParaRPr lang="en-US"/>
           </a:p>
@@ -2151,7 +2156,7 @@
           <a:p>
             <a:fld id="{7C747D7E-6B19-984E-90F5-E9EEF49EFB72}" type="datetimeFigureOut">
               <a:rPr lang="en-US" smtClean="0"/>
-              <a:t>7/28/20</a:t>
+              <a:t>8/25/20</a:t>
             </a:fld>
             <a:endParaRPr lang="en-US"/>
           </a:p>
@@ -2269,7 +2274,7 @@
           <a:p>
             <a:fld id="{7C747D7E-6B19-984E-90F5-E9EEF49EFB72}" type="datetimeFigureOut">
               <a:rPr lang="en-US" smtClean="0"/>
-              <a:t>7/28/20</a:t>
+              <a:t>8/25/20</a:t>
             </a:fld>
             <a:endParaRPr lang="en-US"/>
           </a:p>
@@ -2364,7 +2369,7 @@
           <a:p>
             <a:fld id="{7C747D7E-6B19-984E-90F5-E9EEF49EFB72}" type="datetimeFigureOut">
               <a:rPr lang="en-US" smtClean="0"/>
-              <a:t>7/28/20</a:t>
+              <a:t>8/25/20</a:t>
             </a:fld>
             <a:endParaRPr lang="en-US"/>
           </a:p>
@@ -2641,7 +2646,7 @@
           <a:p>
             <a:fld id="{7C747D7E-6B19-984E-90F5-E9EEF49EFB72}" type="datetimeFigureOut">
               <a:rPr lang="en-US" smtClean="0"/>
-              <a:t>7/28/20</a:t>
+              <a:t>8/25/20</a:t>
             </a:fld>
             <a:endParaRPr lang="en-US"/>
           </a:p>
@@ -2898,7 +2903,7 @@
           <a:p>
             <a:fld id="{7C747D7E-6B19-984E-90F5-E9EEF49EFB72}" type="datetimeFigureOut">
               <a:rPr lang="en-US" smtClean="0"/>
-              <a:t>7/28/20</a:t>
+              <a:t>8/25/20</a:t>
             </a:fld>
             <a:endParaRPr lang="en-US"/>
           </a:p>
@@ -3111,7 +3116,7 @@
           <a:p>
             <a:fld id="{7C747D7E-6B19-984E-90F5-E9EEF49EFB72}" type="datetimeFigureOut">
               <a:rPr lang="en-US" smtClean="0"/>
-              <a:t>7/28/20</a:t>
+              <a:t>8/25/20</a:t>
             </a:fld>
             <a:endParaRPr lang="en-US"/>
           </a:p>
@@ -6022,7 +6027,14 @@
           <a:p>
             <a:r>
               <a:rPr lang="en-US" dirty="0"/>
-              <a:t>How External Scalers Work</a:t>
+              <a:t>Workshop 1: </a:t>
+            </a:r>
+            <a:br>
+              <a:rPr lang="en-US" dirty="0"/>
+            </a:br>
+            <a:r>
+              <a:rPr lang="en-US" dirty="0"/>
+              <a:t>RabbitMQ Scaler</a:t>
             </a:r>
           </a:p>
         </p:txBody>
@@ -6066,6 +6078,883 @@
 </file>
 
 <file path=ppt/slides/slide14.xml><?xml version="1.0" encoding="utf-8"?>
+<p:sld xmlns:a="http://schemas.openxmlformats.org/drawingml/2006/main" xmlns:r="http://schemas.openxmlformats.org/officeDocument/2006/relationships" xmlns:p="http://schemas.openxmlformats.org/presentationml/2006/main">
+  <p:cSld>
+    <p:bg>
+      <p:bgPr>
+        <a:solidFill>
+          <a:schemeClr val="bg1"/>
+        </a:solidFill>
+        <a:effectLst/>
+      </p:bgPr>
+    </p:bg>
+    <p:spTree>
+      <p:nvGrpSpPr>
+        <p:cNvPr id="1" name=""/>
+        <p:cNvGrpSpPr/>
+        <p:nvPr/>
+      </p:nvGrpSpPr>
+      <p:grpSpPr>
+        <a:xfrm>
+          <a:off x="0" y="0"/>
+          <a:ext cx="0" cy="0"/>
+          <a:chOff x="0" y="0"/>
+          <a:chExt cx="0" cy="0"/>
+        </a:xfrm>
+      </p:grpSpPr>
+      <p:sp useBgFill="1">
+        <p:nvSpPr>
+          <p:cNvPr id="12" name="Rectangle 11">
+            <a:extLst>
+              <a:ext uri="{FF2B5EF4-FFF2-40B4-BE49-F238E27FC236}">
+                <a16:creationId xmlns:a16="http://schemas.microsoft.com/office/drawing/2014/main" id="{80DF40B2-80F7-4E71-B46C-284163F3654A}"/>
+              </a:ext>
+              <a:ext uri="{C183D7F6-B498-43B3-948B-1728B52AA6E4}">
+                <adec:decorative xmlns:adec="http://schemas.microsoft.com/office/drawing/2017/decorative" val="1"/>
+              </a:ext>
+            </a:extLst>
+          </p:cNvPr>
+          <p:cNvSpPr>
+            <a:spLocks noGrp="1" noRot="1" noChangeAspect="1" noMove="1" noResize="1" noEditPoints="1" noAdjustHandles="1" noChangeArrowheads="1" noChangeShapeType="1" noTextEdit="1"/>
+          </p:cNvSpPr>
+          <p:nvPr>
+            <p:extLst>
+              <p:ext uri="{386F3935-93C4-4BCD-93E2-E3B085C9AB24}">
+                <p16:designElem xmlns:p16="http://schemas.microsoft.com/office/powerpoint/2015/main" val="1"/>
+              </p:ext>
+            </p:extLst>
+          </p:nvPr>
+        </p:nvSpPr>
+        <p:spPr>
+          <a:xfrm>
+            <a:off x="-1" y="0"/>
+            <a:ext cx="12188952" cy="6858000"/>
+          </a:xfrm>
+          <a:prstGeom prst="rect">
+            <a:avLst/>
+          </a:prstGeom>
+          <a:ln>
+            <a:noFill/>
+          </a:ln>
+        </p:spPr>
+        <p:style>
+          <a:lnRef idx="2">
+            <a:schemeClr val="accent1">
+              <a:shade val="50000"/>
+            </a:schemeClr>
+          </a:lnRef>
+          <a:fillRef idx="1">
+            <a:schemeClr val="accent1"/>
+          </a:fillRef>
+          <a:effectRef idx="0">
+            <a:schemeClr val="accent1"/>
+          </a:effectRef>
+          <a:fontRef idx="minor">
+            <a:schemeClr val="lt1"/>
+          </a:fontRef>
+        </p:style>
+        <p:txBody>
+          <a:bodyPr rtlCol="0" anchor="ctr"/>
+          <a:lstStyle/>
+          <a:p>
+            <a:pPr algn="ctr"/>
+            <a:endParaRPr lang="en-US"/>
+          </a:p>
+        </p:txBody>
+      </p:sp>
+      <p:sp>
+        <p:nvSpPr>
+          <p:cNvPr id="2" name="Title 1">
+            <a:extLst>
+              <a:ext uri="{FF2B5EF4-FFF2-40B4-BE49-F238E27FC236}">
+                <a16:creationId xmlns:a16="http://schemas.microsoft.com/office/drawing/2014/main" id="{CFFF62C6-D536-B340-A938-C2EB3DDF321B}"/>
+              </a:ext>
+            </a:extLst>
+          </p:cNvPr>
+          <p:cNvSpPr>
+            <a:spLocks noGrp="1"/>
+          </p:cNvSpPr>
+          <p:nvPr>
+            <p:ph type="title"/>
+          </p:nvPr>
+        </p:nvSpPr>
+        <p:spPr>
+          <a:xfrm>
+            <a:off x="838199" y="548464"/>
+            <a:ext cx="3807187" cy="2228074"/>
+          </a:xfrm>
+        </p:spPr>
+        <p:txBody>
+          <a:bodyPr>
+            <a:normAutofit/>
+          </a:bodyPr>
+          <a:lstStyle/>
+          <a:p>
+            <a:r>
+              <a:rPr lang="en-US" sz="4000" dirty="0"/>
+              <a:t>Workshop 1 plan</a:t>
+            </a:r>
+          </a:p>
+        </p:txBody>
+      </p:sp>
+      <p:sp>
+        <p:nvSpPr>
+          <p:cNvPr id="9" name="Content Placeholder 8">
+            <a:extLst>
+              <a:ext uri="{FF2B5EF4-FFF2-40B4-BE49-F238E27FC236}">
+                <a16:creationId xmlns:a16="http://schemas.microsoft.com/office/drawing/2014/main" id="{34F53853-5610-4A54-B89C-2ED030ED88B4}"/>
+              </a:ext>
+            </a:extLst>
+          </p:cNvPr>
+          <p:cNvSpPr>
+            <a:spLocks noGrp="1"/>
+          </p:cNvSpPr>
+          <p:nvPr>
+            <p:ph idx="1"/>
+          </p:nvPr>
+        </p:nvSpPr>
+        <p:spPr>
+          <a:xfrm>
+            <a:off x="598206" y="2962279"/>
+            <a:ext cx="4332717" cy="3143241"/>
+          </a:xfrm>
+        </p:spPr>
+        <p:txBody>
+          <a:bodyPr>
+            <a:normAutofit/>
+          </a:bodyPr>
+          <a:lstStyle/>
+          <a:p>
+            <a:pPr marL="457200" indent="-457200">
+              <a:buFont typeface="+mj-lt"/>
+              <a:buAutoNum type="arabicPeriod"/>
+            </a:pPr>
+            <a:r>
+              <a:rPr lang="en-US" sz="2000" dirty="0"/>
+              <a:t>Deploy KEDA</a:t>
+            </a:r>
+          </a:p>
+          <a:p>
+            <a:pPr marL="457200" indent="-457200">
+              <a:buFont typeface="+mj-lt"/>
+              <a:buAutoNum type="arabicPeriod"/>
+            </a:pPr>
+            <a:r>
+              <a:rPr lang="en-US" sz="2000" dirty="0"/>
+              <a:t>Create RabbitMQ Queue</a:t>
+            </a:r>
+          </a:p>
+          <a:p>
+            <a:pPr marL="457200" indent="-457200">
+              <a:buFont typeface="+mj-lt"/>
+              <a:buAutoNum type="arabicPeriod"/>
+            </a:pPr>
+            <a:r>
+              <a:rPr lang="en-US" sz="2000" dirty="0"/>
+              <a:t>Deploy RabbitMQ Consumer</a:t>
+            </a:r>
+          </a:p>
+          <a:p>
+            <a:pPr marL="457200" indent="-457200">
+              <a:buFont typeface="+mj-lt"/>
+              <a:buAutoNum type="arabicPeriod"/>
+            </a:pPr>
+            <a:r>
+              <a:rPr lang="en-US" sz="2000" dirty="0"/>
+              <a:t>Deploy </a:t>
+            </a:r>
+            <a:r>
+              <a:rPr lang="en-US" sz="2000" dirty="0" err="1"/>
+              <a:t>ScaledObject</a:t>
+            </a:r>
+            <a:endParaRPr lang="en-US" sz="2000" dirty="0"/>
+          </a:p>
+          <a:p>
+            <a:pPr marL="457200" indent="-457200">
+              <a:buFont typeface="+mj-lt"/>
+              <a:buAutoNum type="arabicPeriod"/>
+            </a:pPr>
+            <a:r>
+              <a:rPr lang="en-US" sz="2000" dirty="0"/>
+              <a:t>Deploy RabbitMQ Publisher</a:t>
+            </a:r>
+          </a:p>
+          <a:p>
+            <a:pPr marL="457200" indent="-457200">
+              <a:buFont typeface="+mj-lt"/>
+              <a:buAutoNum type="arabicPeriod"/>
+            </a:pPr>
+            <a:r>
+              <a:rPr lang="en-US" sz="2000" dirty="0"/>
+              <a:t>Observe scaling </a:t>
+            </a:r>
+            <a:r>
+              <a:rPr lang="en-US" sz="2000" dirty="0">
+                <a:sym typeface="Wingdings" pitchFamily="2" charset="2"/>
+              </a:rPr>
+              <a:t></a:t>
+            </a:r>
+            <a:endParaRPr lang="en-US" sz="2000" dirty="0"/>
+          </a:p>
+        </p:txBody>
+      </p:sp>
+      <p:pic>
+        <p:nvPicPr>
+          <p:cNvPr id="5" name="Content Placeholder 4" descr="A person using a computer&#10;&#10;Description automatically generated">
+            <a:extLst>
+              <a:ext uri="{FF2B5EF4-FFF2-40B4-BE49-F238E27FC236}">
+                <a16:creationId xmlns:a16="http://schemas.microsoft.com/office/drawing/2014/main" id="{CA6F3692-BBC0-A648-B0B3-3B6B7042491B}"/>
+              </a:ext>
+            </a:extLst>
+          </p:cNvPr>
+          <p:cNvPicPr>
+            <a:picLocks noChangeAspect="1"/>
+          </p:cNvPicPr>
+          <p:nvPr/>
+        </p:nvPicPr>
+        <p:blipFill rotWithShape="1">
+          <a:blip r:embed="rId2"/>
+          <a:srcRect r="21461"/>
+          <a:stretch/>
+        </p:blipFill>
+        <p:spPr>
+          <a:xfrm>
+            <a:off x="5010386" y="10"/>
+            <a:ext cx="7181613" cy="6857990"/>
+          </a:xfrm>
+          <a:prstGeom prst="rect">
+            <a:avLst/>
+          </a:prstGeom>
+          <a:effectLst/>
+        </p:spPr>
+      </p:pic>
+      <p:sp>
+        <p:nvSpPr>
+          <p:cNvPr id="6" name="Rectangle 5">
+            <a:extLst>
+              <a:ext uri="{FF2B5EF4-FFF2-40B4-BE49-F238E27FC236}">
+                <a16:creationId xmlns:a16="http://schemas.microsoft.com/office/drawing/2014/main" id="{D8FDDDBB-FB7C-564D-A731-7B3791774239}"/>
+              </a:ext>
+            </a:extLst>
+          </p:cNvPr>
+          <p:cNvSpPr/>
+          <p:nvPr/>
+        </p:nvSpPr>
+        <p:spPr>
+          <a:xfrm>
+            <a:off x="9703912" y="6580991"/>
+            <a:ext cx="2485039" cy="276999"/>
+          </a:xfrm>
+          <a:prstGeom prst="rect">
+            <a:avLst/>
+          </a:prstGeom>
+        </p:spPr>
+        <p:txBody>
+          <a:bodyPr wrap="none">
+            <a:spAutoFit/>
+          </a:bodyPr>
+          <a:lstStyle/>
+          <a:p>
+            <a:r>
+              <a:rPr lang="en-AU" sz="1200" dirty="0"/>
+              <a:t>Photo by </a:t>
+            </a:r>
+            <a:r>
+              <a:rPr lang="en-AU" sz="1200" b="1" dirty="0">
+                <a:hlinkClick r:id="rId3"/>
+              </a:rPr>
+              <a:t>energepic.com</a:t>
+            </a:r>
+            <a:r>
+              <a:rPr lang="en-AU" sz="1200" dirty="0"/>
+              <a:t> from </a:t>
+            </a:r>
+            <a:r>
+              <a:rPr lang="en-AU" sz="1200" b="1" dirty="0">
+                <a:hlinkClick r:id="rId4"/>
+              </a:rPr>
+              <a:t>Pexels</a:t>
+            </a:r>
+            <a:endParaRPr lang="en-AU" sz="1200" dirty="0"/>
+          </a:p>
+        </p:txBody>
+      </p:sp>
+    </p:spTree>
+    <p:extLst>
+      <p:ext uri="{BB962C8B-B14F-4D97-AF65-F5344CB8AC3E}">
+        <p14:creationId xmlns:p14="http://schemas.microsoft.com/office/powerpoint/2010/main" val="1063810754"/>
+      </p:ext>
+    </p:extLst>
+  </p:cSld>
+  <p:clrMapOvr>
+    <a:masterClrMapping/>
+  </p:clrMapOvr>
+  <p:timing>
+    <p:tnLst>
+      <p:par>
+        <p:cTn id="1" dur="indefinite" restart="never" nodeType="tmRoot">
+          <p:childTnLst>
+            <p:seq concurrent="1" nextAc="seek">
+              <p:cTn id="2" dur="indefinite" nodeType="mainSeq">
+                <p:childTnLst>
+                  <p:par>
+                    <p:cTn id="3" fill="hold">
+                      <p:stCondLst>
+                        <p:cond delay="indefinite"/>
+                      </p:stCondLst>
+                      <p:childTnLst>
+                        <p:par>
+                          <p:cTn id="4" fill="hold">
+                            <p:stCondLst>
+                              <p:cond delay="0"/>
+                            </p:stCondLst>
+                            <p:childTnLst>
+                              <p:par>
+                                <p:cTn id="5" presetID="10" presetClass="entr" presetSubtype="0" fill="hold" nodeType="clickEffect">
+                                  <p:stCondLst>
+                                    <p:cond delay="0"/>
+                                  </p:stCondLst>
+                                  <p:childTnLst>
+                                    <p:set>
+                                      <p:cBhvr>
+                                        <p:cTn id="6" dur="1" fill="hold">
+                                          <p:stCondLst>
+                                            <p:cond delay="0"/>
+                                          </p:stCondLst>
+                                        </p:cTn>
+                                        <p:tgtEl>
+                                          <p:spTgt spid="9">
+                                            <p:txEl>
+                                              <p:pRg st="0" end="0"/>
+                                            </p:txEl>
+                                          </p:spTgt>
+                                        </p:tgtEl>
+                                        <p:attrNameLst>
+                                          <p:attrName>style.visibility</p:attrName>
+                                        </p:attrNameLst>
+                                      </p:cBhvr>
+                                      <p:to>
+                                        <p:strVal val="visible"/>
+                                      </p:to>
+                                    </p:set>
+                                    <p:animEffect transition="in" filter="fade">
+                                      <p:cBhvr>
+                                        <p:cTn id="7" dur="500"/>
+                                        <p:tgtEl>
+                                          <p:spTgt spid="9">
+                                            <p:txEl>
+                                              <p:pRg st="0" end="0"/>
+                                            </p:txEl>
+                                          </p:spTgt>
+                                        </p:tgtEl>
+                                      </p:cBhvr>
+                                    </p:animEffect>
+                                  </p:childTnLst>
+                                </p:cTn>
+                              </p:par>
+                            </p:childTnLst>
+                          </p:cTn>
+                        </p:par>
+                      </p:childTnLst>
+                    </p:cTn>
+                  </p:par>
+                  <p:par>
+                    <p:cTn id="8" fill="hold">
+                      <p:stCondLst>
+                        <p:cond delay="indefinite"/>
+                      </p:stCondLst>
+                      <p:childTnLst>
+                        <p:par>
+                          <p:cTn id="9" fill="hold">
+                            <p:stCondLst>
+                              <p:cond delay="0"/>
+                            </p:stCondLst>
+                            <p:childTnLst>
+                              <p:par>
+                                <p:cTn id="10" presetID="10" presetClass="entr" presetSubtype="0" fill="hold" nodeType="clickEffect">
+                                  <p:stCondLst>
+                                    <p:cond delay="0"/>
+                                  </p:stCondLst>
+                                  <p:childTnLst>
+                                    <p:set>
+                                      <p:cBhvr>
+                                        <p:cTn id="11" dur="1" fill="hold">
+                                          <p:stCondLst>
+                                            <p:cond delay="0"/>
+                                          </p:stCondLst>
+                                        </p:cTn>
+                                        <p:tgtEl>
+                                          <p:spTgt spid="9">
+                                            <p:txEl>
+                                              <p:pRg st="1" end="1"/>
+                                            </p:txEl>
+                                          </p:spTgt>
+                                        </p:tgtEl>
+                                        <p:attrNameLst>
+                                          <p:attrName>style.visibility</p:attrName>
+                                        </p:attrNameLst>
+                                      </p:cBhvr>
+                                      <p:to>
+                                        <p:strVal val="visible"/>
+                                      </p:to>
+                                    </p:set>
+                                    <p:animEffect transition="in" filter="fade">
+                                      <p:cBhvr>
+                                        <p:cTn id="12" dur="500"/>
+                                        <p:tgtEl>
+                                          <p:spTgt spid="9">
+                                            <p:txEl>
+                                              <p:pRg st="1" end="1"/>
+                                            </p:txEl>
+                                          </p:spTgt>
+                                        </p:tgtEl>
+                                      </p:cBhvr>
+                                    </p:animEffect>
+                                  </p:childTnLst>
+                                </p:cTn>
+                              </p:par>
+                            </p:childTnLst>
+                          </p:cTn>
+                        </p:par>
+                      </p:childTnLst>
+                    </p:cTn>
+                  </p:par>
+                  <p:par>
+                    <p:cTn id="13" fill="hold">
+                      <p:stCondLst>
+                        <p:cond delay="indefinite"/>
+                      </p:stCondLst>
+                      <p:childTnLst>
+                        <p:par>
+                          <p:cTn id="14" fill="hold">
+                            <p:stCondLst>
+                              <p:cond delay="0"/>
+                            </p:stCondLst>
+                            <p:childTnLst>
+                              <p:par>
+                                <p:cTn id="15" presetID="10" presetClass="entr" presetSubtype="0" fill="hold" nodeType="clickEffect">
+                                  <p:stCondLst>
+                                    <p:cond delay="0"/>
+                                  </p:stCondLst>
+                                  <p:childTnLst>
+                                    <p:set>
+                                      <p:cBhvr>
+                                        <p:cTn id="16" dur="1" fill="hold">
+                                          <p:stCondLst>
+                                            <p:cond delay="0"/>
+                                          </p:stCondLst>
+                                        </p:cTn>
+                                        <p:tgtEl>
+                                          <p:spTgt spid="9">
+                                            <p:txEl>
+                                              <p:pRg st="2" end="2"/>
+                                            </p:txEl>
+                                          </p:spTgt>
+                                        </p:tgtEl>
+                                        <p:attrNameLst>
+                                          <p:attrName>style.visibility</p:attrName>
+                                        </p:attrNameLst>
+                                      </p:cBhvr>
+                                      <p:to>
+                                        <p:strVal val="visible"/>
+                                      </p:to>
+                                    </p:set>
+                                    <p:animEffect transition="in" filter="fade">
+                                      <p:cBhvr>
+                                        <p:cTn id="17" dur="500"/>
+                                        <p:tgtEl>
+                                          <p:spTgt spid="9">
+                                            <p:txEl>
+                                              <p:pRg st="2" end="2"/>
+                                            </p:txEl>
+                                          </p:spTgt>
+                                        </p:tgtEl>
+                                      </p:cBhvr>
+                                    </p:animEffect>
+                                  </p:childTnLst>
+                                </p:cTn>
+                              </p:par>
+                            </p:childTnLst>
+                          </p:cTn>
+                        </p:par>
+                      </p:childTnLst>
+                    </p:cTn>
+                  </p:par>
+                  <p:par>
+                    <p:cTn id="18" fill="hold">
+                      <p:stCondLst>
+                        <p:cond delay="indefinite"/>
+                      </p:stCondLst>
+                      <p:childTnLst>
+                        <p:par>
+                          <p:cTn id="19" fill="hold">
+                            <p:stCondLst>
+                              <p:cond delay="0"/>
+                            </p:stCondLst>
+                            <p:childTnLst>
+                              <p:par>
+                                <p:cTn id="20" presetID="10" presetClass="entr" presetSubtype="0" fill="hold" nodeType="clickEffect">
+                                  <p:stCondLst>
+                                    <p:cond delay="0"/>
+                                  </p:stCondLst>
+                                  <p:childTnLst>
+                                    <p:set>
+                                      <p:cBhvr>
+                                        <p:cTn id="21" dur="1" fill="hold">
+                                          <p:stCondLst>
+                                            <p:cond delay="0"/>
+                                          </p:stCondLst>
+                                        </p:cTn>
+                                        <p:tgtEl>
+                                          <p:spTgt spid="9">
+                                            <p:txEl>
+                                              <p:pRg st="3" end="3"/>
+                                            </p:txEl>
+                                          </p:spTgt>
+                                        </p:tgtEl>
+                                        <p:attrNameLst>
+                                          <p:attrName>style.visibility</p:attrName>
+                                        </p:attrNameLst>
+                                      </p:cBhvr>
+                                      <p:to>
+                                        <p:strVal val="visible"/>
+                                      </p:to>
+                                    </p:set>
+                                    <p:animEffect transition="in" filter="fade">
+                                      <p:cBhvr>
+                                        <p:cTn id="22" dur="500"/>
+                                        <p:tgtEl>
+                                          <p:spTgt spid="9">
+                                            <p:txEl>
+                                              <p:pRg st="3" end="3"/>
+                                            </p:txEl>
+                                          </p:spTgt>
+                                        </p:tgtEl>
+                                      </p:cBhvr>
+                                    </p:animEffect>
+                                  </p:childTnLst>
+                                </p:cTn>
+                              </p:par>
+                            </p:childTnLst>
+                          </p:cTn>
+                        </p:par>
+                      </p:childTnLst>
+                    </p:cTn>
+                  </p:par>
+                  <p:par>
+                    <p:cTn id="23" fill="hold">
+                      <p:stCondLst>
+                        <p:cond delay="indefinite"/>
+                      </p:stCondLst>
+                      <p:childTnLst>
+                        <p:par>
+                          <p:cTn id="24" fill="hold">
+                            <p:stCondLst>
+                              <p:cond delay="0"/>
+                            </p:stCondLst>
+                            <p:childTnLst>
+                              <p:par>
+                                <p:cTn id="25" presetID="10" presetClass="entr" presetSubtype="0" fill="hold" nodeType="clickEffect">
+                                  <p:stCondLst>
+                                    <p:cond delay="0"/>
+                                  </p:stCondLst>
+                                  <p:childTnLst>
+                                    <p:set>
+                                      <p:cBhvr>
+                                        <p:cTn id="26" dur="1" fill="hold">
+                                          <p:stCondLst>
+                                            <p:cond delay="0"/>
+                                          </p:stCondLst>
+                                        </p:cTn>
+                                        <p:tgtEl>
+                                          <p:spTgt spid="9">
+                                            <p:txEl>
+                                              <p:pRg st="4" end="4"/>
+                                            </p:txEl>
+                                          </p:spTgt>
+                                        </p:tgtEl>
+                                        <p:attrNameLst>
+                                          <p:attrName>style.visibility</p:attrName>
+                                        </p:attrNameLst>
+                                      </p:cBhvr>
+                                      <p:to>
+                                        <p:strVal val="visible"/>
+                                      </p:to>
+                                    </p:set>
+                                    <p:animEffect transition="in" filter="fade">
+                                      <p:cBhvr>
+                                        <p:cTn id="27" dur="500"/>
+                                        <p:tgtEl>
+                                          <p:spTgt spid="9">
+                                            <p:txEl>
+                                              <p:pRg st="4" end="4"/>
+                                            </p:txEl>
+                                          </p:spTgt>
+                                        </p:tgtEl>
+                                      </p:cBhvr>
+                                    </p:animEffect>
+                                  </p:childTnLst>
+                                </p:cTn>
+                              </p:par>
+                            </p:childTnLst>
+                          </p:cTn>
+                        </p:par>
+                      </p:childTnLst>
+                    </p:cTn>
+                  </p:par>
+                  <p:par>
+                    <p:cTn id="28" fill="hold">
+                      <p:stCondLst>
+                        <p:cond delay="indefinite"/>
+                      </p:stCondLst>
+                      <p:childTnLst>
+                        <p:par>
+                          <p:cTn id="29" fill="hold">
+                            <p:stCondLst>
+                              <p:cond delay="0"/>
+                            </p:stCondLst>
+                            <p:childTnLst>
+                              <p:par>
+                                <p:cTn id="30" presetID="10" presetClass="entr" presetSubtype="0" fill="hold" nodeType="clickEffect">
+                                  <p:stCondLst>
+                                    <p:cond delay="0"/>
+                                  </p:stCondLst>
+                                  <p:childTnLst>
+                                    <p:set>
+                                      <p:cBhvr>
+                                        <p:cTn id="31" dur="1" fill="hold">
+                                          <p:stCondLst>
+                                            <p:cond delay="0"/>
+                                          </p:stCondLst>
+                                        </p:cTn>
+                                        <p:tgtEl>
+                                          <p:spTgt spid="9">
+                                            <p:txEl>
+                                              <p:pRg st="5" end="5"/>
+                                            </p:txEl>
+                                          </p:spTgt>
+                                        </p:tgtEl>
+                                        <p:attrNameLst>
+                                          <p:attrName>style.visibility</p:attrName>
+                                        </p:attrNameLst>
+                                      </p:cBhvr>
+                                      <p:to>
+                                        <p:strVal val="visible"/>
+                                      </p:to>
+                                    </p:set>
+                                    <p:animEffect transition="in" filter="fade">
+                                      <p:cBhvr>
+                                        <p:cTn id="32" dur="500"/>
+                                        <p:tgtEl>
+                                          <p:spTgt spid="9">
+                                            <p:txEl>
+                                              <p:pRg st="5" end="5"/>
+                                            </p:txEl>
+                                          </p:spTgt>
+                                        </p:tgtEl>
+                                      </p:cBhvr>
+                                    </p:animEffect>
+                                  </p:childTnLst>
+                                </p:cTn>
+                              </p:par>
+                            </p:childTnLst>
+                          </p:cTn>
+                        </p:par>
+                      </p:childTnLst>
+                    </p:cTn>
+                  </p:par>
+                </p:childTnLst>
+              </p:cTn>
+              <p:prevCondLst>
+                <p:cond evt="onPrev" delay="0">
+                  <p:tgtEl>
+                    <p:sldTgt/>
+                  </p:tgtEl>
+                </p:cond>
+              </p:prevCondLst>
+              <p:nextCondLst>
+                <p:cond evt="onNext" delay="0">
+                  <p:tgtEl>
+                    <p:sldTgt/>
+                  </p:tgtEl>
+                </p:cond>
+              </p:nextCondLst>
+            </p:seq>
+          </p:childTnLst>
+        </p:cTn>
+      </p:par>
+    </p:tnLst>
+  </p:timing>
+</p:sld>
+</file>
+
+<file path=ppt/slides/slide15.xml><?xml version="1.0" encoding="utf-8"?>
+<p:sld xmlns:a="http://schemas.openxmlformats.org/drawingml/2006/main" xmlns:r="http://schemas.openxmlformats.org/officeDocument/2006/relationships" xmlns:p="http://schemas.openxmlformats.org/presentationml/2006/main">
+  <p:cSld>
+    <p:spTree>
+      <p:nvGrpSpPr>
+        <p:cNvPr id="1" name=""/>
+        <p:cNvGrpSpPr/>
+        <p:nvPr/>
+      </p:nvGrpSpPr>
+      <p:grpSpPr>
+        <a:xfrm>
+          <a:off x="0" y="0"/>
+          <a:ext cx="0" cy="0"/>
+          <a:chOff x="0" y="0"/>
+          <a:chExt cx="0" cy="0"/>
+        </a:xfrm>
+      </p:grpSpPr>
+      <p:sp>
+        <p:nvSpPr>
+          <p:cNvPr id="8" name="Title 7">
+            <a:extLst>
+              <a:ext uri="{FF2B5EF4-FFF2-40B4-BE49-F238E27FC236}">
+                <a16:creationId xmlns:a16="http://schemas.microsoft.com/office/drawing/2014/main" id="{97B4083C-A237-8F44-8B9D-04615350ACF1}"/>
+              </a:ext>
+            </a:extLst>
+          </p:cNvPr>
+          <p:cNvSpPr>
+            <a:spLocks noGrp="1"/>
+          </p:cNvSpPr>
+          <p:nvPr>
+            <p:ph type="ctrTitle"/>
+          </p:nvPr>
+        </p:nvSpPr>
+        <p:spPr/>
+        <p:txBody>
+          <a:bodyPr/>
+          <a:lstStyle/>
+          <a:p>
+            <a:r>
+              <a:rPr lang="en-US" dirty="0"/>
+              <a:t>Let’s do it!</a:t>
+            </a:r>
+          </a:p>
+        </p:txBody>
+      </p:sp>
+      <p:sp>
+        <p:nvSpPr>
+          <p:cNvPr id="9" name="Subtitle 8">
+            <a:extLst>
+              <a:ext uri="{FF2B5EF4-FFF2-40B4-BE49-F238E27FC236}">
+                <a16:creationId xmlns:a16="http://schemas.microsoft.com/office/drawing/2014/main" id="{F41C9855-7893-714C-80F6-B34BA2A9EE0A}"/>
+              </a:ext>
+            </a:extLst>
+          </p:cNvPr>
+          <p:cNvSpPr>
+            <a:spLocks noGrp="1"/>
+          </p:cNvSpPr>
+          <p:nvPr>
+            <p:ph type="subTitle" idx="1"/>
+          </p:nvPr>
+        </p:nvSpPr>
+        <p:spPr/>
+        <p:txBody>
+          <a:bodyPr/>
+          <a:lstStyle/>
+          <a:p>
+            <a:endParaRPr lang="en-US"/>
+          </a:p>
+        </p:txBody>
+      </p:sp>
+    </p:spTree>
+    <p:extLst>
+      <p:ext uri="{BB962C8B-B14F-4D97-AF65-F5344CB8AC3E}">
+        <p14:creationId xmlns:p14="http://schemas.microsoft.com/office/powerpoint/2010/main" val="3448386562"/>
+      </p:ext>
+    </p:extLst>
+  </p:cSld>
+  <p:clrMapOvr>
+    <a:masterClrMapping/>
+  </p:clrMapOvr>
+</p:sld>
+</file>
+
+<file path=ppt/slides/slide16.xml><?xml version="1.0" encoding="utf-8"?>
+<p:sld xmlns:a="http://schemas.openxmlformats.org/drawingml/2006/main" xmlns:r="http://schemas.openxmlformats.org/officeDocument/2006/relationships" xmlns:p="http://schemas.openxmlformats.org/presentationml/2006/main">
+  <p:cSld>
+    <p:spTree>
+      <p:nvGrpSpPr>
+        <p:cNvPr id="1" name=""/>
+        <p:cNvGrpSpPr/>
+        <p:nvPr/>
+      </p:nvGrpSpPr>
+      <p:grpSpPr>
+        <a:xfrm>
+          <a:off x="0" y="0"/>
+          <a:ext cx="0" cy="0"/>
+          <a:chOff x="0" y="0"/>
+          <a:chExt cx="0" cy="0"/>
+        </a:xfrm>
+      </p:grpSpPr>
+      <p:sp>
+        <p:nvSpPr>
+          <p:cNvPr id="4" name="Title 3">
+            <a:extLst>
+              <a:ext uri="{FF2B5EF4-FFF2-40B4-BE49-F238E27FC236}">
+                <a16:creationId xmlns:a16="http://schemas.microsoft.com/office/drawing/2014/main" id="{93228A22-8C38-1244-9A53-6E05248262C4}"/>
+              </a:ext>
+            </a:extLst>
+          </p:cNvPr>
+          <p:cNvSpPr>
+            <a:spLocks noGrp="1"/>
+          </p:cNvSpPr>
+          <p:nvPr>
+            <p:ph type="ctrTitle"/>
+          </p:nvPr>
+        </p:nvSpPr>
+        <p:spPr/>
+        <p:txBody>
+          <a:bodyPr/>
+          <a:lstStyle/>
+          <a:p>
+            <a:r>
+              <a:rPr lang="en-US" dirty="0"/>
+              <a:t>How External Scalers Work</a:t>
+            </a:r>
+          </a:p>
+        </p:txBody>
+      </p:sp>
+      <p:sp>
+        <p:nvSpPr>
+          <p:cNvPr id="5" name="Subtitle 4">
+            <a:extLst>
+              <a:ext uri="{FF2B5EF4-FFF2-40B4-BE49-F238E27FC236}">
+                <a16:creationId xmlns:a16="http://schemas.microsoft.com/office/drawing/2014/main" id="{B0F7C2D8-6917-F644-9D81-4A2364F7875F}"/>
+              </a:ext>
+            </a:extLst>
+          </p:cNvPr>
+          <p:cNvSpPr>
+            <a:spLocks noGrp="1"/>
+          </p:cNvSpPr>
+          <p:nvPr>
+            <p:ph type="subTitle" idx="1"/>
+          </p:nvPr>
+        </p:nvSpPr>
+        <p:spPr/>
+        <p:txBody>
+          <a:bodyPr/>
+          <a:lstStyle/>
+          <a:p>
+            <a:endParaRPr lang="en-US"/>
+          </a:p>
+        </p:txBody>
+      </p:sp>
+    </p:spTree>
+    <p:extLst>
+      <p:ext uri="{BB962C8B-B14F-4D97-AF65-F5344CB8AC3E}">
+        <p14:creationId xmlns:p14="http://schemas.microsoft.com/office/powerpoint/2010/main" val="2245053926"/>
+      </p:ext>
+    </p:extLst>
+  </p:cSld>
+  <p:clrMapOvr>
+    <a:masterClrMapping/>
+  </p:clrMapOvr>
+</p:sld>
+</file>
+
+<file path=ppt/slides/slide17.xml><?xml version="1.0" encoding="utf-8"?>
 <p:sld xmlns:a="http://schemas.openxmlformats.org/drawingml/2006/main" xmlns:r="http://schemas.openxmlformats.org/officeDocument/2006/relationships" xmlns:p="http://schemas.openxmlformats.org/presentationml/2006/main">
   <p:cSld>
     <p:spTree>
@@ -7950,7 +8839,97 @@
 </p:sld>
 </file>
 
-<file path=ppt/slides/slide15.xml><?xml version="1.0" encoding="utf-8"?>
+<file path=ppt/slides/slide18.xml><?xml version="1.0" encoding="utf-8"?>
+<p:sld xmlns:a="http://schemas.openxmlformats.org/drawingml/2006/main" xmlns:r="http://schemas.openxmlformats.org/officeDocument/2006/relationships" xmlns:p="http://schemas.openxmlformats.org/presentationml/2006/main">
+  <p:cSld>
+    <p:spTree>
+      <p:nvGrpSpPr>
+        <p:cNvPr id="1" name=""/>
+        <p:cNvGrpSpPr/>
+        <p:nvPr/>
+      </p:nvGrpSpPr>
+      <p:grpSpPr>
+        <a:xfrm>
+          <a:off x="0" y="0"/>
+          <a:ext cx="0" cy="0"/>
+          <a:chOff x="0" y="0"/>
+          <a:chExt cx="0" cy="0"/>
+        </a:xfrm>
+      </p:grpSpPr>
+      <p:sp>
+        <p:nvSpPr>
+          <p:cNvPr id="4" name="Title 3">
+            <a:extLst>
+              <a:ext uri="{FF2B5EF4-FFF2-40B4-BE49-F238E27FC236}">
+                <a16:creationId xmlns:a16="http://schemas.microsoft.com/office/drawing/2014/main" id="{5754F991-D8EE-8846-91BE-F9EF73FE3755}"/>
+              </a:ext>
+            </a:extLst>
+          </p:cNvPr>
+          <p:cNvSpPr>
+            <a:spLocks noGrp="1"/>
+          </p:cNvSpPr>
+          <p:nvPr>
+            <p:ph type="ctrTitle"/>
+          </p:nvPr>
+        </p:nvSpPr>
+        <p:spPr/>
+        <p:txBody>
+          <a:bodyPr/>
+          <a:lstStyle/>
+          <a:p>
+            <a:r>
+              <a:rPr lang="en-US" dirty="0"/>
+              <a:t>Workshop 2:</a:t>
+            </a:r>
+            <a:br>
+              <a:rPr lang="en-US" dirty="0"/>
+            </a:br>
+            <a:r>
+              <a:rPr lang="en-US" dirty="0"/>
+              <a:t>Building External Scaler</a:t>
+            </a:r>
+          </a:p>
+        </p:txBody>
+      </p:sp>
+      <p:sp>
+        <p:nvSpPr>
+          <p:cNvPr id="5" name="Subtitle 4">
+            <a:extLst>
+              <a:ext uri="{FF2B5EF4-FFF2-40B4-BE49-F238E27FC236}">
+                <a16:creationId xmlns:a16="http://schemas.microsoft.com/office/drawing/2014/main" id="{86F02CB2-F82E-854F-8852-D7CF9DFD0A6A}"/>
+              </a:ext>
+            </a:extLst>
+          </p:cNvPr>
+          <p:cNvSpPr>
+            <a:spLocks noGrp="1"/>
+          </p:cNvSpPr>
+          <p:nvPr>
+            <p:ph type="subTitle" idx="1"/>
+          </p:nvPr>
+        </p:nvSpPr>
+        <p:spPr/>
+        <p:txBody>
+          <a:bodyPr/>
+          <a:lstStyle/>
+          <a:p>
+            <a:endParaRPr lang="en-US"/>
+          </a:p>
+        </p:txBody>
+      </p:sp>
+    </p:spTree>
+    <p:extLst>
+      <p:ext uri="{BB962C8B-B14F-4D97-AF65-F5344CB8AC3E}">
+        <p14:creationId xmlns:p14="http://schemas.microsoft.com/office/powerpoint/2010/main" val="2823262607"/>
+      </p:ext>
+    </p:extLst>
+  </p:cSld>
+  <p:clrMapOvr>
+    <a:masterClrMapping/>
+  </p:clrMapOvr>
+</p:sld>
+</file>
+
+<file path=ppt/slides/slide19.xml><?xml version="1.0" encoding="utf-8"?>
 <p:sld xmlns:a="http://schemas.openxmlformats.org/drawingml/2006/main" xmlns:r="http://schemas.openxmlformats.org/officeDocument/2006/relationships" xmlns:p="http://schemas.openxmlformats.org/presentationml/2006/main">
   <p:cSld>
     <p:bg>
@@ -8065,7 +9044,7 @@
           <a:p>
             <a:r>
               <a:rPr lang="en-US" sz="4000" dirty="0"/>
-              <a:t>Workshop plan</a:t>
+              <a:t>Workshop 2 plan</a:t>
             </a:r>
           </a:p>
         </p:txBody>
@@ -8104,7 +9083,7 @@
             </a:pPr>
             <a:r>
               <a:rPr lang="en-US" sz="2000" dirty="0"/>
-              <a:t>Deploy KEDA</a:t>
+              <a:t>Clean up last demo</a:t>
             </a:r>
           </a:p>
           <a:p>
@@ -8114,7 +9093,7 @@
             </a:pPr>
             <a:r>
               <a:rPr lang="en-US" sz="2000" dirty="0"/>
-              <a:t>Create target deployment</a:t>
+              <a:t>Create Target Deployment</a:t>
             </a:r>
           </a:p>
           <a:p>
@@ -8134,7 +9113,7 @@
             </a:pPr>
             <a:r>
               <a:rPr lang="en-US" sz="2000" dirty="0"/>
-              <a:t>Deploy External scaler (and service)</a:t>
+              <a:t>Deploy External scaler </a:t>
             </a:r>
           </a:p>
           <a:p>
@@ -8177,7 +9156,7 @@
             </a:pPr>
             <a:r>
               <a:rPr lang="en-US" sz="2000" dirty="0"/>
-              <a:t>Enjoy </a:t>
+              <a:t>Observe scaling </a:t>
             </a:r>
             <a:r>
               <a:rPr lang="en-US" sz="2000" dirty="0">
@@ -8273,7 +9252,7 @@
     </p:spTree>
     <p:extLst>
       <p:ext uri="{BB962C8B-B14F-4D97-AF65-F5344CB8AC3E}">
-        <p14:creationId xmlns:p14="http://schemas.microsoft.com/office/powerpoint/2010/main" val="1063810754"/>
+        <p14:creationId xmlns:p14="http://schemas.microsoft.com/office/powerpoint/2010/main" val="1304970078"/>
       </p:ext>
     </p:extLst>
   </p:cSld>
@@ -8316,7 +9295,7 @@
                                         <p:tgtEl>
                                           <p:spTgt spid="9">
                                             <p:txEl>
-                                              <p:pRg st="0" end="0"/>
+                                              <p:pRg st="2" end="2"/>
                                             </p:txEl>
                                           </p:spTgt>
                                         </p:tgtEl>
@@ -8334,7 +9313,7 @@
                                         <p:tgtEl>
                                           <p:spTgt spid="9">
                                             <p:txEl>
-                                              <p:pRg st="0" end="0"/>
+                                              <p:pRg st="2" end="2"/>
                                             </p:txEl>
                                           </p:spTgt>
                                         </p:tgtEl>
@@ -8377,7 +9356,7 @@
                                         <p:tgtEl>
                                           <p:spTgt spid="9">
                                             <p:txEl>
-                                              <p:pRg st="1" end="1"/>
+                                              <p:pRg st="0" end="0"/>
                                             </p:txEl>
                                           </p:spTgt>
                                         </p:tgtEl>
@@ -8395,7 +9374,7 @@
                                         <p:tgtEl>
                                           <p:spTgt spid="9">
                                             <p:txEl>
-                                              <p:pRg st="1" end="1"/>
+                                              <p:pRg st="0" end="0"/>
                                             </p:txEl>
                                           </p:spTgt>
                                         </p:tgtEl>
@@ -8438,7 +9417,7 @@
                                         <p:tgtEl>
                                           <p:spTgt spid="9">
                                             <p:txEl>
-                                              <p:pRg st="2" end="2"/>
+                                              <p:pRg st="1" end="1"/>
                                             </p:txEl>
                                           </p:spTgt>
                                         </p:tgtEl>
@@ -8456,7 +9435,7 @@
                                         <p:tgtEl>
                                           <p:spTgt spid="9">
                                             <p:txEl>
-                                              <p:pRg st="2" end="2"/>
+                                              <p:pRg st="1" end="1"/>
                                             </p:txEl>
                                           </p:spTgt>
                                         </p:tgtEl>
@@ -8740,242 +9719,6 @@
 </p:sld>
 </file>
 
-<file path=ppt/slides/slide16.xml><?xml version="1.0" encoding="utf-8"?>
-<p:sld xmlns:a="http://schemas.openxmlformats.org/drawingml/2006/main" xmlns:r="http://schemas.openxmlformats.org/officeDocument/2006/relationships" xmlns:p="http://schemas.openxmlformats.org/presentationml/2006/main">
-  <p:cSld>
-    <p:spTree>
-      <p:nvGrpSpPr>
-        <p:cNvPr id="1" name=""/>
-        <p:cNvGrpSpPr/>
-        <p:nvPr/>
-      </p:nvGrpSpPr>
-      <p:grpSpPr>
-        <a:xfrm>
-          <a:off x="0" y="0"/>
-          <a:ext cx="0" cy="0"/>
-          <a:chOff x="0" y="0"/>
-          <a:chExt cx="0" cy="0"/>
-        </a:xfrm>
-      </p:grpSpPr>
-      <p:sp>
-        <p:nvSpPr>
-          <p:cNvPr id="4" name="Title 3">
-            <a:extLst>
-              <a:ext uri="{FF2B5EF4-FFF2-40B4-BE49-F238E27FC236}">
-                <a16:creationId xmlns:a16="http://schemas.microsoft.com/office/drawing/2014/main" id="{5754F991-D8EE-8846-91BE-F9EF73FE3755}"/>
-              </a:ext>
-            </a:extLst>
-          </p:cNvPr>
-          <p:cNvSpPr>
-            <a:spLocks noGrp="1"/>
-          </p:cNvSpPr>
-          <p:nvPr>
-            <p:ph type="ctrTitle"/>
-          </p:nvPr>
-        </p:nvSpPr>
-        <p:spPr/>
-        <p:txBody>
-          <a:bodyPr/>
-          <a:lstStyle/>
-          <a:p>
-            <a:r>
-              <a:rPr lang="en-US" dirty="0"/>
-              <a:t>Let’s do it!</a:t>
-            </a:r>
-          </a:p>
-        </p:txBody>
-      </p:sp>
-      <p:sp>
-        <p:nvSpPr>
-          <p:cNvPr id="5" name="Subtitle 4">
-            <a:extLst>
-              <a:ext uri="{FF2B5EF4-FFF2-40B4-BE49-F238E27FC236}">
-                <a16:creationId xmlns:a16="http://schemas.microsoft.com/office/drawing/2014/main" id="{86F02CB2-F82E-854F-8852-D7CF9DFD0A6A}"/>
-              </a:ext>
-            </a:extLst>
-          </p:cNvPr>
-          <p:cNvSpPr>
-            <a:spLocks noGrp="1"/>
-          </p:cNvSpPr>
-          <p:nvPr>
-            <p:ph type="subTitle" idx="1"/>
-          </p:nvPr>
-        </p:nvSpPr>
-        <p:spPr/>
-        <p:txBody>
-          <a:bodyPr/>
-          <a:lstStyle/>
-          <a:p>
-            <a:endParaRPr lang="en-US"/>
-          </a:p>
-        </p:txBody>
-      </p:sp>
-    </p:spTree>
-    <p:extLst>
-      <p:ext uri="{BB962C8B-B14F-4D97-AF65-F5344CB8AC3E}">
-        <p14:creationId xmlns:p14="http://schemas.microsoft.com/office/powerpoint/2010/main" val="2823262607"/>
-      </p:ext>
-    </p:extLst>
-  </p:cSld>
-  <p:clrMapOvr>
-    <a:masterClrMapping/>
-  </p:clrMapOvr>
-</p:sld>
-</file>
-
-<file path=ppt/slides/slide17.xml><?xml version="1.0" encoding="utf-8"?>
-<p:sld xmlns:a="http://schemas.openxmlformats.org/drawingml/2006/main" xmlns:r="http://schemas.openxmlformats.org/officeDocument/2006/relationships" xmlns:p="http://schemas.openxmlformats.org/presentationml/2006/main">
-  <p:cSld>
-    <p:spTree>
-      <p:nvGrpSpPr>
-        <p:cNvPr id="1" name=""/>
-        <p:cNvGrpSpPr/>
-        <p:nvPr/>
-      </p:nvGrpSpPr>
-      <p:grpSpPr>
-        <a:xfrm>
-          <a:off x="0" y="0"/>
-          <a:ext cx="0" cy="0"/>
-          <a:chOff x="0" y="0"/>
-          <a:chExt cx="0" cy="0"/>
-        </a:xfrm>
-      </p:grpSpPr>
-      <p:sp>
-        <p:nvSpPr>
-          <p:cNvPr id="2" name="Title 1">
-            <a:extLst>
-              <a:ext uri="{FF2B5EF4-FFF2-40B4-BE49-F238E27FC236}">
-                <a16:creationId xmlns:a16="http://schemas.microsoft.com/office/drawing/2014/main" id="{2D1D3786-4DD3-7C48-9A94-B341A7FFFB85}"/>
-              </a:ext>
-            </a:extLst>
-          </p:cNvPr>
-          <p:cNvSpPr>
-            <a:spLocks noGrp="1"/>
-          </p:cNvSpPr>
-          <p:nvPr>
-            <p:ph type="title"/>
-          </p:nvPr>
-        </p:nvSpPr>
-        <p:spPr/>
-        <p:txBody>
-          <a:bodyPr/>
-          <a:lstStyle/>
-          <a:p>
-            <a:r>
-              <a:rPr lang="en-US" dirty="0"/>
-              <a:t>References</a:t>
-            </a:r>
-          </a:p>
-        </p:txBody>
-      </p:sp>
-      <p:sp>
-        <p:nvSpPr>
-          <p:cNvPr id="3" name="Content Placeholder 2">
-            <a:extLst>
-              <a:ext uri="{FF2B5EF4-FFF2-40B4-BE49-F238E27FC236}">
-                <a16:creationId xmlns:a16="http://schemas.microsoft.com/office/drawing/2014/main" id="{E21FA19F-419A-7841-863D-9CE064E37FF2}"/>
-              </a:ext>
-            </a:extLst>
-          </p:cNvPr>
-          <p:cNvSpPr>
-            <a:spLocks noGrp="1"/>
-          </p:cNvSpPr>
-          <p:nvPr>
-            <p:ph idx="1"/>
-          </p:nvPr>
-        </p:nvSpPr>
-        <p:spPr/>
-        <p:txBody>
-          <a:bodyPr/>
-          <a:lstStyle/>
-          <a:p>
-            <a:r>
-              <a:rPr lang="en-US" dirty="0">
-                <a:hlinkClick r:id="rId2"/>
-              </a:rPr>
-              <a:t>Horizontal  Pod Autoscaler</a:t>
-            </a:r>
-            <a:endParaRPr lang="en-US" dirty="0"/>
-          </a:p>
-          <a:p>
-            <a:r>
-              <a:rPr lang="en-US" dirty="0">
-                <a:hlinkClick r:id="rId3"/>
-              </a:rPr>
-              <a:t>Horizontal Pod Autoscaler Walkthrough</a:t>
-            </a:r>
-            <a:endParaRPr lang="en-US" dirty="0"/>
-          </a:p>
-          <a:p>
-            <a:r>
-              <a:rPr lang="en-US" dirty="0">
-                <a:hlinkClick r:id="rId4"/>
-              </a:rPr>
-              <a:t>https://keda.sh/</a:t>
-            </a:r>
-            <a:endParaRPr lang="en-US" dirty="0"/>
-          </a:p>
-          <a:p>
-            <a:r>
-              <a:rPr lang="en-US" dirty="0">
-                <a:hlinkClick r:id="rId5"/>
-              </a:rPr>
-              <a:t>KEDA on GitHub</a:t>
-            </a:r>
-            <a:endParaRPr lang="en-US" dirty="0"/>
-          </a:p>
-          <a:p>
-            <a:r>
-              <a:rPr lang="en-US" dirty="0">
-                <a:hlinkClick r:id="rId6"/>
-              </a:rPr>
-              <a:t>KEDA Samples</a:t>
-            </a:r>
-            <a:endParaRPr lang="en-US" dirty="0"/>
-          </a:p>
-          <a:p>
-            <a:r>
-              <a:rPr lang="en-US" dirty="0">
-                <a:hlinkClick r:id="rId7"/>
-              </a:rPr>
-              <a:t>Https://emadashi.com</a:t>
-            </a:r>
-            <a:r>
-              <a:rPr lang="en-US" dirty="0"/>
-              <a:t> </a:t>
-            </a:r>
-            <a:r>
-              <a:rPr lang="en-US" dirty="0">
-                <a:sym typeface="Wingdings" pitchFamily="2" charset="2"/>
-              </a:rPr>
-              <a:t></a:t>
-            </a:r>
-            <a:endParaRPr lang="en-US" dirty="0"/>
-          </a:p>
-          <a:p>
-            <a:r>
-              <a:rPr lang="en-US" dirty="0">
-                <a:hlinkClick r:id="rId8"/>
-              </a:rPr>
-              <a:t>Mock-server</a:t>
-            </a:r>
-            <a:endParaRPr lang="en-US" dirty="0"/>
-          </a:p>
-        </p:txBody>
-      </p:sp>
-    </p:spTree>
-    <p:extLst>
-      <p:ext uri="{BB962C8B-B14F-4D97-AF65-F5344CB8AC3E}">
-        <p14:creationId xmlns:p14="http://schemas.microsoft.com/office/powerpoint/2010/main" val="2713068039"/>
-      </p:ext>
-    </p:extLst>
-  </p:cSld>
-  <p:clrMapOvr>
-    <a:masterClrMapping/>
-  </p:clrMapOvr>
-</p:sld>
-</file>
-
 <file path=ppt/slides/slide2.xml><?xml version="1.0" encoding="utf-8"?>
 <p:sld xmlns:a="http://schemas.openxmlformats.org/drawingml/2006/main" xmlns:r="http://schemas.openxmlformats.org/officeDocument/2006/relationships" xmlns:p="http://schemas.openxmlformats.org/presentationml/2006/main">
   <p:cSld>
@@ -9104,6 +9847,325 @@
     <p:extLst>
       <p:ext uri="{BB962C8B-B14F-4D97-AF65-F5344CB8AC3E}">
         <p14:creationId xmlns:p14="http://schemas.microsoft.com/office/powerpoint/2010/main" val="3818036105"/>
+      </p:ext>
+    </p:extLst>
+  </p:cSld>
+  <p:clrMapOvr>
+    <a:masterClrMapping/>
+  </p:clrMapOvr>
+</p:sld>
+</file>
+
+<file path=ppt/slides/slide20.xml><?xml version="1.0" encoding="utf-8"?>
+<p:sld xmlns:a="http://schemas.openxmlformats.org/drawingml/2006/main" xmlns:r="http://schemas.openxmlformats.org/officeDocument/2006/relationships" xmlns:p="http://schemas.openxmlformats.org/presentationml/2006/main">
+  <p:cSld>
+    <p:spTree>
+      <p:nvGrpSpPr>
+        <p:cNvPr id="1" name=""/>
+        <p:cNvGrpSpPr/>
+        <p:nvPr/>
+      </p:nvGrpSpPr>
+      <p:grpSpPr>
+        <a:xfrm>
+          <a:off x="0" y="0"/>
+          <a:ext cx="0" cy="0"/>
+          <a:chOff x="0" y="0"/>
+          <a:chExt cx="0" cy="0"/>
+        </a:xfrm>
+      </p:grpSpPr>
+      <p:sp>
+        <p:nvSpPr>
+          <p:cNvPr id="8" name="Title 7">
+            <a:extLst>
+              <a:ext uri="{FF2B5EF4-FFF2-40B4-BE49-F238E27FC236}">
+                <a16:creationId xmlns:a16="http://schemas.microsoft.com/office/drawing/2014/main" id="{97B4083C-A237-8F44-8B9D-04615350ACF1}"/>
+              </a:ext>
+            </a:extLst>
+          </p:cNvPr>
+          <p:cNvSpPr>
+            <a:spLocks noGrp="1"/>
+          </p:cNvSpPr>
+          <p:nvPr>
+            <p:ph type="ctrTitle"/>
+          </p:nvPr>
+        </p:nvSpPr>
+        <p:spPr/>
+        <p:txBody>
+          <a:bodyPr/>
+          <a:lstStyle/>
+          <a:p>
+            <a:r>
+              <a:rPr lang="en-US" dirty="0"/>
+              <a:t>Let’s do it!</a:t>
+            </a:r>
+          </a:p>
+        </p:txBody>
+      </p:sp>
+      <p:sp>
+        <p:nvSpPr>
+          <p:cNvPr id="9" name="Subtitle 8">
+            <a:extLst>
+              <a:ext uri="{FF2B5EF4-FFF2-40B4-BE49-F238E27FC236}">
+                <a16:creationId xmlns:a16="http://schemas.microsoft.com/office/drawing/2014/main" id="{F41C9855-7893-714C-80F6-B34BA2A9EE0A}"/>
+              </a:ext>
+            </a:extLst>
+          </p:cNvPr>
+          <p:cNvSpPr>
+            <a:spLocks noGrp="1"/>
+          </p:cNvSpPr>
+          <p:nvPr>
+            <p:ph type="subTitle" idx="1"/>
+          </p:nvPr>
+        </p:nvSpPr>
+        <p:spPr/>
+        <p:txBody>
+          <a:bodyPr/>
+          <a:lstStyle/>
+          <a:p>
+            <a:endParaRPr lang="en-US"/>
+          </a:p>
+        </p:txBody>
+      </p:sp>
+    </p:spTree>
+    <p:extLst>
+      <p:ext uri="{BB962C8B-B14F-4D97-AF65-F5344CB8AC3E}">
+        <p14:creationId xmlns:p14="http://schemas.microsoft.com/office/powerpoint/2010/main" val="1232865975"/>
+      </p:ext>
+    </p:extLst>
+  </p:cSld>
+  <p:clrMapOvr>
+    <a:masterClrMapping/>
+  </p:clrMapOvr>
+</p:sld>
+</file>
+
+<file path=ppt/slides/slide21.xml><?xml version="1.0" encoding="utf-8"?>
+<p:sld xmlns:a="http://schemas.openxmlformats.org/drawingml/2006/main" xmlns:r="http://schemas.openxmlformats.org/officeDocument/2006/relationships" xmlns:p="http://schemas.openxmlformats.org/presentationml/2006/main">
+  <p:cSld>
+    <p:spTree>
+      <p:nvGrpSpPr>
+        <p:cNvPr id="1" name=""/>
+        <p:cNvGrpSpPr/>
+        <p:nvPr/>
+      </p:nvGrpSpPr>
+      <p:grpSpPr>
+        <a:xfrm>
+          <a:off x="0" y="0"/>
+          <a:ext cx="0" cy="0"/>
+          <a:chOff x="0" y="0"/>
+          <a:chExt cx="0" cy="0"/>
+        </a:xfrm>
+      </p:grpSpPr>
+      <p:sp>
+        <p:nvSpPr>
+          <p:cNvPr id="4" name="Title 3">
+            <a:extLst>
+              <a:ext uri="{FF2B5EF4-FFF2-40B4-BE49-F238E27FC236}">
+                <a16:creationId xmlns:a16="http://schemas.microsoft.com/office/drawing/2014/main" id="{A8FA9065-A2C9-9F42-B178-C988801824D3}"/>
+              </a:ext>
+            </a:extLst>
+          </p:cNvPr>
+          <p:cNvSpPr>
+            <a:spLocks noGrp="1"/>
+          </p:cNvSpPr>
+          <p:nvPr>
+            <p:ph type="ctrTitle"/>
+          </p:nvPr>
+        </p:nvSpPr>
+        <p:spPr/>
+        <p:txBody>
+          <a:bodyPr/>
+          <a:lstStyle/>
+          <a:p>
+            <a:r>
+              <a:rPr lang="en-US"/>
+              <a:t>TriggerAuthentication</a:t>
+            </a:r>
+          </a:p>
+        </p:txBody>
+      </p:sp>
+      <p:sp>
+        <p:nvSpPr>
+          <p:cNvPr id="5" name="Subtitle 4">
+            <a:extLst>
+              <a:ext uri="{FF2B5EF4-FFF2-40B4-BE49-F238E27FC236}">
+                <a16:creationId xmlns:a16="http://schemas.microsoft.com/office/drawing/2014/main" id="{FB423C7E-4B44-B849-8D3E-354D61582ADE}"/>
+              </a:ext>
+            </a:extLst>
+          </p:cNvPr>
+          <p:cNvSpPr>
+            <a:spLocks noGrp="1"/>
+          </p:cNvSpPr>
+          <p:nvPr>
+            <p:ph type="subTitle" idx="1"/>
+          </p:nvPr>
+        </p:nvSpPr>
+        <p:spPr/>
+        <p:txBody>
+          <a:bodyPr/>
+          <a:lstStyle/>
+          <a:p>
+            <a:endParaRPr lang="en-US"/>
+          </a:p>
+        </p:txBody>
+      </p:sp>
+    </p:spTree>
+    <p:extLst>
+      <p:ext uri="{BB962C8B-B14F-4D97-AF65-F5344CB8AC3E}">
+        <p14:creationId xmlns:p14="http://schemas.microsoft.com/office/powerpoint/2010/main" val="2933057112"/>
+      </p:ext>
+    </p:extLst>
+  </p:cSld>
+  <p:clrMapOvr>
+    <a:masterClrMapping/>
+  </p:clrMapOvr>
+</p:sld>
+</file>
+
+<file path=ppt/slides/slide22.xml><?xml version="1.0" encoding="utf-8"?>
+<p:sld xmlns:a="http://schemas.openxmlformats.org/drawingml/2006/main" xmlns:r="http://schemas.openxmlformats.org/officeDocument/2006/relationships" xmlns:p="http://schemas.openxmlformats.org/presentationml/2006/main">
+  <p:cSld>
+    <p:spTree>
+      <p:nvGrpSpPr>
+        <p:cNvPr id="1" name=""/>
+        <p:cNvGrpSpPr/>
+        <p:nvPr/>
+      </p:nvGrpSpPr>
+      <p:grpSpPr>
+        <a:xfrm>
+          <a:off x="0" y="0"/>
+          <a:ext cx="0" cy="0"/>
+          <a:chOff x="0" y="0"/>
+          <a:chExt cx="0" cy="0"/>
+        </a:xfrm>
+      </p:grpSpPr>
+      <p:sp>
+        <p:nvSpPr>
+          <p:cNvPr id="2" name="Title 1">
+            <a:extLst>
+              <a:ext uri="{FF2B5EF4-FFF2-40B4-BE49-F238E27FC236}">
+                <a16:creationId xmlns:a16="http://schemas.microsoft.com/office/drawing/2014/main" id="{2D1D3786-4DD3-7C48-9A94-B341A7FFFB85}"/>
+              </a:ext>
+            </a:extLst>
+          </p:cNvPr>
+          <p:cNvSpPr>
+            <a:spLocks noGrp="1"/>
+          </p:cNvSpPr>
+          <p:nvPr>
+            <p:ph type="title"/>
+          </p:nvPr>
+        </p:nvSpPr>
+        <p:spPr/>
+        <p:txBody>
+          <a:bodyPr/>
+          <a:lstStyle/>
+          <a:p>
+            <a:r>
+              <a:rPr lang="en-US" dirty="0"/>
+              <a:t>References</a:t>
+            </a:r>
+          </a:p>
+        </p:txBody>
+      </p:sp>
+      <p:sp>
+        <p:nvSpPr>
+          <p:cNvPr id="3" name="Content Placeholder 2">
+            <a:extLst>
+              <a:ext uri="{FF2B5EF4-FFF2-40B4-BE49-F238E27FC236}">
+                <a16:creationId xmlns:a16="http://schemas.microsoft.com/office/drawing/2014/main" id="{E21FA19F-419A-7841-863D-9CE064E37FF2}"/>
+              </a:ext>
+            </a:extLst>
+          </p:cNvPr>
+          <p:cNvSpPr>
+            <a:spLocks noGrp="1"/>
+          </p:cNvSpPr>
+          <p:nvPr>
+            <p:ph idx="1"/>
+          </p:nvPr>
+        </p:nvSpPr>
+        <p:spPr/>
+        <p:txBody>
+          <a:bodyPr/>
+          <a:lstStyle/>
+          <a:p>
+            <a:r>
+              <a:rPr lang="en-US" dirty="0">
+                <a:hlinkClick r:id="rId2"/>
+              </a:rPr>
+              <a:t>Horizontal  Pod Autoscaler</a:t>
+            </a:r>
+            <a:endParaRPr lang="en-US" dirty="0"/>
+          </a:p>
+          <a:p>
+            <a:r>
+              <a:rPr lang="en-US" dirty="0">
+                <a:hlinkClick r:id="rId3"/>
+              </a:rPr>
+              <a:t>Horizontal Pod Autoscaler Walkthrough</a:t>
+            </a:r>
+            <a:endParaRPr lang="en-US" dirty="0"/>
+          </a:p>
+          <a:p>
+            <a:r>
+              <a:rPr lang="en-US" dirty="0">
+                <a:hlinkClick r:id="rId4"/>
+              </a:rPr>
+              <a:t>https://keda.sh/</a:t>
+            </a:r>
+            <a:endParaRPr lang="en-US" dirty="0"/>
+          </a:p>
+          <a:p>
+            <a:r>
+              <a:rPr lang="en-US" dirty="0">
+                <a:hlinkClick r:id="rId5"/>
+              </a:rPr>
+              <a:t>KEDA on GitHub</a:t>
+            </a:r>
+            <a:endParaRPr lang="en-US" dirty="0"/>
+          </a:p>
+          <a:p>
+            <a:r>
+              <a:rPr lang="en-US" dirty="0">
+                <a:hlinkClick r:id="rId6"/>
+              </a:rPr>
+              <a:t>KEDA Samples</a:t>
+            </a:r>
+            <a:endParaRPr lang="en-US" dirty="0"/>
+          </a:p>
+          <a:p>
+            <a:r>
+              <a:rPr lang="en-US" dirty="0">
+                <a:hlinkClick r:id="rId7"/>
+              </a:rPr>
+              <a:t>Https://emadashi.com</a:t>
+            </a:r>
+            <a:r>
+              <a:rPr lang="en-US" dirty="0"/>
+              <a:t> </a:t>
+            </a:r>
+            <a:r>
+              <a:rPr lang="en-US" dirty="0">
+                <a:sym typeface="Wingdings" pitchFamily="2" charset="2"/>
+              </a:rPr>
+              <a:t></a:t>
+            </a:r>
+            <a:endParaRPr lang="en-US" dirty="0"/>
+          </a:p>
+          <a:p>
+            <a:r>
+              <a:rPr lang="en-US" dirty="0">
+                <a:hlinkClick r:id="rId8"/>
+              </a:rPr>
+              <a:t>Mock-server</a:t>
+            </a:r>
+            <a:endParaRPr lang="en-US" dirty="0"/>
+          </a:p>
+        </p:txBody>
+      </p:sp>
+    </p:spTree>
+    <p:extLst>
+      <p:ext uri="{BB962C8B-B14F-4D97-AF65-F5344CB8AC3E}">
+        <p14:creationId xmlns:p14="http://schemas.microsoft.com/office/powerpoint/2010/main" val="2713068039"/>
       </p:ext>
     </p:extLst>
   </p:cSld>
@@ -9586,7 +10648,7 @@
             </a:pPr>
             <a:r>
               <a:rPr lang="en-US" sz="2000" dirty="0"/>
-              <a:t>Presentation</a:t>
+              <a:t>Presentation 1: KEDA &amp; Built-in Scalers</a:t>
             </a:r>
           </a:p>
           <a:p>
@@ -9596,7 +10658,14 @@
             </a:pPr>
             <a:r>
               <a:rPr lang="en-US" sz="2000" dirty="0"/>
-              <a:t>Hands on</a:t>
+              <a:t>Workshop 1: RabbitMQ Scaler</a:t>
+            </a:r>
+          </a:p>
+          <a:p>
+            <a:pPr algn="l"/>
+            <a:r>
+              <a:rPr lang="en-US" sz="2000" dirty="0"/>
+              <a:t>-----</a:t>
             </a:r>
           </a:p>
           <a:p>
@@ -9606,7 +10675,59 @@
             </a:pPr>
             <a:r>
               <a:rPr lang="en-US" sz="2000" dirty="0"/>
-              <a:t>10 minutes breaks</a:t>
+              <a:t>Presentation 2: External Scalers</a:t>
+            </a:r>
+          </a:p>
+          <a:p>
+            <a:pPr marL="342900" indent="-342900" algn="l">
+              <a:buFont typeface="Arial" panose="020B0604020202020204" pitchFamily="34" charset="0"/>
+              <a:buChar char="•"/>
+            </a:pPr>
+            <a:r>
+              <a:rPr lang="en-US" sz="2000" dirty="0"/>
+              <a:t>Workshop 2: Building an External Scaler</a:t>
+            </a:r>
+          </a:p>
+          <a:p>
+            <a:pPr algn="l"/>
+            <a:r>
+              <a:rPr lang="en-US" sz="2000" dirty="0"/>
+              <a:t>----</a:t>
+            </a:r>
+          </a:p>
+          <a:p>
+            <a:pPr marL="342900" indent="-342900" algn="l">
+              <a:buFont typeface="Arial" panose="020B0604020202020204" pitchFamily="34" charset="0"/>
+              <a:buChar char="•"/>
+            </a:pPr>
+            <a:r>
+              <a:rPr lang="en-US" sz="2000" dirty="0" err="1"/>
+              <a:t>Misc</a:t>
+            </a:r>
+            <a:r>
+              <a:rPr lang="en-US" sz="2000" dirty="0"/>
+              <a:t>: Authentication</a:t>
+            </a:r>
+          </a:p>
+          <a:p>
+            <a:pPr marL="342900" indent="-342900" algn="l">
+              <a:buFont typeface="Arial" panose="020B0604020202020204" pitchFamily="34" charset="0"/>
+              <a:buChar char="•"/>
+            </a:pPr>
+            <a:endParaRPr lang="en-US" sz="2000" dirty="0"/>
+          </a:p>
+          <a:p>
+            <a:pPr marL="342900" indent="-342900" algn="l">
+              <a:buFont typeface="Arial" panose="020B0604020202020204" pitchFamily="34" charset="0"/>
+              <a:buChar char="•"/>
+            </a:pPr>
+            <a:endParaRPr lang="en-US" sz="2000" dirty="0"/>
+          </a:p>
+          <a:p>
+            <a:pPr algn="l"/>
+            <a:r>
+              <a:rPr lang="en-US" sz="2000" dirty="0"/>
+              <a:t>Breaks will be every 1.5-2.0 hours.</a:t>
             </a:r>
           </a:p>
         </p:txBody>
@@ -11596,15 +12717,7 @@
             <a:pPr lvl="1"/>
             <a:r>
               <a:rPr lang="en-US" dirty="0"/>
-              <a:t>AWS (SQS, </a:t>
-            </a:r>
-            <a:r>
-              <a:rPr lang="en-US" dirty="0" err="1"/>
-              <a:t>CoudWatch</a:t>
-            </a:r>
-            <a:r>
-              <a:rPr lang="en-US" dirty="0"/>
-              <a:t>, Kinesis)</a:t>
+              <a:t>AWS (SQS, CloudWatch, Kinesis)</a:t>
             </a:r>
           </a:p>
           <a:p>

</xml_diff>

<commit_message>
Add couple of slides for TriggerAuthentication
</commit_message>
<xml_diff>
--- a/preso.pptx
+++ b/preso.pptx
@@ -5,7 +5,7 @@
     <p:sldMasterId id="2147483660" r:id="rId1"/>
   </p:sldMasterIdLst>
   <p:notesMasterIdLst>
-    <p:notesMasterId r:id="rId25"/>
+    <p:notesMasterId r:id="rId27"/>
   </p:notesMasterIdLst>
   <p:sldIdLst>
     <p:sldId id="256" r:id="rId2"/>
@@ -30,7 +30,9 @@
     <p:sldId id="276" r:id="rId21"/>
     <p:sldId id="277" r:id="rId22"/>
     <p:sldId id="278" r:id="rId23"/>
-    <p:sldId id="272" r:id="rId24"/>
+    <p:sldId id="279" r:id="rId24"/>
+    <p:sldId id="280" r:id="rId25"/>
+    <p:sldId id="272" r:id="rId26"/>
   </p:sldIdLst>
   <p:sldSz cx="12192000" cy="6858000"/>
   <p:notesSz cx="6858000" cy="9144000"/>
@@ -219,7 +221,7 @@
           <a:p>
             <a:fld id="{05D5B59A-0EDA-EF41-85FF-03176606BBBE}" type="datetimeFigureOut">
               <a:rPr lang="en-US" smtClean="0"/>
-              <a:t>8/30/20</a:t>
+              <a:t>9/6/20</a:t>
             </a:fld>
             <a:endParaRPr lang="en-US"/>
           </a:p>
@@ -661,6 +663,180 @@
 </p:notes>
 </file>
 
+<file path=ppt/notesSlides/notesSlide3.xml><?xml version="1.0" encoding="utf-8"?>
+<p:notes xmlns:a="http://schemas.openxmlformats.org/drawingml/2006/main" xmlns:r="http://schemas.openxmlformats.org/officeDocument/2006/relationships" xmlns:p="http://schemas.openxmlformats.org/presentationml/2006/main">
+  <p:cSld>
+    <p:spTree>
+      <p:nvGrpSpPr>
+        <p:cNvPr id="1" name=""/>
+        <p:cNvGrpSpPr/>
+        <p:nvPr/>
+      </p:nvGrpSpPr>
+      <p:grpSpPr>
+        <a:xfrm>
+          <a:off x="0" y="0"/>
+          <a:ext cx="0" cy="0"/>
+          <a:chOff x="0" y="0"/>
+          <a:chExt cx="0" cy="0"/>
+        </a:xfrm>
+      </p:grpSpPr>
+      <p:sp>
+        <p:nvSpPr>
+          <p:cNvPr id="2" name="Slide Image Placeholder 1"/>
+          <p:cNvSpPr>
+            <a:spLocks noGrp="1" noRot="1" noChangeAspect="1"/>
+          </p:cNvSpPr>
+          <p:nvPr>
+            <p:ph type="sldImg"/>
+          </p:nvPr>
+        </p:nvSpPr>
+        <p:spPr/>
+      </p:sp>
+      <p:sp>
+        <p:nvSpPr>
+          <p:cNvPr id="3" name="Notes Placeholder 2"/>
+          <p:cNvSpPr>
+            <a:spLocks noGrp="1"/>
+          </p:cNvSpPr>
+          <p:nvPr>
+            <p:ph type="body" idx="1"/>
+          </p:nvPr>
+        </p:nvSpPr>
+        <p:spPr/>
+        <p:txBody>
+          <a:bodyPr/>
+          <a:lstStyle/>
+          <a:p>
+            <a:r>
+              <a:rPr lang="en-US" dirty="0"/>
+              <a:t>Using a secret directly</a:t>
+            </a:r>
+          </a:p>
+        </p:txBody>
+      </p:sp>
+      <p:sp>
+        <p:nvSpPr>
+          <p:cNvPr id="4" name="Slide Number Placeholder 3"/>
+          <p:cNvSpPr>
+            <a:spLocks noGrp="1"/>
+          </p:cNvSpPr>
+          <p:nvPr>
+            <p:ph type="sldNum" sz="quarter" idx="5"/>
+          </p:nvPr>
+        </p:nvSpPr>
+        <p:spPr/>
+        <p:txBody>
+          <a:bodyPr/>
+          <a:lstStyle/>
+          <a:p>
+            <a:fld id="{B786E5CD-0DE5-2548-BADF-C53099846BB2}" type="slidenum">
+              <a:rPr lang="en-US" smtClean="0"/>
+              <a:t>23</a:t>
+            </a:fld>
+            <a:endParaRPr lang="en-US"/>
+          </a:p>
+        </p:txBody>
+      </p:sp>
+    </p:spTree>
+    <p:extLst>
+      <p:ext uri="{BB962C8B-B14F-4D97-AF65-F5344CB8AC3E}">
+        <p14:creationId xmlns:p14="http://schemas.microsoft.com/office/powerpoint/2010/main" val="1771944772"/>
+      </p:ext>
+    </p:extLst>
+  </p:cSld>
+  <p:clrMapOvr>
+    <a:masterClrMapping/>
+  </p:clrMapOvr>
+</p:notes>
+</file>
+
+<file path=ppt/notesSlides/notesSlide4.xml><?xml version="1.0" encoding="utf-8"?>
+<p:notes xmlns:a="http://schemas.openxmlformats.org/drawingml/2006/main" xmlns:r="http://schemas.openxmlformats.org/officeDocument/2006/relationships" xmlns:p="http://schemas.openxmlformats.org/presentationml/2006/main">
+  <p:cSld>
+    <p:spTree>
+      <p:nvGrpSpPr>
+        <p:cNvPr id="1" name=""/>
+        <p:cNvGrpSpPr/>
+        <p:nvPr/>
+      </p:nvGrpSpPr>
+      <p:grpSpPr>
+        <a:xfrm>
+          <a:off x="0" y="0"/>
+          <a:ext cx="0" cy="0"/>
+          <a:chOff x="0" y="0"/>
+          <a:chExt cx="0" cy="0"/>
+        </a:xfrm>
+      </p:grpSpPr>
+      <p:sp>
+        <p:nvSpPr>
+          <p:cNvPr id="2" name="Slide Image Placeholder 1"/>
+          <p:cNvSpPr>
+            <a:spLocks noGrp="1" noRot="1" noChangeAspect="1"/>
+          </p:cNvSpPr>
+          <p:nvPr>
+            <p:ph type="sldImg"/>
+          </p:nvPr>
+        </p:nvSpPr>
+        <p:spPr/>
+      </p:sp>
+      <p:sp>
+        <p:nvSpPr>
+          <p:cNvPr id="3" name="Notes Placeholder 2"/>
+          <p:cNvSpPr>
+            <a:spLocks noGrp="1"/>
+          </p:cNvSpPr>
+          <p:nvPr>
+            <p:ph type="body" idx="1"/>
+          </p:nvPr>
+        </p:nvSpPr>
+        <p:spPr/>
+        <p:txBody>
+          <a:bodyPr/>
+          <a:lstStyle/>
+          <a:p>
+            <a:r>
+              <a:rPr lang="en-US" dirty="0"/>
+              <a:t>Using a secret directly</a:t>
+            </a:r>
+          </a:p>
+        </p:txBody>
+      </p:sp>
+      <p:sp>
+        <p:nvSpPr>
+          <p:cNvPr id="4" name="Slide Number Placeholder 3"/>
+          <p:cNvSpPr>
+            <a:spLocks noGrp="1"/>
+          </p:cNvSpPr>
+          <p:nvPr>
+            <p:ph type="sldNum" sz="quarter" idx="5"/>
+          </p:nvPr>
+        </p:nvSpPr>
+        <p:spPr/>
+        <p:txBody>
+          <a:bodyPr/>
+          <a:lstStyle/>
+          <a:p>
+            <a:fld id="{B786E5CD-0DE5-2548-BADF-C53099846BB2}" type="slidenum">
+              <a:rPr lang="en-US" smtClean="0"/>
+              <a:t>24</a:t>
+            </a:fld>
+            <a:endParaRPr lang="en-US"/>
+          </a:p>
+        </p:txBody>
+      </p:sp>
+    </p:spTree>
+    <p:extLst>
+      <p:ext uri="{BB962C8B-B14F-4D97-AF65-F5344CB8AC3E}">
+        <p14:creationId xmlns:p14="http://schemas.microsoft.com/office/powerpoint/2010/main" val="2855974713"/>
+      </p:ext>
+    </p:extLst>
+  </p:cSld>
+  <p:clrMapOvr>
+    <a:masterClrMapping/>
+  </p:clrMapOvr>
+</p:notes>
+</file>
+
 <file path=ppt/slideLayouts/slideLayout1.xml><?xml version="1.0" encoding="utf-8"?>
 <p:sldLayout xmlns:a="http://schemas.openxmlformats.org/drawingml/2006/main" xmlns:r="http://schemas.openxmlformats.org/officeDocument/2006/relationships" xmlns:p="http://schemas.openxmlformats.org/presentationml/2006/main" type="title" preserve="1">
   <p:cSld name="Title Slide">
@@ -792,7 +968,7 @@
           <a:p>
             <a:fld id="{7C747D7E-6B19-984E-90F5-E9EEF49EFB72}" type="datetimeFigureOut">
               <a:rPr lang="en-US" smtClean="0"/>
-              <a:t>8/30/20</a:t>
+              <a:t>9/6/20</a:t>
             </a:fld>
             <a:endParaRPr lang="en-US"/>
           </a:p>
@@ -962,7 +1138,7 @@
           <a:p>
             <a:fld id="{7C747D7E-6B19-984E-90F5-E9EEF49EFB72}" type="datetimeFigureOut">
               <a:rPr lang="en-US" smtClean="0"/>
-              <a:t>8/30/20</a:t>
+              <a:t>9/6/20</a:t>
             </a:fld>
             <a:endParaRPr lang="en-US"/>
           </a:p>
@@ -1142,7 +1318,7 @@
           <a:p>
             <a:fld id="{7C747D7E-6B19-984E-90F5-E9EEF49EFB72}" type="datetimeFigureOut">
               <a:rPr lang="en-US" smtClean="0"/>
-              <a:t>8/30/20</a:t>
+              <a:t>9/6/20</a:t>
             </a:fld>
             <a:endParaRPr lang="en-US"/>
           </a:p>
@@ -1312,7 +1488,7 @@
           <a:p>
             <a:fld id="{7C747D7E-6B19-984E-90F5-E9EEF49EFB72}" type="datetimeFigureOut">
               <a:rPr lang="en-US" smtClean="0"/>
-              <a:t>8/30/20</a:t>
+              <a:t>9/6/20</a:t>
             </a:fld>
             <a:endParaRPr lang="en-US"/>
           </a:p>
@@ -1558,7 +1734,7 @@
           <a:p>
             <a:fld id="{7C747D7E-6B19-984E-90F5-E9EEF49EFB72}" type="datetimeFigureOut">
               <a:rPr lang="en-US" smtClean="0"/>
-              <a:t>8/30/20</a:t>
+              <a:t>9/6/20</a:t>
             </a:fld>
             <a:endParaRPr lang="en-US"/>
           </a:p>
@@ -1790,7 +1966,7 @@
           <a:p>
             <a:fld id="{7C747D7E-6B19-984E-90F5-E9EEF49EFB72}" type="datetimeFigureOut">
               <a:rPr lang="en-US" smtClean="0"/>
-              <a:t>8/30/20</a:t>
+              <a:t>9/6/20</a:t>
             </a:fld>
             <a:endParaRPr lang="en-US"/>
           </a:p>
@@ -2157,7 +2333,7 @@
           <a:p>
             <a:fld id="{7C747D7E-6B19-984E-90F5-E9EEF49EFB72}" type="datetimeFigureOut">
               <a:rPr lang="en-US" smtClean="0"/>
-              <a:t>8/30/20</a:t>
+              <a:t>9/6/20</a:t>
             </a:fld>
             <a:endParaRPr lang="en-US"/>
           </a:p>
@@ -2275,7 +2451,7 @@
           <a:p>
             <a:fld id="{7C747D7E-6B19-984E-90F5-E9EEF49EFB72}" type="datetimeFigureOut">
               <a:rPr lang="en-US" smtClean="0"/>
-              <a:t>8/30/20</a:t>
+              <a:t>9/6/20</a:t>
             </a:fld>
             <a:endParaRPr lang="en-US"/>
           </a:p>
@@ -2370,7 +2546,7 @@
           <a:p>
             <a:fld id="{7C747D7E-6B19-984E-90F5-E9EEF49EFB72}" type="datetimeFigureOut">
               <a:rPr lang="en-US" smtClean="0"/>
-              <a:t>8/30/20</a:t>
+              <a:t>9/6/20</a:t>
             </a:fld>
             <a:endParaRPr lang="en-US"/>
           </a:p>
@@ -2647,7 +2823,7 @@
           <a:p>
             <a:fld id="{7C747D7E-6B19-984E-90F5-E9EEF49EFB72}" type="datetimeFigureOut">
               <a:rPr lang="en-US" smtClean="0"/>
-              <a:t>8/30/20</a:t>
+              <a:t>9/6/20</a:t>
             </a:fld>
             <a:endParaRPr lang="en-US"/>
           </a:p>
@@ -2904,7 +3080,7 @@
           <a:p>
             <a:fld id="{7C747D7E-6B19-984E-90F5-E9EEF49EFB72}" type="datetimeFigureOut">
               <a:rPr lang="en-US" smtClean="0"/>
-              <a:t>8/30/20</a:t>
+              <a:t>9/6/20</a:t>
             </a:fld>
             <a:endParaRPr lang="en-US"/>
           </a:p>
@@ -3117,7 +3293,7 @@
           <a:p>
             <a:fld id="{7C747D7E-6B19-984E-90F5-E9EEF49EFB72}" type="datetimeFigureOut">
               <a:rPr lang="en-US" smtClean="0"/>
-              <a:t>8/30/20</a:t>
+              <a:t>9/6/20</a:t>
             </a:fld>
             <a:endParaRPr lang="en-US"/>
           </a:p>
@@ -10105,15 +10281,7 @@
           <a:p>
             <a:r>
               <a:rPr lang="en-US" dirty="0"/>
-              <a:t>Managed Identity (e.g. </a:t>
-            </a:r>
-            <a:r>
-              <a:rPr lang="en-US"/>
-              <a:t>Azure Pod </a:t>
-            </a:r>
-            <a:r>
-              <a:rPr lang="en-US" dirty="0"/>
-              <a:t>Identity)</a:t>
+              <a:t>Managed Identity (e.g. Azure Pod Identity)</a:t>
             </a:r>
           </a:p>
         </p:txBody>
@@ -10132,6 +10300,682 @@
 </file>
 
 <file path=ppt/slides/slide23.xml><?xml version="1.0" encoding="utf-8"?>
+<p:sld xmlns:a="http://schemas.openxmlformats.org/drawingml/2006/main" xmlns:r="http://schemas.openxmlformats.org/officeDocument/2006/relationships" xmlns:p="http://schemas.openxmlformats.org/presentationml/2006/main">
+  <p:cSld>
+    <p:spTree>
+      <p:nvGrpSpPr>
+        <p:cNvPr id="1" name=""/>
+        <p:cNvGrpSpPr/>
+        <p:nvPr/>
+      </p:nvGrpSpPr>
+      <p:grpSpPr>
+        <a:xfrm>
+          <a:off x="0" y="0"/>
+          <a:ext cx="0" cy="0"/>
+          <a:chOff x="0" y="0"/>
+          <a:chExt cx="0" cy="0"/>
+        </a:xfrm>
+      </p:grpSpPr>
+      <p:sp>
+        <p:nvSpPr>
+          <p:cNvPr id="4" name="Rectangle 3">
+            <a:extLst>
+              <a:ext uri="{FF2B5EF4-FFF2-40B4-BE49-F238E27FC236}">
+                <a16:creationId xmlns:a16="http://schemas.microsoft.com/office/drawing/2014/main" id="{25EE69ED-EE01-E04D-A7A4-55582069BCB3}"/>
+              </a:ext>
+            </a:extLst>
+          </p:cNvPr>
+          <p:cNvSpPr/>
+          <p:nvPr/>
+        </p:nvSpPr>
+        <p:spPr>
+          <a:xfrm>
+            <a:off x="2998149" y="1367327"/>
+            <a:ext cx="7196984" cy="3785652"/>
+          </a:xfrm>
+          <a:prstGeom prst="rect">
+            <a:avLst/>
+          </a:prstGeom>
+        </p:spPr>
+        <p:txBody>
+          <a:bodyPr wrap="square">
+            <a:spAutoFit/>
+          </a:bodyPr>
+          <a:lstStyle/>
+          <a:p>
+            <a:r>
+              <a:rPr lang="en-AU" sz="2400" dirty="0" err="1">
+                <a:solidFill>
+                  <a:srgbClr val="B8BB26">
+                    <a:alpha val="42000"/>
+                  </a:srgbClr>
+                </a:solidFill>
+                <a:latin typeface="Menlo" panose="020B0609030804020204" pitchFamily="49" charset="0"/>
+              </a:rPr>
+              <a:t>apiVersion</a:t>
+            </a:r>
+            <a:r>
+              <a:rPr lang="en-AU" sz="2400" dirty="0">
+                <a:solidFill>
+                  <a:srgbClr val="B8BB26">
+                    <a:alpha val="42000"/>
+                  </a:srgbClr>
+                </a:solidFill>
+                <a:latin typeface="Menlo" panose="020B0609030804020204" pitchFamily="49" charset="0"/>
+              </a:rPr>
+              <a:t>: keda.k8s.io/v1alpha1</a:t>
+            </a:r>
+          </a:p>
+          <a:p>
+            <a:r>
+              <a:rPr lang="en-AU" sz="2400" dirty="0">
+                <a:solidFill>
+                  <a:srgbClr val="8EC07C"/>
+                </a:solidFill>
+                <a:latin typeface="Menlo" panose="020B0609030804020204" pitchFamily="49" charset="0"/>
+              </a:rPr>
+              <a:t>kind</a:t>
+            </a:r>
+            <a:r>
+              <a:rPr lang="en-AU" sz="2400" dirty="0">
+                <a:solidFill>
+                  <a:srgbClr val="A89984"/>
+                </a:solidFill>
+                <a:latin typeface="Menlo" panose="020B0609030804020204" pitchFamily="49" charset="0"/>
+              </a:rPr>
+              <a:t>:</a:t>
+            </a:r>
+            <a:r>
+              <a:rPr lang="en-AU" sz="2400" dirty="0">
+                <a:solidFill>
+                  <a:srgbClr val="EBDBB2"/>
+                </a:solidFill>
+                <a:latin typeface="Menlo" panose="020B0609030804020204" pitchFamily="49" charset="0"/>
+              </a:rPr>
+              <a:t> </a:t>
+            </a:r>
+            <a:r>
+              <a:rPr lang="en-AU" sz="2400" dirty="0" err="1">
+                <a:solidFill>
+                  <a:srgbClr val="B8BB26"/>
+                </a:solidFill>
+                <a:latin typeface="Menlo" panose="020B0609030804020204" pitchFamily="49" charset="0"/>
+              </a:rPr>
+              <a:t>TriggerAuthentication</a:t>
+            </a:r>
+            <a:endParaRPr lang="en-AU" sz="2400" dirty="0">
+              <a:solidFill>
+                <a:srgbClr val="EBDBB2"/>
+              </a:solidFill>
+              <a:latin typeface="Menlo" panose="020B0609030804020204" pitchFamily="49" charset="0"/>
+            </a:endParaRPr>
+          </a:p>
+          <a:p>
+            <a:r>
+              <a:rPr lang="en-AU" sz="2400" dirty="0">
+                <a:solidFill>
+                  <a:srgbClr val="8EC07C">
+                    <a:alpha val="45000"/>
+                  </a:srgbClr>
+                </a:solidFill>
+                <a:latin typeface="Menlo" panose="020B0609030804020204" pitchFamily="49" charset="0"/>
+              </a:rPr>
+              <a:t>metadata:</a:t>
+            </a:r>
+          </a:p>
+          <a:p>
+            <a:r>
+              <a:rPr lang="en-AU" sz="2400" dirty="0">
+                <a:solidFill>
+                  <a:srgbClr val="8EC07C"/>
+                </a:solidFill>
+                <a:latin typeface="Menlo" panose="020B0609030804020204" pitchFamily="49" charset="0"/>
+              </a:rPr>
+              <a:t>name</a:t>
+            </a:r>
+            <a:r>
+              <a:rPr lang="en-AU" sz="2400" dirty="0">
+                <a:solidFill>
+                  <a:srgbClr val="A89984"/>
+                </a:solidFill>
+                <a:latin typeface="Menlo" panose="020B0609030804020204" pitchFamily="49" charset="0"/>
+              </a:rPr>
+              <a:t>:</a:t>
+            </a:r>
+            <a:r>
+              <a:rPr lang="en-AU" sz="2400" dirty="0">
+                <a:solidFill>
+                  <a:srgbClr val="EBDBB2"/>
+                </a:solidFill>
+                <a:latin typeface="Menlo" panose="020B0609030804020204" pitchFamily="49" charset="0"/>
+              </a:rPr>
+              <a:t> </a:t>
+            </a:r>
+            <a:r>
+              <a:rPr lang="en-AU" sz="2400" dirty="0" err="1">
+                <a:solidFill>
+                  <a:srgbClr val="B8BB26"/>
+                </a:solidFill>
+                <a:latin typeface="Menlo" panose="020B0609030804020204" pitchFamily="49" charset="0"/>
+              </a:rPr>
+              <a:t>rabbitmq</a:t>
+            </a:r>
+            <a:r>
+              <a:rPr lang="en-AU" sz="2400" dirty="0">
+                <a:solidFill>
+                  <a:srgbClr val="B8BB26"/>
+                </a:solidFill>
+                <a:latin typeface="Menlo" panose="020B0609030804020204" pitchFamily="49" charset="0"/>
+              </a:rPr>
+              <a:t>-consumer-trigger</a:t>
+            </a:r>
+            <a:endParaRPr lang="en-AU" sz="2400" dirty="0">
+              <a:solidFill>
+                <a:srgbClr val="EBDBB2"/>
+              </a:solidFill>
+              <a:latin typeface="Menlo" panose="020B0609030804020204" pitchFamily="49" charset="0"/>
+            </a:endParaRPr>
+          </a:p>
+          <a:p>
+            <a:r>
+              <a:rPr lang="en-AU" sz="2400" dirty="0">
+                <a:solidFill>
+                  <a:srgbClr val="B8BB26">
+                    <a:alpha val="42000"/>
+                  </a:srgbClr>
+                </a:solidFill>
+                <a:latin typeface="Menlo" panose="020B0609030804020204" pitchFamily="49" charset="0"/>
+              </a:rPr>
+              <a:t>namespace: default</a:t>
+            </a:r>
+          </a:p>
+          <a:p>
+            <a:r>
+              <a:rPr lang="en-AU" sz="2400" dirty="0">
+                <a:solidFill>
+                  <a:srgbClr val="8EC07C"/>
+                </a:solidFill>
+                <a:latin typeface="Menlo" panose="020B0609030804020204" pitchFamily="49" charset="0"/>
+              </a:rPr>
+              <a:t>spec</a:t>
+            </a:r>
+            <a:r>
+              <a:rPr lang="en-AU" sz="2400" dirty="0">
+                <a:solidFill>
+                  <a:srgbClr val="A89984"/>
+                </a:solidFill>
+                <a:latin typeface="Menlo" panose="020B0609030804020204" pitchFamily="49" charset="0"/>
+              </a:rPr>
+              <a:t>:</a:t>
+            </a:r>
+            <a:endParaRPr lang="en-AU" sz="2400" dirty="0">
+              <a:solidFill>
+                <a:srgbClr val="EBDBB2"/>
+              </a:solidFill>
+              <a:latin typeface="Menlo" panose="020B0609030804020204" pitchFamily="49" charset="0"/>
+            </a:endParaRPr>
+          </a:p>
+          <a:p>
+            <a:r>
+              <a:rPr lang="en-AU" sz="2400" dirty="0" err="1">
+                <a:solidFill>
+                  <a:srgbClr val="8EC07C"/>
+                </a:solidFill>
+                <a:latin typeface="Menlo" panose="020B0609030804020204" pitchFamily="49" charset="0"/>
+              </a:rPr>
+              <a:t>secretTargetRef</a:t>
+            </a:r>
+            <a:r>
+              <a:rPr lang="en-AU" sz="2400" dirty="0">
+                <a:solidFill>
+                  <a:srgbClr val="A89984"/>
+                </a:solidFill>
+                <a:latin typeface="Menlo" panose="020B0609030804020204" pitchFamily="49" charset="0"/>
+              </a:rPr>
+              <a:t>:</a:t>
+            </a:r>
+            <a:endParaRPr lang="en-AU" sz="2400" dirty="0">
+              <a:solidFill>
+                <a:srgbClr val="EBDBB2"/>
+              </a:solidFill>
+              <a:latin typeface="Menlo" panose="020B0609030804020204" pitchFamily="49" charset="0"/>
+            </a:endParaRPr>
+          </a:p>
+          <a:p>
+            <a:r>
+              <a:rPr lang="en-AU" sz="2400" dirty="0">
+                <a:solidFill>
+                  <a:srgbClr val="A89984"/>
+                </a:solidFill>
+                <a:latin typeface="Menlo" panose="020B0609030804020204" pitchFamily="49" charset="0"/>
+              </a:rPr>
+              <a:t>-</a:t>
+            </a:r>
+            <a:r>
+              <a:rPr lang="en-AU" sz="2400" dirty="0">
+                <a:solidFill>
+                  <a:srgbClr val="EBDBB2"/>
+                </a:solidFill>
+                <a:latin typeface="Menlo" panose="020B0609030804020204" pitchFamily="49" charset="0"/>
+              </a:rPr>
+              <a:t> </a:t>
+            </a:r>
+            <a:r>
+              <a:rPr lang="en-AU" sz="2400" dirty="0">
+                <a:solidFill>
+                  <a:srgbClr val="8EC07C"/>
+                </a:solidFill>
+                <a:latin typeface="Menlo" panose="020B0609030804020204" pitchFamily="49" charset="0"/>
+              </a:rPr>
+              <a:t>parameter</a:t>
+            </a:r>
+            <a:r>
+              <a:rPr lang="en-AU" sz="2400" dirty="0">
+                <a:solidFill>
+                  <a:srgbClr val="A89984"/>
+                </a:solidFill>
+                <a:latin typeface="Menlo" panose="020B0609030804020204" pitchFamily="49" charset="0"/>
+              </a:rPr>
+              <a:t>:</a:t>
+            </a:r>
+            <a:r>
+              <a:rPr lang="en-AU" sz="2400" dirty="0">
+                <a:solidFill>
+                  <a:srgbClr val="EBDBB2"/>
+                </a:solidFill>
+                <a:latin typeface="Menlo" panose="020B0609030804020204" pitchFamily="49" charset="0"/>
+              </a:rPr>
+              <a:t> </a:t>
+            </a:r>
+            <a:r>
+              <a:rPr lang="en-AU" sz="2400" dirty="0">
+                <a:solidFill>
+                  <a:srgbClr val="B8BB26"/>
+                </a:solidFill>
+                <a:latin typeface="Menlo" panose="020B0609030804020204" pitchFamily="49" charset="0"/>
+              </a:rPr>
+              <a:t>host</a:t>
+            </a:r>
+            <a:endParaRPr lang="en-AU" sz="2400" dirty="0">
+              <a:solidFill>
+                <a:srgbClr val="EBDBB2"/>
+              </a:solidFill>
+              <a:latin typeface="Menlo" panose="020B0609030804020204" pitchFamily="49" charset="0"/>
+            </a:endParaRPr>
+          </a:p>
+          <a:p>
+            <a:r>
+              <a:rPr lang="en-AU" sz="2400" dirty="0">
+                <a:solidFill>
+                  <a:srgbClr val="8EC07C"/>
+                </a:solidFill>
+                <a:latin typeface="Menlo" panose="020B0609030804020204" pitchFamily="49" charset="0"/>
+              </a:rPr>
+              <a:t>  name</a:t>
+            </a:r>
+            <a:r>
+              <a:rPr lang="en-AU" sz="2400" dirty="0">
+                <a:solidFill>
+                  <a:srgbClr val="A89984"/>
+                </a:solidFill>
+                <a:latin typeface="Menlo" panose="020B0609030804020204" pitchFamily="49" charset="0"/>
+              </a:rPr>
+              <a:t>:</a:t>
+            </a:r>
+            <a:r>
+              <a:rPr lang="en-AU" sz="2400" dirty="0">
+                <a:solidFill>
+                  <a:srgbClr val="EBDBB2"/>
+                </a:solidFill>
+                <a:latin typeface="Menlo" panose="020B0609030804020204" pitchFamily="49" charset="0"/>
+              </a:rPr>
+              <a:t> </a:t>
+            </a:r>
+            <a:r>
+              <a:rPr lang="en-AU" sz="2400" dirty="0" err="1">
+                <a:solidFill>
+                  <a:srgbClr val="B8BB26"/>
+                </a:solidFill>
+                <a:latin typeface="Menlo" panose="020B0609030804020204" pitchFamily="49" charset="0"/>
+              </a:rPr>
+              <a:t>rabbitmq</a:t>
+            </a:r>
+            <a:r>
+              <a:rPr lang="en-AU" sz="2400" dirty="0">
+                <a:solidFill>
+                  <a:srgbClr val="B8BB26"/>
+                </a:solidFill>
+                <a:latin typeface="Menlo" panose="020B0609030804020204" pitchFamily="49" charset="0"/>
+              </a:rPr>
+              <a:t>-consumer-secret</a:t>
+            </a:r>
+            <a:endParaRPr lang="en-AU" sz="2400" dirty="0">
+              <a:solidFill>
+                <a:srgbClr val="EBDBB2"/>
+              </a:solidFill>
+              <a:latin typeface="Menlo" panose="020B0609030804020204" pitchFamily="49" charset="0"/>
+            </a:endParaRPr>
+          </a:p>
+          <a:p>
+            <a:r>
+              <a:rPr lang="en-AU" sz="2400" dirty="0">
+                <a:solidFill>
+                  <a:srgbClr val="8EC07C"/>
+                </a:solidFill>
+                <a:latin typeface="Menlo" panose="020B0609030804020204" pitchFamily="49" charset="0"/>
+              </a:rPr>
+              <a:t>  key</a:t>
+            </a:r>
+            <a:r>
+              <a:rPr lang="en-AU" sz="2400" dirty="0">
+                <a:solidFill>
+                  <a:srgbClr val="A89984"/>
+                </a:solidFill>
+                <a:latin typeface="Menlo" panose="020B0609030804020204" pitchFamily="49" charset="0"/>
+              </a:rPr>
+              <a:t>:</a:t>
+            </a:r>
+            <a:r>
+              <a:rPr lang="en-AU" sz="2400" dirty="0">
+                <a:solidFill>
+                  <a:srgbClr val="EBDBB2"/>
+                </a:solidFill>
+                <a:latin typeface="Menlo" panose="020B0609030804020204" pitchFamily="49" charset="0"/>
+              </a:rPr>
+              <a:t> </a:t>
+            </a:r>
+            <a:r>
+              <a:rPr lang="en-AU" sz="2400" dirty="0" err="1">
+                <a:solidFill>
+                  <a:srgbClr val="B8BB26"/>
+                </a:solidFill>
+                <a:latin typeface="Menlo" panose="020B0609030804020204" pitchFamily="49" charset="0"/>
+              </a:rPr>
+              <a:t>RabbitMqHost</a:t>
+            </a:r>
+            <a:endParaRPr lang="en-AU" sz="2400" b="0" dirty="0">
+              <a:solidFill>
+                <a:srgbClr val="EBDBB2"/>
+              </a:solidFill>
+              <a:effectLst/>
+              <a:latin typeface="Menlo" panose="020B0609030804020204" pitchFamily="49" charset="0"/>
+            </a:endParaRPr>
+          </a:p>
+        </p:txBody>
+      </p:sp>
+    </p:spTree>
+    <p:extLst>
+      <p:ext uri="{BB962C8B-B14F-4D97-AF65-F5344CB8AC3E}">
+        <p14:creationId xmlns:p14="http://schemas.microsoft.com/office/powerpoint/2010/main" val="954341649"/>
+      </p:ext>
+    </p:extLst>
+  </p:cSld>
+  <p:clrMapOvr>
+    <a:masterClrMapping/>
+  </p:clrMapOvr>
+</p:sld>
+</file>
+
+<file path=ppt/slides/slide24.xml><?xml version="1.0" encoding="utf-8"?>
+<p:sld xmlns:a="http://schemas.openxmlformats.org/drawingml/2006/main" xmlns:r="http://schemas.openxmlformats.org/officeDocument/2006/relationships" xmlns:p="http://schemas.openxmlformats.org/presentationml/2006/main">
+  <p:cSld>
+    <p:spTree>
+      <p:nvGrpSpPr>
+        <p:cNvPr id="1" name=""/>
+        <p:cNvGrpSpPr/>
+        <p:nvPr/>
+      </p:nvGrpSpPr>
+      <p:grpSpPr>
+        <a:xfrm>
+          <a:off x="0" y="0"/>
+          <a:ext cx="0" cy="0"/>
+          <a:chOff x="0" y="0"/>
+          <a:chExt cx="0" cy="0"/>
+        </a:xfrm>
+      </p:grpSpPr>
+      <p:sp>
+        <p:nvSpPr>
+          <p:cNvPr id="2" name="Rectangle 1">
+            <a:extLst>
+              <a:ext uri="{FF2B5EF4-FFF2-40B4-BE49-F238E27FC236}">
+                <a16:creationId xmlns:a16="http://schemas.microsoft.com/office/drawing/2014/main" id="{00DF8EFD-5803-CE43-B2E1-6A6188BE4530}"/>
+              </a:ext>
+            </a:extLst>
+          </p:cNvPr>
+          <p:cNvSpPr/>
+          <p:nvPr/>
+        </p:nvSpPr>
+        <p:spPr>
+          <a:xfrm>
+            <a:off x="2932632" y="2090172"/>
+            <a:ext cx="6326736" cy="2677656"/>
+          </a:xfrm>
+          <a:prstGeom prst="rect">
+            <a:avLst/>
+          </a:prstGeom>
+        </p:spPr>
+        <p:txBody>
+          <a:bodyPr wrap="square">
+            <a:spAutoFit/>
+          </a:bodyPr>
+          <a:lstStyle/>
+          <a:p>
+            <a:r>
+              <a:rPr lang="en-US" sz="2400" dirty="0" err="1">
+                <a:solidFill>
+                  <a:srgbClr val="FC5DBA"/>
+                </a:solidFill>
+                <a:latin typeface="Courier" pitchFamily="2" charset="0"/>
+              </a:rPr>
+              <a:t>apiVersion</a:t>
+            </a:r>
+            <a:r>
+              <a:rPr lang="en-US" sz="2400" dirty="0">
+                <a:solidFill>
+                  <a:srgbClr val="F6F6EF"/>
+                </a:solidFill>
+                <a:latin typeface="Courier" pitchFamily="2" charset="0"/>
+              </a:rPr>
+              <a:t>: keda.k8s.io/v1alpha1</a:t>
+            </a:r>
+          </a:p>
+          <a:p>
+            <a:r>
+              <a:rPr lang="en-US" sz="2400" dirty="0">
+                <a:solidFill>
+                  <a:srgbClr val="FC5DBA"/>
+                </a:solidFill>
+                <a:latin typeface="Courier" pitchFamily="2" charset="0"/>
+              </a:rPr>
+              <a:t>kind</a:t>
+            </a:r>
+            <a:r>
+              <a:rPr lang="en-US" sz="2400" dirty="0">
+                <a:solidFill>
+                  <a:srgbClr val="F6F6EF"/>
+                </a:solidFill>
+                <a:latin typeface="Courier" pitchFamily="2" charset="0"/>
+              </a:rPr>
+              <a:t>: </a:t>
+            </a:r>
+            <a:r>
+              <a:rPr lang="en-US" sz="2400" dirty="0" err="1">
+                <a:solidFill>
+                  <a:srgbClr val="F6F6EF"/>
+                </a:solidFill>
+                <a:latin typeface="Courier" pitchFamily="2" charset="0"/>
+              </a:rPr>
+              <a:t>TriggerAuthentication</a:t>
+            </a:r>
+            <a:endParaRPr lang="en-US" sz="2400" dirty="0">
+              <a:solidFill>
+                <a:srgbClr val="F6F6EF"/>
+              </a:solidFill>
+              <a:latin typeface="Courier" pitchFamily="2" charset="0"/>
+            </a:endParaRPr>
+          </a:p>
+          <a:p>
+            <a:r>
+              <a:rPr lang="en-US" sz="2400" dirty="0">
+                <a:solidFill>
+                  <a:srgbClr val="FC5DBA"/>
+                </a:solidFill>
+                <a:latin typeface="Courier" pitchFamily="2" charset="0"/>
+              </a:rPr>
+              <a:t>metadata</a:t>
+            </a:r>
+            <a:r>
+              <a:rPr lang="en-US" sz="2400" dirty="0">
+                <a:solidFill>
+                  <a:srgbClr val="F6F6EF"/>
+                </a:solidFill>
+                <a:latin typeface="Courier" pitchFamily="2" charset="0"/>
+              </a:rPr>
+              <a:t>:  </a:t>
+            </a:r>
+          </a:p>
+          <a:p>
+            <a:r>
+              <a:rPr lang="en-US" sz="2400" dirty="0">
+                <a:solidFill>
+                  <a:srgbClr val="F6F6EF"/>
+                </a:solidFill>
+                <a:latin typeface="Courier" pitchFamily="2" charset="0"/>
+              </a:rPr>
+              <a:t>	</a:t>
+            </a:r>
+            <a:r>
+              <a:rPr lang="en-US" sz="2400" dirty="0">
+                <a:solidFill>
+                  <a:srgbClr val="FC5DBA"/>
+                </a:solidFill>
+                <a:latin typeface="Courier" pitchFamily="2" charset="0"/>
+              </a:rPr>
+              <a:t>name</a:t>
+            </a:r>
+            <a:r>
+              <a:rPr lang="en-US" sz="2400" dirty="0">
+                <a:solidFill>
+                  <a:srgbClr val="F6F6EF"/>
+                </a:solidFill>
+                <a:latin typeface="Courier" pitchFamily="2" charset="0"/>
+              </a:rPr>
+              <a:t>: azure-</a:t>
+            </a:r>
+            <a:r>
+              <a:rPr lang="en-US" sz="2400" dirty="0" err="1">
+                <a:solidFill>
+                  <a:srgbClr val="F6F6EF"/>
+                </a:solidFill>
+                <a:latin typeface="Courier" pitchFamily="2" charset="0"/>
+              </a:rPr>
+              <a:t>servicebus</a:t>
+            </a:r>
+            <a:r>
+              <a:rPr lang="en-US" sz="2400" dirty="0">
+                <a:solidFill>
+                  <a:srgbClr val="F6F6EF"/>
+                </a:solidFill>
+                <a:latin typeface="Courier" pitchFamily="2" charset="0"/>
+              </a:rPr>
+              <a:t>-auth</a:t>
+            </a:r>
+          </a:p>
+          <a:p>
+            <a:r>
+              <a:rPr lang="en-US" sz="2400" dirty="0">
+                <a:solidFill>
+                  <a:srgbClr val="FC5DBA"/>
+                </a:solidFill>
+                <a:latin typeface="Courier" pitchFamily="2" charset="0"/>
+              </a:rPr>
+              <a:t>spec</a:t>
+            </a:r>
+            <a:r>
+              <a:rPr lang="en-US" sz="2400" dirty="0">
+                <a:solidFill>
+                  <a:srgbClr val="F6F6EF"/>
+                </a:solidFill>
+                <a:latin typeface="Courier" pitchFamily="2" charset="0"/>
+              </a:rPr>
+              <a:t>:  </a:t>
+            </a:r>
+          </a:p>
+          <a:p>
+            <a:r>
+              <a:rPr lang="en-US" sz="2400" dirty="0">
+                <a:solidFill>
+                  <a:srgbClr val="F6F6EF"/>
+                </a:solidFill>
+                <a:latin typeface="Courier" pitchFamily="2" charset="0"/>
+              </a:rPr>
+              <a:t>	</a:t>
+            </a:r>
+            <a:r>
+              <a:rPr lang="en-US" sz="2400" dirty="0" err="1">
+                <a:solidFill>
+                  <a:srgbClr val="FC5DBA"/>
+                </a:solidFill>
+                <a:latin typeface="Courier" pitchFamily="2" charset="0"/>
+              </a:rPr>
+              <a:t>podIdentity</a:t>
+            </a:r>
+            <a:r>
+              <a:rPr lang="en-US" sz="2400" dirty="0">
+                <a:solidFill>
+                  <a:srgbClr val="F6F6EF"/>
+                </a:solidFill>
+                <a:latin typeface="Courier" pitchFamily="2" charset="0"/>
+              </a:rPr>
+              <a:t>:    </a:t>
+            </a:r>
+          </a:p>
+          <a:p>
+            <a:r>
+              <a:rPr lang="en-US" sz="2400" dirty="0">
+                <a:solidFill>
+                  <a:srgbClr val="F6F6EF"/>
+                </a:solidFill>
+                <a:latin typeface="Courier" pitchFamily="2" charset="0"/>
+              </a:rPr>
+              <a:t>		</a:t>
+            </a:r>
+            <a:r>
+              <a:rPr lang="en-US" sz="2400" dirty="0">
+                <a:solidFill>
+                  <a:srgbClr val="FC5DBA"/>
+                </a:solidFill>
+                <a:latin typeface="Courier" pitchFamily="2" charset="0"/>
+              </a:rPr>
+              <a:t>provider</a:t>
+            </a:r>
+            <a:r>
+              <a:rPr lang="en-US" sz="2400" dirty="0">
+                <a:solidFill>
+                  <a:srgbClr val="F6F6EF"/>
+                </a:solidFill>
+                <a:latin typeface="Courier" pitchFamily="2" charset="0"/>
+              </a:rPr>
+              <a:t>: azure</a:t>
+            </a:r>
+            <a:endParaRPr lang="en-US" sz="2400" dirty="0"/>
+          </a:p>
+        </p:txBody>
+      </p:sp>
+    </p:spTree>
+    <p:extLst>
+      <p:ext uri="{BB962C8B-B14F-4D97-AF65-F5344CB8AC3E}">
+        <p14:creationId xmlns:p14="http://schemas.microsoft.com/office/powerpoint/2010/main" val="1117636686"/>
+      </p:ext>
+    </p:extLst>
+  </p:cSld>
+  <p:clrMapOvr>
+    <a:masterClrMapping/>
+  </p:clrMapOvr>
+</p:sld>
+</file>
+
+<file path=ppt/slides/slide25.xml><?xml version="1.0" encoding="utf-8"?>
 <p:sld xmlns:a="http://schemas.openxmlformats.org/drawingml/2006/main" xmlns:r="http://schemas.openxmlformats.org/officeDocument/2006/relationships" xmlns:p="http://schemas.openxmlformats.org/presentationml/2006/main">
   <p:cSld>
     <p:spTree>

</xml_diff>

<commit_message>
mockserver charts are NOT in a folder called helm
</commit_message>
<xml_diff>
--- a/preso.pptx
+++ b/preso.pptx
@@ -5,7 +5,7 @@
     <p:sldMasterId id="2147483660" r:id="rId1"/>
   </p:sldMasterIdLst>
   <p:notesMasterIdLst>
-    <p:notesMasterId r:id="rId29"/>
+    <p:notesMasterId r:id="rId33"/>
   </p:notesMasterIdLst>
   <p:sldIdLst>
     <p:sldId id="256" r:id="rId2"/>
@@ -34,7 +34,11 @@
     <p:sldId id="278" r:id="rId25"/>
     <p:sldId id="279" r:id="rId26"/>
     <p:sldId id="280" r:id="rId27"/>
-    <p:sldId id="272" r:id="rId28"/>
+    <p:sldId id="283" r:id="rId28"/>
+    <p:sldId id="286" r:id="rId29"/>
+    <p:sldId id="284" r:id="rId30"/>
+    <p:sldId id="285" r:id="rId31"/>
+    <p:sldId id="272" r:id="rId32"/>
   </p:sldIdLst>
   <p:sldSz cx="12192000" cy="6858000"/>
   <p:notesSz cx="6858000" cy="9144000"/>
@@ -134,6 +138,49 @@
     </a:lvl9pPr>
   </p:defaultTextStyle>
   <p:extLst>
+    <p:ext uri="{521415D9-36F7-43E2-AB2F-B90AF26B5E84}">
+      <p14:sectionLst xmlns:p14="http://schemas.microsoft.com/office/powerpoint/2010/main">
+        <p14:section name="Default Section" id="{597FB0A4-B227-C949-A8C5-CF4C334A0E4F}">
+          <p14:sldIdLst>
+            <p14:sldId id="256"/>
+            <p14:sldId id="267"/>
+            <p14:sldId id="268"/>
+            <p14:sldId id="270"/>
+            <p14:sldId id="257"/>
+            <p14:sldId id="262"/>
+            <p14:sldId id="263"/>
+            <p14:sldId id="258"/>
+            <p14:sldId id="264"/>
+            <p14:sldId id="259"/>
+            <p14:sldId id="261"/>
+            <p14:sldId id="269"/>
+            <p14:sldId id="282"/>
+            <p14:sldId id="260"/>
+            <p14:sldId id="271"/>
+            <p14:sldId id="275"/>
+            <p14:sldId id="273"/>
+            <p14:sldId id="265"/>
+            <p14:sldId id="266"/>
+            <p14:sldId id="274"/>
+            <p14:sldId id="276"/>
+            <p14:sldId id="277"/>
+            <p14:sldId id="281"/>
+            <p14:sldId id="278"/>
+            <p14:sldId id="279"/>
+            <p14:sldId id="280"/>
+            <p14:sldId id="283"/>
+            <p14:sldId id="286"/>
+            <p14:sldId id="284"/>
+            <p14:sldId id="285"/>
+          </p14:sldIdLst>
+        </p14:section>
+        <p14:section name="Untitled Section" id="{633B44FF-52FB-1B40-B524-34B258814AB6}">
+          <p14:sldIdLst>
+            <p14:sldId id="272"/>
+          </p14:sldIdLst>
+        </p14:section>
+      </p14:sectionLst>
+    </p:ext>
     <p:ext uri="{EFAFB233-063F-42B5-8137-9DF3F51BA10A}">
       <p15:sldGuideLst xmlns:p15="http://schemas.microsoft.com/office/powerpoint/2012/main"/>
     </p:ext>
@@ -934,6 +981,109 @@
     <p:extLst>
       <p:ext uri="{BB962C8B-B14F-4D97-AF65-F5344CB8AC3E}">
         <p14:creationId xmlns:p14="http://schemas.microsoft.com/office/powerpoint/2010/main" val="2855974713"/>
+      </p:ext>
+    </p:extLst>
+  </p:cSld>
+  <p:clrMapOvr>
+    <a:masterClrMapping/>
+  </p:clrMapOvr>
+</p:notes>
+</file>
+
+<file path=ppt/notesSlides/notesSlide6.xml><?xml version="1.0" encoding="utf-8"?>
+<p:notes xmlns:a="http://schemas.openxmlformats.org/drawingml/2006/main" xmlns:r="http://schemas.openxmlformats.org/officeDocument/2006/relationships" xmlns:p="http://schemas.openxmlformats.org/presentationml/2006/main">
+  <p:cSld>
+    <p:spTree>
+      <p:nvGrpSpPr>
+        <p:cNvPr id="1" name=""/>
+        <p:cNvGrpSpPr/>
+        <p:nvPr/>
+      </p:nvGrpSpPr>
+      <p:grpSpPr>
+        <a:xfrm>
+          <a:off x="0" y="0"/>
+          <a:ext cx="0" cy="0"/>
+          <a:chOff x="0" y="0"/>
+          <a:chExt cx="0" cy="0"/>
+        </a:xfrm>
+      </p:grpSpPr>
+      <p:sp>
+        <p:nvSpPr>
+          <p:cNvPr id="2" name="Slide Image Placeholder 1"/>
+          <p:cNvSpPr>
+            <a:spLocks noGrp="1" noRot="1" noChangeAspect="1"/>
+          </p:cNvSpPr>
+          <p:nvPr>
+            <p:ph type="sldImg"/>
+          </p:nvPr>
+        </p:nvSpPr>
+        <p:spPr/>
+      </p:sp>
+      <p:sp>
+        <p:nvSpPr>
+          <p:cNvPr id="3" name="Notes Placeholder 2"/>
+          <p:cNvSpPr>
+            <a:spLocks noGrp="1"/>
+          </p:cNvSpPr>
+          <p:nvPr>
+            <p:ph type="body" idx="1"/>
+          </p:nvPr>
+        </p:nvSpPr>
+        <p:spPr/>
+        <p:txBody>
+          <a:bodyPr/>
+          <a:lstStyle/>
+          <a:p>
+            <a:r>
+              <a:rPr lang="en-US" dirty="0"/>
+              <a:t>https://</a:t>
+            </a:r>
+            <a:r>
+              <a:rPr lang="en-US" dirty="0" err="1"/>
+              <a:t>kubernetes.io</a:t>
+            </a:r>
+            <a:r>
+              <a:rPr lang="en-US" dirty="0"/>
+              <a:t>/docs/tasks/run-application/horizontal-pod-</a:t>
+            </a:r>
+            <a:r>
+              <a:rPr lang="en-US" dirty="0" err="1"/>
+              <a:t>autoscale</a:t>
+            </a:r>
+            <a:r>
+              <a:rPr lang="en-US" dirty="0"/>
+              <a:t>/#support-for-configurable-scaling-behavior</a:t>
+            </a:r>
+          </a:p>
+        </p:txBody>
+      </p:sp>
+      <p:sp>
+        <p:nvSpPr>
+          <p:cNvPr id="4" name="Slide Number Placeholder 3"/>
+          <p:cNvSpPr>
+            <a:spLocks noGrp="1"/>
+          </p:cNvSpPr>
+          <p:nvPr>
+            <p:ph type="sldNum" sz="quarter" idx="5"/>
+          </p:nvPr>
+        </p:nvSpPr>
+        <p:spPr/>
+        <p:txBody>
+          <a:bodyPr/>
+          <a:lstStyle/>
+          <a:p>
+            <a:fld id="{B786E5CD-0DE5-2548-BADF-C53099846BB2}" type="slidenum">
+              <a:rPr lang="en-US" smtClean="0"/>
+              <a:t>29</a:t>
+            </a:fld>
+            <a:endParaRPr lang="en-US"/>
+          </a:p>
+        </p:txBody>
+      </p:sp>
+    </p:spTree>
+    <p:extLst>
+      <p:ext uri="{BB962C8B-B14F-4D97-AF65-F5344CB8AC3E}">
+        <p14:creationId xmlns:p14="http://schemas.microsoft.com/office/powerpoint/2010/main" val="3863880312"/>
       </p:ext>
     </p:extLst>
   </p:cSld>
@@ -12054,7 +12204,90 @@
           <p:cNvPr id="2" name="Title 1">
             <a:extLst>
               <a:ext uri="{FF2B5EF4-FFF2-40B4-BE49-F238E27FC236}">
-                <a16:creationId xmlns:a16="http://schemas.microsoft.com/office/drawing/2014/main" id="{2D1D3786-4DD3-7C48-9A94-B341A7FFFB85}"/>
+                <a16:creationId xmlns:a16="http://schemas.microsoft.com/office/drawing/2014/main" id="{ED4AA061-E079-7445-BE17-1CA2E5E615C2}"/>
+              </a:ext>
+            </a:extLst>
+          </p:cNvPr>
+          <p:cNvSpPr>
+            <a:spLocks noGrp="1"/>
+          </p:cNvSpPr>
+          <p:nvPr>
+            <p:ph type="ctrTitle"/>
+          </p:nvPr>
+        </p:nvSpPr>
+        <p:spPr/>
+        <p:txBody>
+          <a:bodyPr/>
+          <a:lstStyle/>
+          <a:p>
+            <a:r>
+              <a:rPr lang="en-US" dirty="0"/>
+              <a:t>Changes in 2.0</a:t>
+            </a:r>
+          </a:p>
+        </p:txBody>
+      </p:sp>
+      <p:sp>
+        <p:nvSpPr>
+          <p:cNvPr id="3" name="Subtitle 2">
+            <a:extLst>
+              <a:ext uri="{FF2B5EF4-FFF2-40B4-BE49-F238E27FC236}">
+                <a16:creationId xmlns:a16="http://schemas.microsoft.com/office/drawing/2014/main" id="{75490EA6-F67A-AD40-99A7-8A49B1664175}"/>
+              </a:ext>
+            </a:extLst>
+          </p:cNvPr>
+          <p:cNvSpPr>
+            <a:spLocks noGrp="1"/>
+          </p:cNvSpPr>
+          <p:nvPr>
+            <p:ph type="subTitle" idx="1"/>
+          </p:nvPr>
+        </p:nvSpPr>
+        <p:spPr/>
+        <p:txBody>
+          <a:bodyPr/>
+          <a:lstStyle/>
+          <a:p>
+            <a:endParaRPr lang="en-US"/>
+          </a:p>
+        </p:txBody>
+      </p:sp>
+    </p:spTree>
+    <p:extLst>
+      <p:ext uri="{BB962C8B-B14F-4D97-AF65-F5344CB8AC3E}">
+        <p14:creationId xmlns:p14="http://schemas.microsoft.com/office/powerpoint/2010/main" val="485600423"/>
+      </p:ext>
+    </p:extLst>
+  </p:cSld>
+  <p:clrMapOvr>
+    <a:masterClrMapping/>
+  </p:clrMapOvr>
+</p:sld>
+</file>
+
+<file path=ppt/slides/slide28.xml><?xml version="1.0" encoding="utf-8"?>
+<p:sld xmlns:a="http://schemas.openxmlformats.org/drawingml/2006/main" xmlns:r="http://schemas.openxmlformats.org/officeDocument/2006/relationships" xmlns:p="http://schemas.openxmlformats.org/presentationml/2006/main">
+  <p:cSld>
+    <p:spTree>
+      <p:nvGrpSpPr>
+        <p:cNvPr id="1" name=""/>
+        <p:cNvGrpSpPr/>
+        <p:nvPr/>
+      </p:nvGrpSpPr>
+      <p:grpSpPr>
+        <a:xfrm>
+          <a:off x="0" y="0"/>
+          <a:ext cx="0" cy="0"/>
+          <a:chOff x="0" y="0"/>
+          <a:chExt cx="0" cy="0"/>
+        </a:xfrm>
+      </p:grpSpPr>
+      <p:sp>
+        <p:nvSpPr>
+          <p:cNvPr id="2" name="Title 1">
+            <a:extLst>
+              <a:ext uri="{FF2B5EF4-FFF2-40B4-BE49-F238E27FC236}">
+                <a16:creationId xmlns:a16="http://schemas.microsoft.com/office/drawing/2014/main" id="{704FBABF-67D8-AB45-8220-0327929CD936}"/>
               </a:ext>
             </a:extLst>
           </p:cNvPr>
@@ -12072,17 +12305,25 @@
           <a:p>
             <a:r>
               <a:rPr lang="en-US" dirty="0"/>
-              <a:t>References</a:t>
-            </a:r>
-          </a:p>
-        </p:txBody>
-      </p:sp>
-      <p:sp>
-        <p:nvSpPr>
-          <p:cNvPr id="3" name="Content Placeholder 2">
+              <a:t>Renaming of </a:t>
+            </a:r>
+            <a:r>
+              <a:rPr lang="en-US" dirty="0" err="1"/>
+              <a:t>ScaledObject</a:t>
+            </a:r>
+            <a:r>
+              <a:rPr lang="en-US" dirty="0"/>
+              <a:t> Properties</a:t>
+            </a:r>
+          </a:p>
+        </p:txBody>
+      </p:sp>
+      <p:sp>
+        <p:nvSpPr>
+          <p:cNvPr id="5" name="Content Placeholder 4">
             <a:extLst>
               <a:ext uri="{FF2B5EF4-FFF2-40B4-BE49-F238E27FC236}">
-                <a16:creationId xmlns:a16="http://schemas.microsoft.com/office/drawing/2014/main" id="{E21FA19F-419A-7841-863D-9CE064E37FF2}"/>
+                <a16:creationId xmlns:a16="http://schemas.microsoft.com/office/drawing/2014/main" id="{BC4536DB-8A29-704A-AF89-A4C5E7BC6086}"/>
               </a:ext>
             </a:extLst>
           </p:cNvPr>
@@ -12095,87 +12336,894 @@
         </p:nvSpPr>
         <p:spPr/>
         <p:txBody>
-          <a:bodyPr/>
+          <a:bodyPr>
+            <a:normAutofit/>
+          </a:bodyPr>
           <a:lstStyle/>
           <a:p>
             <a:r>
-              <a:rPr lang="en-US" dirty="0">
-                <a:hlinkClick r:id="rId2"/>
-              </a:rPr>
-              <a:t>Horizontal  Pod Autoscaler</a:t>
-            </a:r>
-            <a:endParaRPr lang="en-US" dirty="0"/>
-          </a:p>
-          <a:p>
-            <a:r>
-              <a:rPr lang="en-US" dirty="0">
-                <a:hlinkClick r:id="rId3"/>
-              </a:rPr>
-              <a:t>Horizontal Pod Autoscaler Walkthrough</a:t>
-            </a:r>
-            <a:endParaRPr lang="en-US" dirty="0"/>
-          </a:p>
-          <a:p>
-            <a:r>
-              <a:rPr lang="en-US" dirty="0">
-                <a:hlinkClick r:id="rId4"/>
-              </a:rPr>
-              <a:t>https://keda.sh/</a:t>
-            </a:r>
-            <a:endParaRPr lang="en-US" dirty="0"/>
-          </a:p>
-          <a:p>
-            <a:r>
-              <a:rPr lang="en-US" dirty="0">
-                <a:hlinkClick r:id="rId5"/>
-              </a:rPr>
-              <a:t>KEDA on GitHub</a:t>
-            </a:r>
-            <a:endParaRPr lang="en-US" dirty="0"/>
-          </a:p>
-          <a:p>
-            <a:r>
-              <a:rPr lang="en-US" dirty="0">
-                <a:hlinkClick r:id="rId6"/>
-              </a:rPr>
-              <a:t>KEDA Samples</a:t>
-            </a:r>
-            <a:endParaRPr lang="en-US" dirty="0"/>
-          </a:p>
-          <a:p>
-            <a:r>
-              <a:rPr lang="en-US" dirty="0">
-                <a:hlinkClick r:id="rId7"/>
-              </a:rPr>
-              <a:t>Https://emadashi.com</a:t>
-            </a:r>
-            <a:r>
-              <a:rPr lang="en-US" dirty="0"/>
-              <a:t> </a:t>
-            </a:r>
-            <a:r>
-              <a:rPr lang="en-US" dirty="0">
-                <a:sym typeface="Wingdings" pitchFamily="2" charset="2"/>
-              </a:rPr>
-              <a:t></a:t>
-            </a:r>
-            <a:endParaRPr lang="en-US" dirty="0"/>
-          </a:p>
-          <a:p>
-            <a:r>
-              <a:rPr lang="en-US" dirty="0">
-                <a:hlinkClick r:id="rId8"/>
-              </a:rPr>
-              <a:t>Mock-server</a:t>
-            </a:r>
-            <a:endParaRPr lang="en-US" dirty="0"/>
+              <a:rPr lang="en-AU" sz="2400" dirty="0" err="1">
+                <a:solidFill>
+                  <a:schemeClr val="accent2"/>
+                </a:solidFill>
+              </a:rPr>
+              <a:t>apiVersion</a:t>
+            </a:r>
+            <a:r>
+              <a:rPr lang="en-AU" sz="2400" dirty="0"/>
+              <a:t> property from </a:t>
+            </a:r>
+            <a:r>
+              <a:rPr lang="en-AU" sz="2400" dirty="0">
+                <a:solidFill>
+                  <a:schemeClr val="accent6"/>
+                </a:solidFill>
+              </a:rPr>
+              <a:t>keda.k8s.io/v1alpha1</a:t>
+            </a:r>
+            <a:r>
+              <a:rPr lang="en-AU" sz="2400" dirty="0"/>
+              <a:t> to </a:t>
+            </a:r>
+            <a:r>
+              <a:rPr lang="en-AU" sz="2400" dirty="0" err="1">
+                <a:solidFill>
+                  <a:schemeClr val="accent6"/>
+                </a:solidFill>
+              </a:rPr>
+              <a:t>keda.sh</a:t>
+            </a:r>
+            <a:r>
+              <a:rPr lang="en-AU" sz="2400" dirty="0">
+                <a:solidFill>
+                  <a:schemeClr val="accent6"/>
+                </a:solidFill>
+              </a:rPr>
+              <a:t>/v1alpha1</a:t>
+            </a:r>
+          </a:p>
+          <a:p>
+            <a:r>
+              <a:rPr lang="en-AU" sz="2400" dirty="0"/>
+              <a:t>Rename property </a:t>
+            </a:r>
+            <a:r>
+              <a:rPr lang="en-AU" sz="2400" dirty="0" err="1">
+                <a:solidFill>
+                  <a:schemeClr val="accent6"/>
+                </a:solidFill>
+              </a:rPr>
+              <a:t>spec.scaleTargetRef.deploymentName</a:t>
+            </a:r>
+            <a:r>
+              <a:rPr lang="en-AU" sz="2400" dirty="0"/>
+              <a:t> to </a:t>
+            </a:r>
+            <a:r>
+              <a:rPr lang="en-AU" sz="2400" dirty="0" err="1">
+                <a:solidFill>
+                  <a:schemeClr val="accent6"/>
+                </a:solidFill>
+              </a:rPr>
+              <a:t>spec.scaleTargetRef.name</a:t>
+            </a:r>
+            <a:endParaRPr lang="en-AU" sz="2400" dirty="0">
+              <a:solidFill>
+                <a:schemeClr val="accent6"/>
+              </a:solidFill>
+            </a:endParaRPr>
+          </a:p>
+          <a:p>
+            <a:r>
+              <a:rPr lang="en-AU" sz="2400" dirty="0"/>
+              <a:t>Rename property </a:t>
+            </a:r>
+            <a:r>
+              <a:rPr lang="en-AU" sz="2400" dirty="0" err="1">
+                <a:solidFill>
+                  <a:schemeClr val="accent6"/>
+                </a:solidFill>
+              </a:rPr>
+              <a:t>spec.scaleTargetRef.containerName</a:t>
+            </a:r>
+            <a:r>
+              <a:rPr lang="en-AU" sz="2400" dirty="0"/>
+              <a:t> to </a:t>
+            </a:r>
+            <a:r>
+              <a:rPr lang="en-AU" sz="2400" dirty="0" err="1">
+                <a:solidFill>
+                  <a:schemeClr val="accent6"/>
+                </a:solidFill>
+              </a:rPr>
+              <a:t>spec.scaleTargetRef.envSourceContainerName</a:t>
+            </a:r>
+            <a:endParaRPr lang="en-US" sz="2400" dirty="0">
+              <a:solidFill>
+                <a:schemeClr val="accent6"/>
+              </a:solidFill>
+            </a:endParaRPr>
           </a:p>
         </p:txBody>
       </p:sp>
     </p:spTree>
     <p:extLst>
       <p:ext uri="{BB962C8B-B14F-4D97-AF65-F5344CB8AC3E}">
-        <p14:creationId xmlns:p14="http://schemas.microsoft.com/office/powerpoint/2010/main" val="2713068039"/>
+        <p14:creationId xmlns:p14="http://schemas.microsoft.com/office/powerpoint/2010/main" val="4170605026"/>
+      </p:ext>
+    </p:extLst>
+  </p:cSld>
+  <p:clrMapOvr>
+    <a:masterClrMapping/>
+  </p:clrMapOvr>
+</p:sld>
+</file>
+
+<file path=ppt/slides/slide29.xml><?xml version="1.0" encoding="utf-8"?>
+<p:sld xmlns:a="http://schemas.openxmlformats.org/drawingml/2006/main" xmlns:r="http://schemas.openxmlformats.org/officeDocument/2006/relationships" xmlns:p="http://schemas.openxmlformats.org/presentationml/2006/main">
+  <p:cSld>
+    <p:spTree>
+      <p:nvGrpSpPr>
+        <p:cNvPr id="1" name=""/>
+        <p:cNvGrpSpPr/>
+        <p:nvPr/>
+      </p:nvGrpSpPr>
+      <p:grpSpPr>
+        <a:xfrm>
+          <a:off x="0" y="0"/>
+          <a:ext cx="0" cy="0"/>
+          <a:chOff x="0" y="0"/>
+          <a:chExt cx="0" cy="0"/>
+        </a:xfrm>
+      </p:grpSpPr>
+      <p:sp>
+        <p:nvSpPr>
+          <p:cNvPr id="2" name="Title 1">
+            <a:extLst>
+              <a:ext uri="{FF2B5EF4-FFF2-40B4-BE49-F238E27FC236}">
+                <a16:creationId xmlns:a16="http://schemas.microsoft.com/office/drawing/2014/main" id="{406DC07D-25D6-584E-AF65-8960CD5C7DE2}"/>
+              </a:ext>
+            </a:extLst>
+          </p:cNvPr>
+          <p:cNvSpPr>
+            <a:spLocks noGrp="1"/>
+          </p:cNvSpPr>
+          <p:nvPr>
+            <p:ph type="title"/>
+          </p:nvPr>
+        </p:nvSpPr>
+        <p:spPr/>
+        <p:txBody>
+          <a:bodyPr/>
+          <a:lstStyle/>
+          <a:p>
+            <a:r>
+              <a:rPr lang="en-US" dirty="0"/>
+              <a:t>HPA Scaling </a:t>
+            </a:r>
+            <a:r>
+              <a:rPr lang="en-US" dirty="0" err="1"/>
+              <a:t>Behaviour</a:t>
+            </a:r>
+            <a:endParaRPr lang="en-US" dirty="0"/>
+          </a:p>
+        </p:txBody>
+      </p:sp>
+      <p:sp>
+        <p:nvSpPr>
+          <p:cNvPr id="6" name="Rectangle 5">
+            <a:extLst>
+              <a:ext uri="{FF2B5EF4-FFF2-40B4-BE49-F238E27FC236}">
+                <a16:creationId xmlns:a16="http://schemas.microsoft.com/office/drawing/2014/main" id="{857C0700-F5AD-554A-BEFA-84275462E591}"/>
+              </a:ext>
+            </a:extLst>
+          </p:cNvPr>
+          <p:cNvSpPr/>
+          <p:nvPr/>
+        </p:nvSpPr>
+        <p:spPr>
+          <a:xfrm>
+            <a:off x="3116367" y="1691561"/>
+            <a:ext cx="6096000" cy="4801314"/>
+          </a:xfrm>
+          <a:prstGeom prst="rect">
+            <a:avLst/>
+          </a:prstGeom>
+        </p:spPr>
+        <p:txBody>
+          <a:bodyPr>
+            <a:spAutoFit/>
+          </a:bodyPr>
+          <a:lstStyle/>
+          <a:p>
+            <a:r>
+              <a:rPr lang="en-AU" b="1" dirty="0" err="1">
+                <a:solidFill>
+                  <a:srgbClr val="AA22FF"/>
+                </a:solidFill>
+              </a:rPr>
+              <a:t>behavior</a:t>
+            </a:r>
+            <a:r>
+              <a:rPr lang="en-AU" dirty="0"/>
+              <a:t>:</a:t>
+            </a:r>
+            <a:r>
+              <a:rPr lang="en-AU" dirty="0">
+                <a:solidFill>
+                  <a:srgbClr val="BBBBBB"/>
+                </a:solidFill>
+              </a:rPr>
+              <a:t> </a:t>
+            </a:r>
+          </a:p>
+          <a:p>
+            <a:r>
+              <a:rPr lang="en-AU" b="1" dirty="0">
+                <a:solidFill>
+                  <a:srgbClr val="BBBBBB"/>
+                </a:solidFill>
+              </a:rPr>
+              <a:t>	</a:t>
+            </a:r>
+            <a:r>
+              <a:rPr lang="en-AU" b="1" dirty="0" err="1">
+                <a:solidFill>
+                  <a:srgbClr val="AA22FF"/>
+                </a:solidFill>
+              </a:rPr>
+              <a:t>scaleDown</a:t>
+            </a:r>
+            <a:r>
+              <a:rPr lang="en-AU" dirty="0"/>
+              <a:t>:</a:t>
+            </a:r>
+            <a:r>
+              <a:rPr lang="en-AU" dirty="0">
+                <a:solidFill>
+                  <a:srgbClr val="BBBBBB"/>
+                </a:solidFill>
+              </a:rPr>
+              <a:t> </a:t>
+            </a:r>
+          </a:p>
+          <a:p>
+            <a:r>
+              <a:rPr lang="en-AU" b="1" dirty="0">
+                <a:solidFill>
+                  <a:srgbClr val="BBBBBB"/>
+                </a:solidFill>
+              </a:rPr>
+              <a:t>		</a:t>
+            </a:r>
+            <a:r>
+              <a:rPr lang="en-AU" b="1" dirty="0" err="1">
+                <a:solidFill>
+                  <a:srgbClr val="AA22FF"/>
+                </a:solidFill>
+              </a:rPr>
+              <a:t>stabilizationWindowSeconds</a:t>
+            </a:r>
+            <a:r>
+              <a:rPr lang="en-AU" dirty="0"/>
+              <a:t>:</a:t>
+            </a:r>
+            <a:r>
+              <a:rPr lang="en-AU" dirty="0">
+                <a:solidFill>
+                  <a:srgbClr val="BBBBBB"/>
+                </a:solidFill>
+              </a:rPr>
+              <a:t> </a:t>
+            </a:r>
+            <a:r>
+              <a:rPr lang="en-AU" dirty="0">
+                <a:solidFill>
+                  <a:srgbClr val="666666"/>
+                </a:solidFill>
+              </a:rPr>
+              <a:t>300</a:t>
+            </a:r>
+            <a:r>
+              <a:rPr lang="en-AU" dirty="0">
+                <a:solidFill>
+                  <a:srgbClr val="BBBBBB"/>
+                </a:solidFill>
+              </a:rPr>
+              <a:t> </a:t>
+            </a:r>
+          </a:p>
+          <a:p>
+            <a:r>
+              <a:rPr lang="en-AU" b="1" dirty="0">
+                <a:solidFill>
+                  <a:srgbClr val="BBBBBB"/>
+                </a:solidFill>
+              </a:rPr>
+              <a:t>		</a:t>
+            </a:r>
+            <a:r>
+              <a:rPr lang="en-AU" b="1" dirty="0">
+                <a:solidFill>
+                  <a:srgbClr val="AA22FF"/>
+                </a:solidFill>
+              </a:rPr>
+              <a:t>policies</a:t>
+            </a:r>
+            <a:r>
+              <a:rPr lang="en-AU" dirty="0"/>
+              <a:t>:</a:t>
+            </a:r>
+            <a:r>
+              <a:rPr lang="en-AU" dirty="0">
+                <a:solidFill>
+                  <a:srgbClr val="BBBBBB"/>
+                </a:solidFill>
+              </a:rPr>
+              <a:t> </a:t>
+            </a:r>
+          </a:p>
+          <a:p>
+            <a:r>
+              <a:rPr lang="en-AU" dirty="0">
+                <a:solidFill>
+                  <a:srgbClr val="BBBBBB"/>
+                </a:solidFill>
+              </a:rPr>
+              <a:t>			</a:t>
+            </a:r>
+            <a:r>
+              <a:rPr lang="en-AU" dirty="0"/>
+              <a:t>- </a:t>
+            </a:r>
+            <a:r>
+              <a:rPr lang="en-AU" b="1" dirty="0">
+                <a:solidFill>
+                  <a:srgbClr val="AA22FF"/>
+                </a:solidFill>
+              </a:rPr>
+              <a:t>type</a:t>
+            </a:r>
+            <a:r>
+              <a:rPr lang="en-AU" dirty="0"/>
+              <a:t>:</a:t>
+            </a:r>
+            <a:r>
+              <a:rPr lang="en-AU" dirty="0">
+                <a:solidFill>
+                  <a:srgbClr val="BBBBBB"/>
+                </a:solidFill>
+              </a:rPr>
+              <a:t> </a:t>
+            </a:r>
+            <a:r>
+              <a:rPr lang="en-AU" dirty="0"/>
+              <a:t>Percent</a:t>
+            </a:r>
+            <a:r>
+              <a:rPr lang="en-AU" dirty="0">
+                <a:solidFill>
+                  <a:srgbClr val="BBBBBB"/>
+                </a:solidFill>
+              </a:rPr>
+              <a:t> </a:t>
+            </a:r>
+          </a:p>
+          <a:p>
+            <a:r>
+              <a:rPr lang="en-AU" b="1" dirty="0">
+                <a:solidFill>
+                  <a:srgbClr val="BBBBBB"/>
+                </a:solidFill>
+              </a:rPr>
+              <a:t>			  </a:t>
+            </a:r>
+            <a:r>
+              <a:rPr lang="en-AU" b="1" dirty="0">
+                <a:solidFill>
+                  <a:srgbClr val="AA22FF"/>
+                </a:solidFill>
+              </a:rPr>
+              <a:t>value</a:t>
+            </a:r>
+            <a:r>
+              <a:rPr lang="en-AU" dirty="0"/>
+              <a:t>:</a:t>
+            </a:r>
+            <a:r>
+              <a:rPr lang="en-AU" dirty="0">
+                <a:solidFill>
+                  <a:srgbClr val="BBBBBB"/>
+                </a:solidFill>
+              </a:rPr>
+              <a:t> </a:t>
+            </a:r>
+            <a:r>
+              <a:rPr lang="en-AU" dirty="0">
+                <a:solidFill>
+                  <a:srgbClr val="666666"/>
+                </a:solidFill>
+              </a:rPr>
+              <a:t>100</a:t>
+            </a:r>
+            <a:r>
+              <a:rPr lang="en-AU" dirty="0">
+                <a:solidFill>
+                  <a:srgbClr val="BBBBBB"/>
+                </a:solidFill>
+              </a:rPr>
+              <a:t> </a:t>
+            </a:r>
+          </a:p>
+          <a:p>
+            <a:r>
+              <a:rPr lang="en-AU" b="1" dirty="0">
+                <a:solidFill>
+                  <a:srgbClr val="BBBBBB"/>
+                </a:solidFill>
+              </a:rPr>
+              <a:t>			  </a:t>
+            </a:r>
+            <a:r>
+              <a:rPr lang="en-AU" b="1" dirty="0" err="1">
+                <a:solidFill>
+                  <a:srgbClr val="AA22FF"/>
+                </a:solidFill>
+              </a:rPr>
+              <a:t>periodSeconds</a:t>
+            </a:r>
+            <a:r>
+              <a:rPr lang="en-AU" dirty="0"/>
+              <a:t>:</a:t>
+            </a:r>
+            <a:r>
+              <a:rPr lang="en-AU" dirty="0">
+                <a:solidFill>
+                  <a:srgbClr val="BBBBBB"/>
+                </a:solidFill>
+              </a:rPr>
+              <a:t> </a:t>
+            </a:r>
+            <a:r>
+              <a:rPr lang="en-AU" dirty="0">
+                <a:solidFill>
+                  <a:srgbClr val="666666"/>
+                </a:solidFill>
+              </a:rPr>
+              <a:t>15</a:t>
+            </a:r>
+            <a:r>
+              <a:rPr lang="en-AU" dirty="0">
+                <a:solidFill>
+                  <a:srgbClr val="BBBBBB"/>
+                </a:solidFill>
+              </a:rPr>
+              <a:t> </a:t>
+            </a:r>
+          </a:p>
+          <a:p>
+            <a:r>
+              <a:rPr lang="en-AU" b="1" dirty="0">
+                <a:solidFill>
+                  <a:srgbClr val="BBBBBB"/>
+                </a:solidFill>
+              </a:rPr>
+              <a:t>	</a:t>
+            </a:r>
+            <a:r>
+              <a:rPr lang="en-AU" b="1" dirty="0" err="1">
+                <a:solidFill>
+                  <a:srgbClr val="AA22FF"/>
+                </a:solidFill>
+              </a:rPr>
+              <a:t>scaleUp</a:t>
+            </a:r>
+            <a:r>
+              <a:rPr lang="en-AU" dirty="0"/>
+              <a:t>:</a:t>
+            </a:r>
+            <a:r>
+              <a:rPr lang="en-AU" dirty="0">
+                <a:solidFill>
+                  <a:srgbClr val="BBBBBB"/>
+                </a:solidFill>
+              </a:rPr>
+              <a:t> </a:t>
+            </a:r>
+          </a:p>
+          <a:p>
+            <a:r>
+              <a:rPr lang="en-AU" b="1" dirty="0">
+                <a:solidFill>
+                  <a:srgbClr val="BBBBBB"/>
+                </a:solidFill>
+              </a:rPr>
+              <a:t>		</a:t>
+            </a:r>
+            <a:r>
+              <a:rPr lang="en-AU" b="1" dirty="0" err="1">
+                <a:solidFill>
+                  <a:srgbClr val="AA22FF"/>
+                </a:solidFill>
+              </a:rPr>
+              <a:t>stabilizationWindowSeconds</a:t>
+            </a:r>
+            <a:r>
+              <a:rPr lang="en-AU" dirty="0"/>
+              <a:t>:</a:t>
+            </a:r>
+            <a:r>
+              <a:rPr lang="en-AU" dirty="0">
+                <a:solidFill>
+                  <a:srgbClr val="BBBBBB"/>
+                </a:solidFill>
+              </a:rPr>
+              <a:t> </a:t>
+            </a:r>
+            <a:r>
+              <a:rPr lang="en-AU" dirty="0">
+                <a:solidFill>
+                  <a:srgbClr val="666666"/>
+                </a:solidFill>
+              </a:rPr>
+              <a:t>0</a:t>
+            </a:r>
+            <a:r>
+              <a:rPr lang="en-AU" dirty="0">
+                <a:solidFill>
+                  <a:srgbClr val="BBBBBB"/>
+                </a:solidFill>
+              </a:rPr>
+              <a:t> </a:t>
+            </a:r>
+          </a:p>
+          <a:p>
+            <a:r>
+              <a:rPr lang="en-AU" b="1" dirty="0">
+                <a:solidFill>
+                  <a:srgbClr val="BBBBBB"/>
+                </a:solidFill>
+              </a:rPr>
+              <a:t>		</a:t>
+            </a:r>
+            <a:r>
+              <a:rPr lang="en-AU" b="1" dirty="0">
+                <a:solidFill>
+                  <a:srgbClr val="AA22FF"/>
+                </a:solidFill>
+              </a:rPr>
+              <a:t>policies</a:t>
+            </a:r>
+            <a:r>
+              <a:rPr lang="en-AU" dirty="0"/>
+              <a:t>:</a:t>
+            </a:r>
+            <a:r>
+              <a:rPr lang="en-AU" dirty="0">
+                <a:solidFill>
+                  <a:srgbClr val="BBBBBB"/>
+                </a:solidFill>
+              </a:rPr>
+              <a:t> </a:t>
+            </a:r>
+          </a:p>
+          <a:p>
+            <a:r>
+              <a:rPr lang="en-AU" dirty="0">
+                <a:solidFill>
+                  <a:srgbClr val="BBBBBB"/>
+                </a:solidFill>
+              </a:rPr>
+              <a:t>			</a:t>
+            </a:r>
+            <a:r>
+              <a:rPr lang="en-AU" dirty="0"/>
+              <a:t>- </a:t>
+            </a:r>
+            <a:r>
+              <a:rPr lang="en-AU" b="1" dirty="0">
+                <a:solidFill>
+                  <a:srgbClr val="AA22FF"/>
+                </a:solidFill>
+              </a:rPr>
+              <a:t>type</a:t>
+            </a:r>
+            <a:r>
+              <a:rPr lang="en-AU" dirty="0"/>
+              <a:t>:</a:t>
+            </a:r>
+            <a:r>
+              <a:rPr lang="en-AU" dirty="0">
+                <a:solidFill>
+                  <a:srgbClr val="BBBBBB"/>
+                </a:solidFill>
+              </a:rPr>
+              <a:t> </a:t>
+            </a:r>
+            <a:r>
+              <a:rPr lang="en-AU" dirty="0"/>
+              <a:t>Percent</a:t>
+            </a:r>
+            <a:r>
+              <a:rPr lang="en-AU" dirty="0">
+                <a:solidFill>
+                  <a:srgbClr val="BBBBBB"/>
+                </a:solidFill>
+              </a:rPr>
+              <a:t> </a:t>
+            </a:r>
+          </a:p>
+          <a:p>
+            <a:r>
+              <a:rPr lang="en-AU" b="1" dirty="0">
+                <a:solidFill>
+                  <a:srgbClr val="BBBBBB"/>
+                </a:solidFill>
+              </a:rPr>
+              <a:t>			  </a:t>
+            </a:r>
+            <a:r>
+              <a:rPr lang="en-AU" b="1" dirty="0">
+                <a:solidFill>
+                  <a:srgbClr val="AA22FF"/>
+                </a:solidFill>
+              </a:rPr>
+              <a:t>value</a:t>
+            </a:r>
+            <a:r>
+              <a:rPr lang="en-AU" dirty="0"/>
+              <a:t>:</a:t>
+            </a:r>
+            <a:r>
+              <a:rPr lang="en-AU" dirty="0">
+                <a:solidFill>
+                  <a:srgbClr val="BBBBBB"/>
+                </a:solidFill>
+              </a:rPr>
+              <a:t> </a:t>
+            </a:r>
+            <a:r>
+              <a:rPr lang="en-AU" dirty="0">
+                <a:solidFill>
+                  <a:srgbClr val="666666"/>
+                </a:solidFill>
+              </a:rPr>
+              <a:t>100</a:t>
+            </a:r>
+            <a:r>
+              <a:rPr lang="en-AU" dirty="0">
+                <a:solidFill>
+                  <a:srgbClr val="BBBBBB"/>
+                </a:solidFill>
+              </a:rPr>
+              <a:t> </a:t>
+            </a:r>
+          </a:p>
+          <a:p>
+            <a:r>
+              <a:rPr lang="en-AU" b="1" dirty="0">
+                <a:solidFill>
+                  <a:srgbClr val="BBBBBB"/>
+                </a:solidFill>
+              </a:rPr>
+              <a:t>			  </a:t>
+            </a:r>
+            <a:r>
+              <a:rPr lang="en-AU" b="1" dirty="0" err="1">
+                <a:solidFill>
+                  <a:srgbClr val="AA22FF"/>
+                </a:solidFill>
+              </a:rPr>
+              <a:t>periodSeconds</a:t>
+            </a:r>
+            <a:r>
+              <a:rPr lang="en-AU" dirty="0"/>
+              <a:t>:</a:t>
+            </a:r>
+            <a:r>
+              <a:rPr lang="en-AU" dirty="0">
+                <a:solidFill>
+                  <a:srgbClr val="BBBBBB"/>
+                </a:solidFill>
+              </a:rPr>
+              <a:t> </a:t>
+            </a:r>
+            <a:r>
+              <a:rPr lang="en-AU" dirty="0">
+                <a:solidFill>
+                  <a:srgbClr val="666666"/>
+                </a:solidFill>
+              </a:rPr>
+              <a:t>15</a:t>
+            </a:r>
+            <a:r>
+              <a:rPr lang="en-AU" dirty="0">
+                <a:solidFill>
+                  <a:srgbClr val="BBBBBB"/>
+                </a:solidFill>
+              </a:rPr>
+              <a:t> </a:t>
+            </a:r>
+          </a:p>
+          <a:p>
+            <a:r>
+              <a:rPr lang="en-AU" dirty="0">
+                <a:solidFill>
+                  <a:srgbClr val="BBBBBB"/>
+                </a:solidFill>
+              </a:rPr>
+              <a:t>			</a:t>
+            </a:r>
+            <a:r>
+              <a:rPr lang="en-AU" dirty="0"/>
+              <a:t>- </a:t>
+            </a:r>
+            <a:r>
+              <a:rPr lang="en-AU" b="1" dirty="0">
+                <a:solidFill>
+                  <a:srgbClr val="AA22FF"/>
+                </a:solidFill>
+              </a:rPr>
+              <a:t>type</a:t>
+            </a:r>
+            <a:r>
+              <a:rPr lang="en-AU" dirty="0"/>
+              <a:t>:</a:t>
+            </a:r>
+            <a:r>
+              <a:rPr lang="en-AU" dirty="0">
+                <a:solidFill>
+                  <a:srgbClr val="BBBBBB"/>
+                </a:solidFill>
+              </a:rPr>
+              <a:t> </a:t>
+            </a:r>
+            <a:r>
+              <a:rPr lang="en-AU" dirty="0"/>
+              <a:t>Pods</a:t>
+            </a:r>
+            <a:r>
+              <a:rPr lang="en-AU" dirty="0">
+                <a:solidFill>
+                  <a:srgbClr val="BBBBBB"/>
+                </a:solidFill>
+              </a:rPr>
+              <a:t> </a:t>
+            </a:r>
+          </a:p>
+          <a:p>
+            <a:r>
+              <a:rPr lang="en-AU" b="1" dirty="0">
+                <a:solidFill>
+                  <a:srgbClr val="BBBBBB"/>
+                </a:solidFill>
+              </a:rPr>
+              <a:t>			  </a:t>
+            </a:r>
+            <a:r>
+              <a:rPr lang="en-AU" b="1" dirty="0">
+                <a:solidFill>
+                  <a:srgbClr val="AA22FF"/>
+                </a:solidFill>
+              </a:rPr>
+              <a:t>value</a:t>
+            </a:r>
+            <a:r>
+              <a:rPr lang="en-AU" dirty="0"/>
+              <a:t>:</a:t>
+            </a:r>
+            <a:r>
+              <a:rPr lang="en-AU" dirty="0">
+                <a:solidFill>
+                  <a:srgbClr val="BBBBBB"/>
+                </a:solidFill>
+              </a:rPr>
+              <a:t> </a:t>
+            </a:r>
+            <a:r>
+              <a:rPr lang="en-AU" dirty="0">
+                <a:solidFill>
+                  <a:srgbClr val="666666"/>
+                </a:solidFill>
+              </a:rPr>
+              <a:t>4</a:t>
+            </a:r>
+            <a:r>
+              <a:rPr lang="en-AU" dirty="0">
+                <a:solidFill>
+                  <a:srgbClr val="BBBBBB"/>
+                </a:solidFill>
+              </a:rPr>
+              <a:t> </a:t>
+            </a:r>
+          </a:p>
+          <a:p>
+            <a:r>
+              <a:rPr lang="en-AU" b="1" dirty="0">
+                <a:solidFill>
+                  <a:srgbClr val="BBBBBB"/>
+                </a:solidFill>
+              </a:rPr>
+              <a:t>			  </a:t>
+            </a:r>
+            <a:r>
+              <a:rPr lang="en-AU" b="1" dirty="0" err="1">
+                <a:solidFill>
+                  <a:srgbClr val="AA22FF"/>
+                </a:solidFill>
+              </a:rPr>
+              <a:t>periodSeconds</a:t>
+            </a:r>
+            <a:r>
+              <a:rPr lang="en-AU" dirty="0"/>
+              <a:t>:</a:t>
+            </a:r>
+            <a:r>
+              <a:rPr lang="en-AU" dirty="0">
+                <a:solidFill>
+                  <a:srgbClr val="BBBBBB"/>
+                </a:solidFill>
+              </a:rPr>
+              <a:t> </a:t>
+            </a:r>
+            <a:r>
+              <a:rPr lang="en-AU" dirty="0">
+                <a:solidFill>
+                  <a:srgbClr val="666666"/>
+                </a:solidFill>
+              </a:rPr>
+              <a:t>15</a:t>
+            </a:r>
+            <a:r>
+              <a:rPr lang="en-AU" dirty="0">
+                <a:solidFill>
+                  <a:srgbClr val="BBBBBB"/>
+                </a:solidFill>
+              </a:rPr>
+              <a:t> </a:t>
+            </a:r>
+          </a:p>
+          <a:p>
+            <a:r>
+              <a:rPr lang="en-AU" b="1" dirty="0">
+                <a:solidFill>
+                  <a:srgbClr val="BBBBBB"/>
+                </a:solidFill>
+              </a:rPr>
+              <a:t>			</a:t>
+            </a:r>
+            <a:r>
+              <a:rPr lang="en-AU" b="1" dirty="0" err="1">
+                <a:solidFill>
+                  <a:srgbClr val="AA22FF"/>
+                </a:solidFill>
+              </a:rPr>
+              <a:t>selectPolicy</a:t>
+            </a:r>
+            <a:r>
+              <a:rPr lang="en-AU" dirty="0"/>
+              <a:t>:</a:t>
+            </a:r>
+            <a:r>
+              <a:rPr lang="en-AU" dirty="0">
+                <a:solidFill>
+                  <a:srgbClr val="BBBBBB"/>
+                </a:solidFill>
+              </a:rPr>
+              <a:t> </a:t>
+            </a:r>
+            <a:r>
+              <a:rPr lang="en-AU" dirty="0"/>
+              <a:t>Max</a:t>
+            </a:r>
+            <a:endParaRPr lang="en-US" dirty="0"/>
+          </a:p>
+        </p:txBody>
+      </p:sp>
+    </p:spTree>
+    <p:extLst>
+      <p:ext uri="{BB962C8B-B14F-4D97-AF65-F5344CB8AC3E}">
+        <p14:creationId xmlns:p14="http://schemas.microsoft.com/office/powerpoint/2010/main" val="1420190481"/>
       </p:ext>
     </p:extLst>
   </p:cSld>
@@ -12449,6 +13497,242 @@
   </p:cSld>
   <p:clrMapOvr>
     <a:overrideClrMapping bg1="dk1" tx1="lt1" bg2="dk2" tx2="lt2" accent1="accent1" accent2="accent2" accent3="accent3" accent4="accent4" accent5="accent5" accent6="accent6" hlink="hlink" folHlink="folHlink"/>
+  </p:clrMapOvr>
+</p:sld>
+</file>
+
+<file path=ppt/slides/slide30.xml><?xml version="1.0" encoding="utf-8"?>
+<p:sld xmlns:a="http://schemas.openxmlformats.org/drawingml/2006/main" xmlns:r="http://schemas.openxmlformats.org/officeDocument/2006/relationships" xmlns:p="http://schemas.openxmlformats.org/presentationml/2006/main">
+  <p:cSld>
+    <p:spTree>
+      <p:nvGrpSpPr>
+        <p:cNvPr id="1" name=""/>
+        <p:cNvGrpSpPr/>
+        <p:nvPr/>
+      </p:nvGrpSpPr>
+      <p:grpSpPr>
+        <a:xfrm>
+          <a:off x="0" y="0"/>
+          <a:ext cx="0" cy="0"/>
+          <a:chOff x="0" y="0"/>
+          <a:chExt cx="0" cy="0"/>
+        </a:xfrm>
+      </p:grpSpPr>
+      <p:sp>
+        <p:nvSpPr>
+          <p:cNvPr id="2" name="Title 1">
+            <a:extLst>
+              <a:ext uri="{FF2B5EF4-FFF2-40B4-BE49-F238E27FC236}">
+                <a16:creationId xmlns:a16="http://schemas.microsoft.com/office/drawing/2014/main" id="{E59C5EC4-8F33-8447-AEBC-570DEE91594F}"/>
+              </a:ext>
+            </a:extLst>
+          </p:cNvPr>
+          <p:cNvSpPr>
+            <a:spLocks noGrp="1"/>
+          </p:cNvSpPr>
+          <p:nvPr>
+            <p:ph type="title"/>
+          </p:nvPr>
+        </p:nvSpPr>
+        <p:spPr/>
+        <p:txBody>
+          <a:bodyPr/>
+          <a:lstStyle/>
+          <a:p>
+            <a:r>
+              <a:rPr lang="en-US" dirty="0"/>
+              <a:t>External Push Scaler</a:t>
+            </a:r>
+          </a:p>
+        </p:txBody>
+      </p:sp>
+      <p:sp>
+        <p:nvSpPr>
+          <p:cNvPr id="3" name="Content Placeholder 2">
+            <a:extLst>
+              <a:ext uri="{FF2B5EF4-FFF2-40B4-BE49-F238E27FC236}">
+                <a16:creationId xmlns:a16="http://schemas.microsoft.com/office/drawing/2014/main" id="{F3095ABA-0D6A-9A4E-A022-6373257ED5D4}"/>
+              </a:ext>
+            </a:extLst>
+          </p:cNvPr>
+          <p:cNvSpPr>
+            <a:spLocks noGrp="1"/>
+          </p:cNvSpPr>
+          <p:nvPr>
+            <p:ph idx="1"/>
+          </p:nvPr>
+        </p:nvSpPr>
+        <p:spPr/>
+        <p:txBody>
+          <a:bodyPr/>
+          <a:lstStyle/>
+          <a:p>
+            <a:endParaRPr lang="en-US"/>
+          </a:p>
+        </p:txBody>
+      </p:sp>
+    </p:spTree>
+    <p:extLst>
+      <p:ext uri="{BB962C8B-B14F-4D97-AF65-F5344CB8AC3E}">
+        <p14:creationId xmlns:p14="http://schemas.microsoft.com/office/powerpoint/2010/main" val="609336991"/>
+      </p:ext>
+    </p:extLst>
+  </p:cSld>
+  <p:clrMapOvr>
+    <a:masterClrMapping/>
+  </p:clrMapOvr>
+</p:sld>
+</file>
+
+<file path=ppt/slides/slide31.xml><?xml version="1.0" encoding="utf-8"?>
+<p:sld xmlns:a="http://schemas.openxmlformats.org/drawingml/2006/main" xmlns:r="http://schemas.openxmlformats.org/officeDocument/2006/relationships" xmlns:p="http://schemas.openxmlformats.org/presentationml/2006/main">
+  <p:cSld>
+    <p:spTree>
+      <p:nvGrpSpPr>
+        <p:cNvPr id="1" name=""/>
+        <p:cNvGrpSpPr/>
+        <p:nvPr/>
+      </p:nvGrpSpPr>
+      <p:grpSpPr>
+        <a:xfrm>
+          <a:off x="0" y="0"/>
+          <a:ext cx="0" cy="0"/>
+          <a:chOff x="0" y="0"/>
+          <a:chExt cx="0" cy="0"/>
+        </a:xfrm>
+      </p:grpSpPr>
+      <p:sp>
+        <p:nvSpPr>
+          <p:cNvPr id="2" name="Title 1">
+            <a:extLst>
+              <a:ext uri="{FF2B5EF4-FFF2-40B4-BE49-F238E27FC236}">
+                <a16:creationId xmlns:a16="http://schemas.microsoft.com/office/drawing/2014/main" id="{2D1D3786-4DD3-7C48-9A94-B341A7FFFB85}"/>
+              </a:ext>
+            </a:extLst>
+          </p:cNvPr>
+          <p:cNvSpPr>
+            <a:spLocks noGrp="1"/>
+          </p:cNvSpPr>
+          <p:nvPr>
+            <p:ph type="title"/>
+          </p:nvPr>
+        </p:nvSpPr>
+        <p:spPr/>
+        <p:txBody>
+          <a:bodyPr/>
+          <a:lstStyle/>
+          <a:p>
+            <a:r>
+              <a:rPr lang="en-US" dirty="0"/>
+              <a:t>References</a:t>
+            </a:r>
+          </a:p>
+        </p:txBody>
+      </p:sp>
+      <p:sp>
+        <p:nvSpPr>
+          <p:cNvPr id="3" name="Content Placeholder 2">
+            <a:extLst>
+              <a:ext uri="{FF2B5EF4-FFF2-40B4-BE49-F238E27FC236}">
+                <a16:creationId xmlns:a16="http://schemas.microsoft.com/office/drawing/2014/main" id="{E21FA19F-419A-7841-863D-9CE064E37FF2}"/>
+              </a:ext>
+            </a:extLst>
+          </p:cNvPr>
+          <p:cNvSpPr>
+            <a:spLocks noGrp="1"/>
+          </p:cNvSpPr>
+          <p:nvPr>
+            <p:ph idx="1"/>
+          </p:nvPr>
+        </p:nvSpPr>
+        <p:spPr/>
+        <p:txBody>
+          <a:bodyPr/>
+          <a:lstStyle/>
+          <a:p>
+            <a:r>
+              <a:rPr lang="en-US" dirty="0">
+                <a:hlinkClick r:id="rId2"/>
+              </a:rPr>
+              <a:t>Horizontal  Pod Autoscaler</a:t>
+            </a:r>
+            <a:endParaRPr lang="en-US" dirty="0"/>
+          </a:p>
+          <a:p>
+            <a:r>
+              <a:rPr lang="en-US" dirty="0">
+                <a:hlinkClick r:id="rId3"/>
+              </a:rPr>
+              <a:t>Horizontal Pod Autoscaler Walkthrough</a:t>
+            </a:r>
+            <a:endParaRPr lang="en-US" dirty="0"/>
+          </a:p>
+          <a:p>
+            <a:r>
+              <a:rPr lang="en-US" dirty="0">
+                <a:hlinkClick r:id="rId4"/>
+              </a:rPr>
+              <a:t>https://keda.sh/</a:t>
+            </a:r>
+            <a:endParaRPr lang="en-US" dirty="0"/>
+          </a:p>
+          <a:p>
+            <a:r>
+              <a:rPr lang="en-US" dirty="0">
+                <a:hlinkClick r:id="rId5"/>
+              </a:rPr>
+              <a:t>KEDA on GitHub</a:t>
+            </a:r>
+            <a:endParaRPr lang="en-US" dirty="0"/>
+          </a:p>
+          <a:p>
+            <a:r>
+              <a:rPr lang="en-US" dirty="0">
+                <a:hlinkClick r:id="rId6"/>
+              </a:rPr>
+              <a:t>KEDA Samples</a:t>
+            </a:r>
+            <a:endParaRPr lang="en-US" dirty="0"/>
+          </a:p>
+          <a:p>
+            <a:r>
+              <a:rPr lang="en-US" dirty="0">
+                <a:hlinkClick r:id="rId7"/>
+              </a:rPr>
+              <a:t>Https://emadashi.com</a:t>
+            </a:r>
+            <a:r>
+              <a:rPr lang="en-US" dirty="0"/>
+              <a:t> </a:t>
+            </a:r>
+            <a:r>
+              <a:rPr lang="en-US" dirty="0">
+                <a:sym typeface="Wingdings" pitchFamily="2" charset="2"/>
+              </a:rPr>
+              <a:t></a:t>
+            </a:r>
+            <a:endParaRPr lang="en-US" dirty="0"/>
+          </a:p>
+          <a:p>
+            <a:r>
+              <a:rPr lang="en-US" dirty="0">
+                <a:hlinkClick r:id="rId8"/>
+              </a:rPr>
+              <a:t>Mock-server</a:t>
+            </a:r>
+            <a:endParaRPr lang="en-US" dirty="0"/>
+          </a:p>
+        </p:txBody>
+      </p:sp>
+    </p:spTree>
+    <p:extLst>
+      <p:ext uri="{BB962C8B-B14F-4D97-AF65-F5344CB8AC3E}">
+        <p14:creationId xmlns:p14="http://schemas.microsoft.com/office/powerpoint/2010/main" val="2713068039"/>
+      </p:ext>
+    </p:extLst>
+  </p:cSld>
+  <p:clrMapOvr>
+    <a:masterClrMapping/>
   </p:clrMapOvr>
 </p:sld>
 </file>

</xml_diff>